<commit_message>
Correcciones ortográficas y de layout
</commit_message>
<xml_diff>
--- a/presentación lunes 24 octubre 2016.pptx
+++ b/presentación lunes 24 octubre 2016.pptx
@@ -3228,10 +3228,10 @@
           </a:lstStyle>
           <a:p>
             <a:r>
-              <a:rPr lang="es-ES" smtClean="0"/>
+              <a:rPr lang="es-ES" dirty="0" smtClean="0"/>
               <a:t>Haga clic en el icono para agregar una imagen</a:t>
             </a:r>
-            <a:endParaRPr lang="en-US"/>
+            <a:endParaRPr lang="en-US" dirty="0"/>
           </a:p>
         </p:txBody>
       </p:sp>
@@ -4099,10 +4099,10 @@
           <a:lstStyle/>
           <a:p>
             <a:r>
-              <a:rPr lang="es-CL" smtClean="0"/>
+              <a:rPr lang="es-CL" dirty="0" smtClean="0"/>
               <a:t>Proyecto “Centro médico Hipócrates”: Iteración 2</a:t>
             </a:r>
-            <a:endParaRPr lang="es-CL"/>
+            <a:endParaRPr lang="es-CL" dirty="0"/>
           </a:p>
         </p:txBody>
       </p:sp>
@@ -4262,18 +4262,10 @@
           <a:lstStyle/>
           <a:p>
             <a:r>
-              <a:rPr lang="en-US" err="1" smtClean="0"/>
-              <a:t>Modelo</a:t>
-            </a:r>
-            <a:r>
-              <a:rPr lang="en-US" smtClean="0"/>
-              <a:t> de </a:t>
-            </a:r>
-            <a:r>
-              <a:rPr lang="en-US" err="1" smtClean="0"/>
-              <a:t>clases</a:t>
-            </a:r>
-            <a:endParaRPr lang="en-US"/>
+              <a:rPr lang="es-ES_tradnl" dirty="0" smtClean="0"/>
+              <a:t>Modelo de clases</a:t>
+            </a:r>
+            <a:endParaRPr lang="es-ES_tradnl" dirty="0"/>
           </a:p>
         </p:txBody>
       </p:sp>
@@ -4295,40 +4287,16 @@
           <a:lstStyle/>
           <a:p>
             <a:r>
-              <a:rPr lang="en-US" sz="6000" dirty="0"/>
-              <a:t>3</a:t>
-            </a:r>
-            <a:r>
-              <a:rPr lang="en-US" sz="6000" dirty="0" smtClean="0"/>
-              <a:t> </a:t>
-            </a:r>
-            <a:r>
-              <a:rPr lang="en-US" sz="6000" dirty="0" err="1" smtClean="0"/>
-              <a:t>paquetes</a:t>
-            </a:r>
-            <a:r>
-              <a:rPr lang="en-US" sz="6000" dirty="0" smtClean="0"/>
-              <a:t> Java</a:t>
-            </a:r>
-          </a:p>
-          <a:p>
-            <a:r>
-              <a:rPr lang="en-US" sz="6000" dirty="0"/>
-              <a:t>3</a:t>
-            </a:r>
-            <a:r>
-              <a:rPr lang="en-US" sz="6000" dirty="0" smtClean="0"/>
-              <a:t> </a:t>
-            </a:r>
-            <a:r>
-              <a:rPr lang="en-US" sz="6000" dirty="0" err="1" smtClean="0"/>
-              <a:t>paquetes</a:t>
-            </a:r>
-            <a:r>
-              <a:rPr lang="en-US" sz="6000" dirty="0" smtClean="0"/>
-              <a:t> .NET</a:t>
-            </a:r>
-            <a:endParaRPr lang="en-US" sz="6000" dirty="0"/>
+              <a:rPr lang="es-ES_tradnl" sz="6000" dirty="0" smtClean="0"/>
+              <a:t>3 paquetes Java</a:t>
+            </a:r>
+          </a:p>
+          <a:p>
+            <a:r>
+              <a:rPr lang="es-ES_tradnl" sz="6000" dirty="0" smtClean="0"/>
+              <a:t>3 paquetes .NET</a:t>
+            </a:r>
+            <a:endParaRPr lang="es-ES_tradnl" sz="6000" dirty="0"/>
           </a:p>
         </p:txBody>
       </p:sp>
@@ -4350,10 +4318,10 @@
           <a:lstStyle/>
           <a:p>
             <a:fld id="{66B77C49-310C-4D67-A641-7D2CCF3E3B8A}" type="slidenum">
-              <a:rPr lang="es-CL" smtClean="0"/>
+              <a:rPr lang="es-ES_tradnl" smtClean="0"/>
               <a:t>9</a:t>
             </a:fld>
-            <a:endParaRPr lang="es-CL"/>
+            <a:endParaRPr lang="es-ES_tradnl" dirty="0"/>
           </a:p>
         </p:txBody>
       </p:sp>
@@ -4403,18 +4371,10 @@
           <a:lstStyle/>
           <a:p>
             <a:r>
-              <a:rPr lang="en-US" dirty="0" err="1" smtClean="0"/>
-              <a:t>Modelo</a:t>
-            </a:r>
-            <a:r>
-              <a:rPr lang="en-US" dirty="0" smtClean="0"/>
-              <a:t> de </a:t>
-            </a:r>
-            <a:r>
-              <a:rPr lang="en-US" dirty="0" err="1" smtClean="0"/>
-              <a:t>clases</a:t>
-            </a:r>
-            <a:endParaRPr lang="en-US" dirty="0"/>
+              <a:rPr lang="es-ES_tradnl" dirty="0" smtClean="0"/>
+              <a:t>Modelo de clases</a:t>
+            </a:r>
+            <a:endParaRPr lang="es-ES_tradnl" dirty="0"/>
           </a:p>
         </p:txBody>
       </p:sp>
@@ -4436,85 +4396,43 @@
           <a:lstStyle/>
           <a:p>
             <a:r>
-              <a:rPr lang="en-US" sz="3200" dirty="0" err="1" smtClean="0"/>
-              <a:t>Paquetes</a:t>
-            </a:r>
-            <a:r>
-              <a:rPr lang="en-US" sz="3200" dirty="0" smtClean="0"/>
-              <a:t> Java:</a:t>
+              <a:rPr lang="es-ES_tradnl" sz="4400" dirty="0" smtClean="0"/>
+              <a:t>Paquetes Java:</a:t>
             </a:r>
           </a:p>
           <a:p>
             <a:pPr lvl="1"/>
             <a:r>
-              <a:rPr lang="en-US" sz="3000" dirty="0" err="1" smtClean="0"/>
+              <a:rPr lang="es-ES_tradnl" sz="4000" dirty="0" smtClean="0"/>
               <a:t>cmh.lib.dal</a:t>
             </a:r>
             <a:r>
-              <a:rPr lang="en-US" sz="3000" dirty="0" smtClean="0"/>
-              <a:t>: </a:t>
-            </a:r>
-            <a:r>
-              <a:rPr lang="en-US" sz="3000" dirty="0" err="1" smtClean="0"/>
-              <a:t>persistencia</a:t>
-            </a:r>
-            <a:endParaRPr lang="en-US" sz="3000" dirty="0" smtClean="0"/>
+              <a:rPr lang="es-ES_tradnl" sz="4000" dirty="0" smtClean="0"/>
+              <a:t>: persistencia</a:t>
+            </a:r>
           </a:p>
           <a:p>
             <a:pPr lvl="1"/>
             <a:r>
-              <a:rPr lang="en-US" sz="3000" dirty="0" err="1" smtClean="0"/>
+              <a:rPr lang="es-ES_tradnl" sz="4000" dirty="0" smtClean="0"/>
               <a:t>cmh.webapp.bl</a:t>
             </a:r>
             <a:r>
-              <a:rPr lang="en-US" sz="3000" dirty="0" smtClean="0"/>
-              <a:t>: </a:t>
-            </a:r>
-            <a:r>
-              <a:rPr lang="en-US" sz="3000" dirty="0" err="1" smtClean="0"/>
-              <a:t>lógica</a:t>
-            </a:r>
-            <a:r>
-              <a:rPr lang="en-US" sz="3000" dirty="0" smtClean="0"/>
-              <a:t> de </a:t>
-            </a:r>
-            <a:r>
-              <a:rPr lang="en-US" sz="3000" dirty="0" err="1" smtClean="0"/>
-              <a:t>negocios</a:t>
-            </a:r>
-            <a:endParaRPr lang="en-US" sz="3000" dirty="0" smtClean="0"/>
+              <a:rPr lang="es-ES_tradnl" sz="4000" dirty="0" smtClean="0"/>
+              <a:t>: lógica de negocios</a:t>
+            </a:r>
           </a:p>
           <a:p>
             <a:pPr lvl="1"/>
             <a:r>
-              <a:rPr lang="en-US" sz="3000" dirty="0" err="1" smtClean="0"/>
+              <a:rPr lang="es-ES_tradnl" sz="4000" dirty="0" smtClean="0"/>
               <a:t>cmh.servpago</a:t>
             </a:r>
             <a:r>
-              <a:rPr lang="en-US" sz="3000" dirty="0" smtClean="0"/>
-              <a:t>: </a:t>
-            </a:r>
-            <a:r>
-              <a:rPr lang="en-US" sz="3000" dirty="0" err="1" smtClean="0"/>
-              <a:t>servicio</a:t>
-            </a:r>
-            <a:r>
-              <a:rPr lang="en-US" sz="3000" dirty="0" smtClean="0"/>
-              <a:t> de </a:t>
-            </a:r>
-            <a:r>
-              <a:rPr lang="en-US" sz="3000" dirty="0" err="1" smtClean="0"/>
-              <a:t>pago</a:t>
-            </a:r>
-            <a:r>
-              <a:rPr lang="en-US" sz="3000" dirty="0"/>
-              <a:t> </a:t>
-            </a:r>
-            <a:r>
-              <a:rPr lang="en-US" sz="3000" dirty="0" err="1" smtClean="0"/>
-              <a:t>automático</a:t>
-            </a:r>
-            <a:endParaRPr lang="en-US" sz="3000" dirty="0"/>
+              <a:rPr lang="es-ES_tradnl" sz="4000" dirty="0" smtClean="0"/>
+              <a:t>: servicio de pago automático</a:t>
+            </a:r>
+            <a:endParaRPr lang="es-ES_tradnl" sz="4000" dirty="0"/>
           </a:p>
         </p:txBody>
       </p:sp>
@@ -4536,10 +4454,10 @@
           <a:lstStyle/>
           <a:p>
             <a:fld id="{66B77C49-310C-4D67-A641-7D2CCF3E3B8A}" type="slidenum">
-              <a:rPr lang="es-CL" smtClean="0"/>
+              <a:rPr lang="es-ES_tradnl" smtClean="0"/>
               <a:t>10</a:t>
             </a:fld>
-            <a:endParaRPr lang="es-CL"/>
+            <a:endParaRPr lang="es-ES_tradnl" dirty="0"/>
           </a:p>
         </p:txBody>
       </p:sp>
@@ -4589,18 +4507,10 @@
           <a:lstStyle/>
           <a:p>
             <a:r>
-              <a:rPr lang="en-US" dirty="0" err="1" smtClean="0"/>
-              <a:t>Modelo</a:t>
-            </a:r>
-            <a:r>
-              <a:rPr lang="en-US" dirty="0" smtClean="0"/>
-              <a:t> de </a:t>
-            </a:r>
-            <a:r>
-              <a:rPr lang="en-US" dirty="0" err="1" smtClean="0"/>
-              <a:t>clases</a:t>
-            </a:r>
-            <a:endParaRPr lang="en-US" dirty="0"/>
+              <a:rPr lang="es-ES_tradnl" dirty="0" smtClean="0"/>
+              <a:t>Modelo de clases</a:t>
+            </a:r>
+            <a:endParaRPr lang="es-ES_tradnl" dirty="0"/>
           </a:p>
         </p:txBody>
       </p:sp>
@@ -4622,102 +4532,59 @@
           <a:lstStyle/>
           <a:p>
             <a:r>
-              <a:rPr lang="en-US" sz="3200" dirty="0" err="1" smtClean="0"/>
-              <a:t>Paquetes</a:t>
-            </a:r>
-            <a:r>
-              <a:rPr lang="en-US" sz="3200" dirty="0" smtClean="0"/>
-              <a:t> .NET:</a:t>
+              <a:rPr lang="es-ES_tradnl" sz="4000" dirty="0" smtClean="0"/>
+              <a:t>Paquetes .NET:</a:t>
             </a:r>
           </a:p>
           <a:p>
             <a:pPr lvl="1"/>
             <a:r>
-              <a:rPr lang="en-US" sz="3000" dirty="0" err="1" smtClean="0"/>
+              <a:rPr lang="es-ES_tradnl" sz="3600" dirty="0" smtClean="0"/>
               <a:t>CMH.Terminal.DAL</a:t>
             </a:r>
             <a:r>
-              <a:rPr lang="en-US" sz="3000" dirty="0" smtClean="0"/>
-              <a:t>: </a:t>
-            </a:r>
-            <a:r>
-              <a:rPr lang="en-US" sz="3000" dirty="0" err="1" smtClean="0"/>
-              <a:t>persistencia</a:t>
-            </a:r>
-            <a:r>
-              <a:rPr lang="en-US" sz="3000" dirty="0" smtClean="0"/>
-              <a:t> Entity Framework</a:t>
+              <a:rPr lang="es-ES_tradnl" sz="3600" dirty="0" smtClean="0"/>
+              <a:t>: persistencia </a:t>
+            </a:r>
+            <a:r>
+              <a:rPr lang="es-ES_tradnl" sz="3600" dirty="0" smtClean="0"/>
+              <a:t>Entity</a:t>
+            </a:r>
+            <a:r>
+              <a:rPr lang="es-ES_tradnl" sz="3600" dirty="0" smtClean="0"/>
+              <a:t> Framework</a:t>
             </a:r>
           </a:p>
           <a:p>
             <a:pPr lvl="1"/>
             <a:r>
-              <a:rPr lang="en-US" sz="3000" dirty="0" err="1" smtClean="0"/>
+              <a:rPr lang="es-ES_tradnl" sz="3600" dirty="0" smtClean="0"/>
               <a:t>CMH.Terminal.BL</a:t>
             </a:r>
             <a:r>
-              <a:rPr lang="en-US" sz="3000" dirty="0" smtClean="0"/>
-              <a:t>: </a:t>
-            </a:r>
-            <a:r>
-              <a:rPr lang="en-US" sz="3000" dirty="0" err="1" smtClean="0"/>
-              <a:t>lógica</a:t>
-            </a:r>
-            <a:r>
-              <a:rPr lang="en-US" sz="3000" dirty="0" smtClean="0"/>
-              <a:t> de </a:t>
-            </a:r>
-            <a:r>
-              <a:rPr lang="en-US" sz="3000" dirty="0" err="1" smtClean="0"/>
-              <a:t>negocios</a:t>
-            </a:r>
-            <a:r>
-              <a:rPr lang="en-US" sz="3000" dirty="0" smtClean="0"/>
-              <a:t> del terminal</a:t>
+              <a:rPr lang="es-ES_tradnl" sz="3600" dirty="0" smtClean="0"/>
+              <a:t>: lógica de negocios del terminal</a:t>
             </a:r>
           </a:p>
           <a:p>
             <a:pPr lvl="1"/>
             <a:r>
-              <a:rPr lang="en-US" sz="3000" dirty="0" err="1" smtClean="0"/>
+              <a:rPr lang="es-ES_tradnl" sz="3600" dirty="0" smtClean="0"/>
               <a:t>CMH.Seguro</a:t>
             </a:r>
             <a:r>
-              <a:rPr lang="en-US" sz="3000" dirty="0" smtClean="0"/>
-              <a:t>: </a:t>
-            </a:r>
-            <a:r>
-              <a:rPr lang="en-US" sz="3000" dirty="0" err="1" smtClean="0"/>
-              <a:t>persistencia</a:t>
-            </a:r>
-            <a:r>
-              <a:rPr lang="en-US" sz="3000" dirty="0" smtClean="0"/>
-              <a:t>, </a:t>
-            </a:r>
-            <a:r>
-              <a:rPr lang="en-US" sz="3000" dirty="0" err="1" smtClean="0"/>
-              <a:t>lógica</a:t>
-            </a:r>
-            <a:r>
-              <a:rPr lang="en-US" sz="3000" dirty="0" smtClean="0"/>
-              <a:t> de </a:t>
-            </a:r>
-            <a:r>
-              <a:rPr lang="en-US" sz="3000" dirty="0" err="1" smtClean="0"/>
-              <a:t>negocios</a:t>
-            </a:r>
-            <a:r>
-              <a:rPr lang="en-US" sz="3000" dirty="0" smtClean="0"/>
-              <a:t> e </a:t>
-            </a:r>
-            <a:r>
-              <a:rPr lang="en-US" sz="3000" dirty="0" err="1" smtClean="0"/>
-              <a:t>implementación</a:t>
-            </a:r>
-            <a:r>
-              <a:rPr lang="en-US" sz="3000" dirty="0" smtClean="0"/>
-              <a:t> de web service.</a:t>
-            </a:r>
+              <a:rPr lang="es-ES_tradnl" sz="3600" dirty="0" smtClean="0"/>
+              <a:t>: persistencia, lógica de negocios e implementación de web </a:t>
+            </a:r>
+            <a:r>
+              <a:rPr lang="es-ES_tradnl" sz="3600" dirty="0" smtClean="0"/>
+              <a:t>service</a:t>
+            </a:r>
+            <a:r>
+              <a:rPr lang="es-ES_tradnl" sz="3600" dirty="0" smtClean="0"/>
+              <a:t>.</a:t>
+            </a:r>
+            <a:endParaRPr lang="es-ES_tradnl" sz="3600" dirty="0" smtClean="0"/>
           </a:p>
         </p:txBody>
       </p:sp>
@@ -4739,10 +4606,10 @@
           <a:lstStyle/>
           <a:p>
             <a:fld id="{66B77C49-310C-4D67-A641-7D2CCF3E3B8A}" type="slidenum">
-              <a:rPr lang="es-CL" smtClean="0"/>
+              <a:rPr lang="es-ES_tradnl" smtClean="0"/>
               <a:t>11</a:t>
             </a:fld>
-            <a:endParaRPr lang="es-CL"/>
+            <a:endParaRPr lang="es-ES_tradnl" dirty="0"/>
           </a:p>
         </p:txBody>
       </p:sp>
@@ -4792,25 +4659,10 @@
           <a:lstStyle/>
           <a:p>
             <a:r>
-              <a:rPr lang="en-US" err="1" smtClean="0"/>
-              <a:t>Modelo</a:t>
-            </a:r>
-            <a:r>
-              <a:rPr lang="en-US" smtClean="0"/>
-              <a:t> de </a:t>
-            </a:r>
-            <a:r>
-              <a:rPr lang="en-US" err="1" smtClean="0"/>
-              <a:t>datos</a:t>
-            </a:r>
-            <a:r>
-              <a:rPr lang="en-US" smtClean="0"/>
-              <a:t/>
-            </a:r>
-            <a:br>
-              <a:rPr lang="en-US" smtClean="0"/>
-            </a:br>
-            <a:endParaRPr lang="en-US"/>
+              <a:rPr lang="es-ES_tradnl" dirty="0" smtClean="0"/>
+              <a:t>Modelo de datos</a:t>
+            </a:r>
+            <a:endParaRPr lang="es-ES_tradnl" dirty="0"/>
           </a:p>
         </p:txBody>
       </p:sp>
@@ -4845,16 +4697,8 @@
               <a:buSzTx/>
             </a:pPr>
             <a:r>
-              <a:rPr lang="en-US" sz="3600" dirty="0" smtClean="0"/>
-              <a:t>2 bases de </a:t>
-            </a:r>
-            <a:r>
-              <a:rPr lang="en-US" sz="3600" dirty="0" err="1" smtClean="0"/>
-              <a:t>datos</a:t>
-            </a:r>
-            <a:r>
-              <a:rPr lang="en-US" sz="3600" dirty="0" smtClean="0"/>
-              <a:t>:</a:t>
+              <a:rPr lang="es-ES_tradnl" sz="4800" dirty="0" smtClean="0"/>
+              <a:t>2 bases de datos:</a:t>
             </a:r>
           </a:p>
           <a:p>
@@ -4871,22 +4715,9 @@
               <a:buClrTx/>
             </a:pPr>
             <a:r>
-              <a:rPr lang="en-US" sz="3200" dirty="0" smtClean="0"/>
-              <a:t>CMH </a:t>
-            </a:r>
-            <a:r>
-              <a:rPr lang="mr-IN" sz="3200" dirty="0" smtClean="0"/>
-              <a:t>–</a:t>
-            </a:r>
-            <a:r>
-              <a:rPr lang="en-US" sz="3200" dirty="0" smtClean="0"/>
-              <a:t> 27 </a:t>
-            </a:r>
-            <a:r>
-              <a:rPr lang="en-US" sz="3200" dirty="0" err="1" smtClean="0"/>
-              <a:t>tablas</a:t>
-            </a:r>
-            <a:endParaRPr lang="en-US" sz="3200" dirty="0" smtClean="0"/>
+              <a:rPr lang="es-ES_tradnl" sz="4400" dirty="0" smtClean="0"/>
+              <a:t>CMH – 27 tablas</a:t>
+            </a:r>
           </a:p>
           <a:p>
             <a:pPr lvl="1">
@@ -4902,26 +4733,9 @@
               <a:buClrTx/>
             </a:pPr>
             <a:r>
-              <a:rPr lang="en-US" sz="3200" dirty="0" err="1" smtClean="0"/>
-              <a:t>Seguros</a:t>
-            </a:r>
-            <a:r>
-              <a:rPr lang="en-US" sz="3200" dirty="0" smtClean="0"/>
-              <a:t> </a:t>
-            </a:r>
-            <a:r>
-              <a:rPr lang="mr-IN" sz="3200" dirty="0" smtClean="0"/>
-              <a:t>–</a:t>
-            </a:r>
-            <a:r>
-              <a:rPr lang="en-US" sz="3200" dirty="0" smtClean="0"/>
-              <a:t> 6 </a:t>
-            </a:r>
-            <a:r>
-              <a:rPr lang="en-US" sz="3200" dirty="0" err="1" smtClean="0"/>
-              <a:t>tablas</a:t>
-            </a:r>
-            <a:endParaRPr lang="en-US" sz="3200" dirty="0" smtClean="0"/>
+              <a:rPr lang="es-ES_tradnl" sz="4400" dirty="0" smtClean="0"/>
+              <a:t>Seguros – 6 tablas</a:t>
+            </a:r>
           </a:p>
           <a:p>
             <a:pPr>
@@ -4936,7 +4750,7 @@
               </a:spcAft>
               <a:buClrTx/>
             </a:pPr>
-            <a:endParaRPr lang="en-US" sz="3400" dirty="0"/>
+            <a:endParaRPr lang="es-ES_tradnl" sz="4400" dirty="0" smtClean="0"/>
           </a:p>
           <a:p>
             <a:pPr>
@@ -4952,34 +4766,10 @@
               <a:buClrTx/>
             </a:pPr>
             <a:r>
-              <a:rPr lang="en-US" sz="3400" dirty="0" err="1" smtClean="0"/>
-              <a:t>Cubren</a:t>
-            </a:r>
-            <a:r>
-              <a:rPr lang="en-US" sz="3400" dirty="0" smtClean="0"/>
-              <a:t> 100% de </a:t>
-            </a:r>
-            <a:r>
-              <a:rPr lang="en-US" sz="3400" dirty="0" err="1" smtClean="0"/>
-              <a:t>los</a:t>
-            </a:r>
-            <a:r>
-              <a:rPr lang="en-US" sz="3400" dirty="0" smtClean="0"/>
-              <a:t> </a:t>
-            </a:r>
-            <a:r>
-              <a:rPr lang="en-US" sz="3400" dirty="0" err="1" smtClean="0"/>
-              <a:t>casos</a:t>
-            </a:r>
-            <a:r>
-              <a:rPr lang="en-US" sz="3400" dirty="0" smtClean="0"/>
-              <a:t> de </a:t>
-            </a:r>
-            <a:r>
-              <a:rPr lang="en-US" sz="3400" dirty="0" err="1" smtClean="0"/>
-              <a:t>uso</a:t>
-            </a:r>
-            <a:endParaRPr lang="en-US" sz="3400" dirty="0"/>
+              <a:rPr lang="es-ES_tradnl" sz="4400" dirty="0" smtClean="0"/>
+              <a:t>Cubren 100% de los casos de uso</a:t>
+            </a:r>
+            <a:endParaRPr lang="es-ES_tradnl" sz="4400" dirty="0"/>
           </a:p>
         </p:txBody>
       </p:sp>
@@ -5054,25 +4844,13 @@
           <a:lstStyle/>
           <a:p>
             <a:r>
-              <a:rPr lang="en-US" err="1" smtClean="0"/>
-              <a:t>Modelo</a:t>
-            </a:r>
-            <a:r>
-              <a:rPr lang="en-US" smtClean="0"/>
-              <a:t> de </a:t>
-            </a:r>
-            <a:r>
-              <a:rPr lang="en-US" err="1" smtClean="0"/>
-              <a:t>datos</a:t>
-            </a:r>
-            <a:r>
-              <a:rPr lang="en-US" smtClean="0"/>
-              <a:t/>
+              <a:rPr lang="es-ES_tradnl" dirty="0" smtClean="0"/>
+              <a:t>Modelo de datos</a:t>
             </a:r>
             <a:br>
-              <a:rPr lang="en-US" smtClean="0"/>
+              <a:rPr lang="es-ES_tradnl" dirty="0" smtClean="0"/>
             </a:br>
-            <a:endParaRPr lang="en-US"/>
+            <a:endParaRPr lang="es-ES_tradnl" dirty="0"/>
           </a:p>
         </p:txBody>
       </p:sp>
@@ -5100,7 +4878,7 @@
         </p:blipFill>
         <p:spPr>
           <a:xfrm>
-            <a:off x="4277810" y="1173848"/>
+            <a:off x="2530290" y="1214488"/>
             <a:ext cx="6341598" cy="4790072"/>
           </a:xfrm>
         </p:spPr>
@@ -5132,14 +4910,14 @@
       </p:sp>
       <p:sp>
         <p:nvSpPr>
-          <p:cNvPr id="6" name="TextBox 5"/>
+          <p:cNvPr id="7" name="TextBox 6"/>
           <p:cNvSpPr txBox="1"/>
           <p:nvPr/>
         </p:nvSpPr>
         <p:spPr>
           <a:xfrm>
-            <a:off x="1391921" y="2611120"/>
-            <a:ext cx="1971040" cy="1384995"/>
+            <a:off x="3063988" y="6099730"/>
+            <a:ext cx="5338321" cy="369332"/>
           </a:xfrm>
           <a:prstGeom prst="rect">
             <a:avLst/>
@@ -5147,77 +4925,16 @@
           <a:noFill/>
         </p:spPr>
         <p:txBody>
-          <a:bodyPr wrap="square" rtlCol="0">
-            <a:spAutoFit/>
-          </a:bodyPr>
-          <a:lstStyle/>
-          <a:p>
-            <a:r>
-              <a:rPr lang="en-US" sz="2800" dirty="0" smtClean="0"/>
-              <a:t>Base de </a:t>
-            </a:r>
-            <a:r>
-              <a:rPr lang="en-US" sz="2800" dirty="0" err="1" smtClean="0"/>
-              <a:t>datos</a:t>
-            </a:r>
-            <a:r>
-              <a:rPr lang="en-US" sz="2800" dirty="0" smtClean="0"/>
-              <a:t> CMH</a:t>
-            </a:r>
-            <a:endParaRPr lang="en-US" sz="2800" dirty="0"/>
-          </a:p>
-        </p:txBody>
-      </p:sp>
-      <p:sp>
-        <p:nvSpPr>
-          <p:cNvPr id="7" name="TextBox 6"/>
-          <p:cNvSpPr txBox="1"/>
-          <p:nvPr/>
-        </p:nvSpPr>
-        <p:spPr>
-          <a:xfrm>
-            <a:off x="4277810" y="6172200"/>
-            <a:ext cx="5274201" cy="369332"/>
-          </a:xfrm>
-          <a:prstGeom prst="rect">
-            <a:avLst/>
-          </a:prstGeom>
-          <a:noFill/>
-        </p:spPr>
-        <p:txBody>
           <a:bodyPr wrap="none" rtlCol="0">
             <a:spAutoFit/>
           </a:bodyPr>
           <a:lstStyle/>
           <a:p>
             <a:r>
-              <a:rPr lang="en-US" dirty="0" smtClean="0"/>
-              <a:t>Fig 4: </a:t>
-            </a:r>
-            <a:r>
-              <a:rPr lang="en-US" dirty="0" err="1" smtClean="0"/>
-              <a:t>modelo</a:t>
-            </a:r>
-            <a:r>
-              <a:rPr lang="en-US" dirty="0" smtClean="0"/>
-              <a:t> de </a:t>
-            </a:r>
-            <a:r>
-              <a:rPr lang="en-US" dirty="0" err="1" smtClean="0"/>
-              <a:t>datos</a:t>
-            </a:r>
-            <a:r>
-              <a:rPr lang="en-US" dirty="0" smtClean="0"/>
-              <a:t> de la base de </a:t>
-            </a:r>
-            <a:r>
-              <a:rPr lang="en-US" dirty="0" err="1" smtClean="0"/>
-              <a:t>datos</a:t>
-            </a:r>
-            <a:r>
-              <a:rPr lang="en-US" dirty="0" smtClean="0"/>
-              <a:t> CMH</a:t>
-            </a:r>
+              <a:rPr lang="es-ES_tradnl" dirty="0" smtClean="0"/>
+              <a:t>Fig. 4: modelo de datos de la base de datos CMH</a:t>
+            </a:r>
+            <a:endParaRPr lang="es-ES_tradnl" dirty="0" smtClean="0"/>
           </a:p>
         </p:txBody>
       </p:sp>
@@ -5269,10 +4986,10 @@
           <a:lstStyle/>
           <a:p>
             <a:fld id="{66B77C49-310C-4D67-A641-7D2CCF3E3B8A}" type="slidenum">
-              <a:rPr lang="es-CL" smtClean="0"/>
+              <a:rPr lang="es-ES_tradnl" smtClean="0"/>
               <a:t>14</a:t>
             </a:fld>
-            <a:endParaRPr lang="es-CL"/>
+            <a:endParaRPr lang="es-ES_tradnl" dirty="0"/>
           </a:p>
         </p:txBody>
       </p:sp>
@@ -5292,18 +5009,10 @@
           <a:lstStyle/>
           <a:p>
             <a:r>
-              <a:rPr lang="en-US" dirty="0" err="1" smtClean="0"/>
-              <a:t>Modelo</a:t>
-            </a:r>
-            <a:r>
-              <a:rPr lang="en-US" dirty="0" smtClean="0"/>
-              <a:t> de </a:t>
-            </a:r>
-            <a:r>
-              <a:rPr lang="en-US" dirty="0" err="1" smtClean="0"/>
-              <a:t>datos</a:t>
-            </a:r>
-            <a:endParaRPr lang="en-US" dirty="0"/>
+              <a:rPr lang="es-ES_tradnl" dirty="0" smtClean="0"/>
+              <a:t>Modelo de datos</a:t>
+            </a:r>
+            <a:endParaRPr lang="es-ES_tradnl" dirty="0"/>
           </a:p>
         </p:txBody>
       </p:sp>
@@ -5329,7 +5038,7 @@
         </p:blipFill>
         <p:spPr>
           <a:xfrm>
-            <a:off x="3880612" y="1903676"/>
+            <a:off x="2326132" y="1909259"/>
             <a:ext cx="7073900" cy="4019604"/>
           </a:xfrm>
           <a:prstGeom prst="rect">
@@ -5339,14 +5048,14 @@
       </p:pic>
       <p:sp>
         <p:nvSpPr>
-          <p:cNvPr id="11" name="TextBox 10"/>
+          <p:cNvPr id="2" name="TextBox 1"/>
           <p:cNvSpPr txBox="1"/>
           <p:nvPr/>
         </p:nvSpPr>
         <p:spPr>
           <a:xfrm>
-            <a:off x="1584961" y="3718560"/>
-            <a:ext cx="1957324" cy="1384995"/>
+            <a:off x="3119120" y="6099730"/>
+            <a:ext cx="5767926" cy="369332"/>
           </a:xfrm>
           <a:prstGeom prst="rect">
             <a:avLst/>
@@ -5354,86 +5063,24 @@
           <a:noFill/>
         </p:spPr>
         <p:txBody>
-          <a:bodyPr wrap="square" rtlCol="0">
-            <a:spAutoFit/>
-          </a:bodyPr>
-          <a:lstStyle/>
-          <a:p>
-            <a:r>
-              <a:rPr lang="en-US" sz="2800" dirty="0" err="1" smtClean="0"/>
-              <a:t>Modelo</a:t>
-            </a:r>
-            <a:r>
-              <a:rPr lang="en-US" sz="2800" dirty="0" smtClean="0"/>
-              <a:t> de </a:t>
-            </a:r>
-            <a:r>
-              <a:rPr lang="en-US" sz="2800" dirty="0" err="1" smtClean="0"/>
-              <a:t>datos</a:t>
-            </a:r>
-            <a:r>
-              <a:rPr lang="en-US" sz="2800" dirty="0" smtClean="0"/>
-              <a:t> </a:t>
-            </a:r>
-            <a:r>
-              <a:rPr lang="en-US" sz="2800" dirty="0" err="1" smtClean="0"/>
-              <a:t>Seguros</a:t>
-            </a:r>
-            <a:endParaRPr lang="en-US" sz="2800" dirty="0"/>
-          </a:p>
-        </p:txBody>
-      </p:sp>
-      <p:sp>
-        <p:nvSpPr>
-          <p:cNvPr id="2" name="TextBox 1"/>
-          <p:cNvSpPr txBox="1"/>
-          <p:nvPr/>
-        </p:nvSpPr>
-        <p:spPr>
-          <a:xfrm>
-            <a:off x="3952240" y="6146800"/>
-            <a:ext cx="5703806" cy="369332"/>
-          </a:xfrm>
-          <a:prstGeom prst="rect">
-            <a:avLst/>
-          </a:prstGeom>
-          <a:noFill/>
-        </p:spPr>
-        <p:txBody>
           <a:bodyPr wrap="none" rtlCol="0">
             <a:spAutoFit/>
           </a:bodyPr>
           <a:lstStyle/>
           <a:p>
             <a:r>
-              <a:rPr lang="en-US" dirty="0" smtClean="0"/>
-              <a:t>Fig 5: </a:t>
-            </a:r>
-            <a:r>
-              <a:rPr lang="en-US" dirty="0" err="1" smtClean="0"/>
-              <a:t>Modelo</a:t>
-            </a:r>
-            <a:r>
-              <a:rPr lang="en-US" dirty="0" smtClean="0"/>
-              <a:t> de </a:t>
-            </a:r>
-            <a:r>
-              <a:rPr lang="en-US" dirty="0" err="1" smtClean="0"/>
-              <a:t>datos</a:t>
-            </a:r>
-            <a:r>
-              <a:rPr lang="en-US" dirty="0" smtClean="0"/>
-              <a:t> del web service </a:t>
-            </a:r>
-            <a:r>
-              <a:rPr lang="en-US" dirty="0" err="1" smtClean="0"/>
-              <a:t>aseguradora</a:t>
-            </a:r>
-            <a:r>
-              <a:rPr lang="en-US" dirty="0" smtClean="0"/>
-              <a:t>.</a:t>
-            </a:r>
-            <a:endParaRPr lang="en-US" dirty="0"/>
+              <a:rPr lang="es-ES_tradnl" dirty="0" smtClean="0"/>
+              <a:t>Fig. 5: Modelo de datos del web </a:t>
+            </a:r>
+            <a:r>
+              <a:rPr lang="es-ES_tradnl" dirty="0" smtClean="0"/>
+              <a:t>service</a:t>
+            </a:r>
+            <a:r>
+              <a:rPr lang="es-ES_tradnl" dirty="0" smtClean="0"/>
+              <a:t> aseguradora.</a:t>
+            </a:r>
+            <a:endParaRPr lang="es-ES_tradnl" dirty="0"/>
           </a:p>
         </p:txBody>
       </p:sp>
@@ -5483,22 +5130,10 @@
           <a:lstStyle/>
           <a:p>
             <a:r>
-              <a:rPr lang="en-US" err="1" smtClean="0"/>
-              <a:t>Capa</a:t>
-            </a:r>
-            <a:r>
-              <a:rPr lang="en-US" smtClean="0"/>
-              <a:t> de </a:t>
-            </a:r>
-            <a:r>
-              <a:rPr lang="en-US" err="1" smtClean="0"/>
-              <a:t>negocio</a:t>
-            </a:r>
-            <a:r>
-              <a:rPr lang="en-US" smtClean="0"/>
-              <a:t> terminal</a:t>
-            </a:r>
-            <a:endParaRPr lang="en-US"/>
+              <a:rPr lang="es-ES_tradnl" dirty="0" smtClean="0"/>
+              <a:t>Capa de negocio: terminal</a:t>
+            </a:r>
+            <a:endParaRPr lang="es-ES_tradnl" dirty="0"/>
           </a:p>
         </p:txBody>
       </p:sp>
@@ -5514,122 +5149,36 @@
         </p:nvSpPr>
         <p:spPr/>
         <p:txBody>
-          <a:bodyPr/>
-          <a:lstStyle/>
-          <a:p>
-            <a:r>
-              <a:rPr lang="en-US" dirty="0" err="1" smtClean="0"/>
-              <a:t>Actualmente</a:t>
-            </a:r>
-            <a:r>
-              <a:rPr lang="en-US" dirty="0" smtClean="0"/>
-              <a:t> </a:t>
-            </a:r>
-            <a:r>
-              <a:rPr lang="en-US" dirty="0" err="1" smtClean="0"/>
-              <a:t>en</a:t>
-            </a:r>
-            <a:r>
-              <a:rPr lang="en-US" dirty="0" smtClean="0"/>
-              <a:t> </a:t>
-            </a:r>
-            <a:r>
-              <a:rPr lang="en-US" dirty="0" err="1" smtClean="0"/>
-              <a:t>proceso</a:t>
-            </a:r>
-            <a:endParaRPr lang="en-US" dirty="0" smtClean="0"/>
-          </a:p>
-          <a:p>
-            <a:r>
-              <a:rPr lang="en-US" dirty="0" smtClean="0"/>
-              <a:t>50% de las </a:t>
-            </a:r>
-            <a:r>
-              <a:rPr lang="en-US" dirty="0" err="1" smtClean="0"/>
-              <a:t>funcionalidades</a:t>
-            </a:r>
-            <a:r>
-              <a:rPr lang="en-US" dirty="0" smtClean="0"/>
-              <a:t> </a:t>
-            </a:r>
-            <a:r>
-              <a:rPr lang="en-US" dirty="0" err="1" smtClean="0"/>
-              <a:t>implementadas</a:t>
-            </a:r>
-            <a:endParaRPr lang="en-US" dirty="0" smtClean="0"/>
-          </a:p>
-          <a:p>
-            <a:r>
-              <a:rPr lang="en-US" dirty="0" smtClean="0"/>
-              <a:t>22 tests </a:t>
-            </a:r>
-            <a:r>
-              <a:rPr lang="en-US" dirty="0" err="1" smtClean="0"/>
-              <a:t>unitarios</a:t>
-            </a:r>
-            <a:r>
-              <a:rPr lang="en-US" dirty="0" smtClean="0"/>
-              <a:t>, con </a:t>
-            </a:r>
-            <a:r>
-              <a:rPr lang="en-US" dirty="0" err="1" smtClean="0"/>
-              <a:t>cobertura</a:t>
-            </a:r>
-            <a:r>
-              <a:rPr lang="en-US" dirty="0" smtClean="0"/>
-              <a:t> de 68% del </a:t>
-            </a:r>
-            <a:r>
-              <a:rPr lang="en-US" dirty="0" err="1" smtClean="0"/>
-              <a:t>código</a:t>
-            </a:r>
-            <a:endParaRPr lang="en-US" dirty="0" smtClean="0"/>
-          </a:p>
-          <a:p>
-            <a:r>
-              <a:rPr lang="en-US" dirty="0" smtClean="0"/>
-              <a:t>El test </a:t>
-            </a:r>
-            <a:r>
-              <a:rPr lang="en-US" dirty="0" err="1" smtClean="0"/>
-              <a:t>unitario</a:t>
-            </a:r>
-            <a:r>
-              <a:rPr lang="en-US" dirty="0" smtClean="0"/>
-              <a:t> </a:t>
-            </a:r>
-            <a:r>
-              <a:rPr lang="en-US" dirty="0" err="1" smtClean="0"/>
-              <a:t>promedio</a:t>
-            </a:r>
-            <a:r>
-              <a:rPr lang="en-US" dirty="0" smtClean="0"/>
-              <a:t> </a:t>
-            </a:r>
-            <a:r>
-              <a:rPr lang="en-US" dirty="0" err="1" smtClean="0"/>
-              <a:t>tiene</a:t>
-            </a:r>
-            <a:r>
-              <a:rPr lang="en-US" dirty="0" smtClean="0"/>
-              <a:t> 2,5 </a:t>
-            </a:r>
-            <a:r>
-              <a:rPr lang="en-US" dirty="0" err="1" smtClean="0"/>
-              <a:t>casos</a:t>
-            </a:r>
-            <a:r>
-              <a:rPr lang="en-US" dirty="0" smtClean="0"/>
-              <a:t> de </a:t>
-            </a:r>
-            <a:r>
-              <a:rPr lang="en-US" dirty="0" err="1" smtClean="0"/>
-              <a:t>prueba</a:t>
-            </a:r>
-            <a:endParaRPr lang="en-US" dirty="0" smtClean="0"/>
-          </a:p>
-          <a:p>
-            <a:endParaRPr lang="en-US" dirty="0"/>
+          <a:bodyPr>
+            <a:noAutofit/>
+          </a:bodyPr>
+          <a:lstStyle/>
+          <a:p>
+            <a:r>
+              <a:rPr lang="es-ES_tradnl" sz="3600" dirty="0" smtClean="0"/>
+              <a:t>Actualmente en proceso</a:t>
+            </a:r>
+          </a:p>
+          <a:p>
+            <a:r>
+              <a:rPr lang="es-ES_tradnl" sz="3600" dirty="0" smtClean="0"/>
+              <a:t>50% de las funcionalidades implementadas</a:t>
+            </a:r>
+          </a:p>
+          <a:p>
+            <a:r>
+              <a:rPr lang="es-ES_tradnl" sz="3600" dirty="0" smtClean="0"/>
+              <a:t>22 tests unitarios, con cobertura de 68% del código</a:t>
+            </a:r>
+          </a:p>
+          <a:p>
+            <a:r>
+              <a:rPr lang="es-ES_tradnl" sz="3600" dirty="0" smtClean="0"/>
+              <a:t>El test unitario promedio tiene 2,5 casos de prueba</a:t>
+            </a:r>
+          </a:p>
+          <a:p>
+            <a:endParaRPr lang="es-ES_tradnl" sz="3600" dirty="0"/>
           </a:p>
         </p:txBody>
       </p:sp>
@@ -5651,10 +5200,10 @@
           <a:lstStyle/>
           <a:p>
             <a:fld id="{66B77C49-310C-4D67-A641-7D2CCF3E3B8A}" type="slidenum">
-              <a:rPr lang="es-CL" smtClean="0"/>
+              <a:rPr lang="es-ES_tradnl" smtClean="0"/>
               <a:t>15</a:t>
             </a:fld>
-            <a:endParaRPr lang="es-CL"/>
+            <a:endParaRPr lang="es-ES_tradnl" dirty="0"/>
           </a:p>
         </p:txBody>
       </p:sp>
@@ -5704,22 +5253,26 @@
           <a:lstStyle/>
           <a:p>
             <a:r>
-              <a:rPr lang="en-US" err="1" smtClean="0"/>
+              <a:rPr lang="en-US" dirty="0" smtClean="0"/>
               <a:t>Capa</a:t>
             </a:r>
             <a:r>
-              <a:rPr lang="en-US" smtClean="0"/>
+              <a:rPr lang="en-US" dirty="0" smtClean="0"/>
               <a:t> de </a:t>
             </a:r>
             <a:r>
-              <a:rPr lang="en-US" err="1" smtClean="0"/>
+              <a:rPr lang="en-US" dirty="0" smtClean="0"/>
               <a:t>negocio</a:t>
             </a:r>
             <a:r>
-              <a:rPr lang="en-US" smtClean="0"/>
-              <a:t> web</a:t>
-            </a:r>
-            <a:endParaRPr lang="en-US"/>
+              <a:rPr lang="en-US" dirty="0" smtClean="0"/>
+              <a:t>: </a:t>
+            </a:r>
+            <a:r>
+              <a:rPr lang="en-US" dirty="0" smtClean="0"/>
+              <a:t>web</a:t>
+            </a:r>
+            <a:endParaRPr lang="en-US" dirty="0"/>
           </a:p>
         </p:txBody>
       </p:sp>
@@ -5741,68 +5294,22 @@
           <a:lstStyle/>
           <a:p>
             <a:r>
-              <a:rPr lang="en-US" sz="4000" dirty="0" smtClean="0"/>
-              <a:t>3 </a:t>
-            </a:r>
-            <a:r>
-              <a:rPr lang="en-US" sz="4000" dirty="0" err="1" smtClean="0"/>
-              <a:t>clases</a:t>
-            </a:r>
-            <a:endParaRPr lang="en-US" sz="4000" dirty="0" smtClean="0"/>
-          </a:p>
-          <a:p>
-            <a:r>
-              <a:rPr lang="en-US" sz="4000" dirty="0" smtClean="0"/>
-              <a:t>100% de </a:t>
-            </a:r>
-            <a:r>
-              <a:rPr lang="en-US" sz="4000" dirty="0" err="1" smtClean="0"/>
-              <a:t>los</a:t>
-            </a:r>
-            <a:r>
-              <a:rPr lang="en-US" sz="4000" dirty="0" smtClean="0"/>
-              <a:t> tests </a:t>
-            </a:r>
-            <a:r>
-              <a:rPr lang="en-US" sz="4000" dirty="0" err="1" smtClean="0"/>
-              <a:t>pasando</a:t>
-            </a:r>
-            <a:endParaRPr lang="en-US" sz="4000" dirty="0" smtClean="0"/>
-          </a:p>
-          <a:p>
-            <a:r>
-              <a:rPr lang="en-US" sz="4000" dirty="0" err="1" smtClean="0"/>
-              <a:t>Promedio</a:t>
-            </a:r>
-            <a:r>
-              <a:rPr lang="en-US" sz="4000" dirty="0" smtClean="0"/>
-              <a:t> de 3 </a:t>
-            </a:r>
-            <a:r>
-              <a:rPr lang="en-US" sz="4000" dirty="0" err="1" smtClean="0"/>
-              <a:t>casos</a:t>
-            </a:r>
-            <a:r>
-              <a:rPr lang="en-US" sz="4000" dirty="0" smtClean="0"/>
-              <a:t> de </a:t>
-            </a:r>
-            <a:r>
-              <a:rPr lang="en-US" sz="4000" dirty="0" err="1" smtClean="0"/>
-              <a:t>prueba</a:t>
-            </a:r>
-            <a:r>
-              <a:rPr lang="en-US" sz="4000" dirty="0" smtClean="0"/>
-              <a:t> </a:t>
-            </a:r>
-            <a:r>
-              <a:rPr lang="en-US" sz="4000" dirty="0" err="1" smtClean="0"/>
-              <a:t>por</a:t>
-            </a:r>
-            <a:r>
-              <a:rPr lang="en-US" sz="4000" dirty="0" smtClean="0"/>
-              <a:t> test.</a:t>
-            </a:r>
-            <a:endParaRPr lang="en-US" sz="4000" dirty="0"/>
+              <a:rPr lang="es-ES_tradnl" sz="4000" dirty="0" smtClean="0"/>
+              <a:t>3 clases</a:t>
+            </a:r>
+          </a:p>
+          <a:p>
+            <a:r>
+              <a:rPr lang="es-ES_tradnl" sz="4000" dirty="0" smtClean="0"/>
+              <a:t>100% de los tests pasando</a:t>
+            </a:r>
+          </a:p>
+          <a:p>
+            <a:r>
+              <a:rPr lang="es-ES_tradnl" sz="4000" dirty="0" smtClean="0"/>
+              <a:t>Promedio de 3 casos de prueba por test.</a:t>
+            </a:r>
+            <a:endParaRPr lang="es-ES_tradnl" sz="4000" dirty="0"/>
           </a:p>
         </p:txBody>
       </p:sp>
@@ -5902,104 +5409,40 @@
           <a:lstStyle/>
           <a:p>
             <a:r>
-              <a:rPr lang="en-US" sz="3200" dirty="0" err="1" smtClean="0"/>
+              <a:rPr lang="es-ES_tradnl" sz="3200" dirty="0" smtClean="0"/>
               <a:t>Arquitectura</a:t>
             </a:r>
-            <a:endParaRPr lang="en-US" sz="3200" dirty="0" smtClean="0"/>
-          </a:p>
-          <a:p>
-            <a:r>
-              <a:rPr lang="en-US" sz="3200" dirty="0" smtClean="0"/>
-              <a:t>Matrices de </a:t>
-            </a:r>
-            <a:r>
-              <a:rPr lang="en-US" sz="3200" dirty="0" err="1" smtClean="0"/>
-              <a:t>trazabilidad</a:t>
-            </a:r>
-            <a:endParaRPr lang="en-US" sz="3200" dirty="0" smtClean="0"/>
-          </a:p>
-          <a:p>
-            <a:r>
-              <a:rPr lang="en-US" sz="3200" dirty="0" err="1" smtClean="0"/>
-              <a:t>Modelo</a:t>
-            </a:r>
-            <a:r>
-              <a:rPr lang="en-US" sz="3200" dirty="0" smtClean="0"/>
-              <a:t> de </a:t>
-            </a:r>
-            <a:r>
-              <a:rPr lang="en-US" sz="3200" dirty="0" err="1" smtClean="0"/>
-              <a:t>clases</a:t>
-            </a:r>
-            <a:endParaRPr lang="en-US" sz="3200" dirty="0" smtClean="0"/>
-          </a:p>
-          <a:p>
-            <a:r>
-              <a:rPr lang="en-US" sz="3200" dirty="0" err="1" smtClean="0"/>
-              <a:t>Modelo</a:t>
-            </a:r>
-            <a:r>
-              <a:rPr lang="en-US" sz="3200" dirty="0" smtClean="0"/>
-              <a:t> de </a:t>
-            </a:r>
-            <a:r>
-              <a:rPr lang="en-US" sz="3200" dirty="0" err="1" smtClean="0"/>
-              <a:t>datos</a:t>
-            </a:r>
-            <a:endParaRPr lang="en-US" sz="3200" dirty="0" smtClean="0"/>
-          </a:p>
-          <a:p>
-            <a:r>
-              <a:rPr lang="en-US" sz="3200" dirty="0" err="1" smtClean="0"/>
-              <a:t>Capa</a:t>
-            </a:r>
-            <a:r>
-              <a:rPr lang="en-US" sz="3200" dirty="0" smtClean="0"/>
-              <a:t> de </a:t>
-            </a:r>
-            <a:r>
-              <a:rPr lang="en-US" sz="3200" dirty="0" err="1" smtClean="0"/>
-              <a:t>negocios</a:t>
-            </a:r>
-            <a:r>
-              <a:rPr lang="en-US" sz="3200" dirty="0" smtClean="0"/>
-              <a:t> app web</a:t>
-            </a:r>
-          </a:p>
-          <a:p>
-            <a:r>
-              <a:rPr lang="en-US" sz="3200" dirty="0" err="1" smtClean="0"/>
-              <a:t>Capa</a:t>
-            </a:r>
-            <a:r>
-              <a:rPr lang="en-US" sz="3200" dirty="0" smtClean="0"/>
-              <a:t> de </a:t>
-            </a:r>
-            <a:r>
-              <a:rPr lang="en-US" sz="3200" dirty="0" err="1" smtClean="0"/>
-              <a:t>negocios</a:t>
-            </a:r>
-            <a:r>
-              <a:rPr lang="en-US" sz="3200" dirty="0" smtClean="0"/>
-              <a:t> terminal (</a:t>
-            </a:r>
-            <a:r>
-              <a:rPr lang="en-US" sz="3200" dirty="0" err="1" smtClean="0"/>
-              <a:t>en</a:t>
-            </a:r>
-            <a:r>
-              <a:rPr lang="en-US" sz="3200" dirty="0" smtClean="0"/>
-              <a:t> </a:t>
-            </a:r>
-            <a:r>
-              <a:rPr lang="en-US" sz="3200" dirty="0" err="1" smtClean="0"/>
-              <a:t>proceso</a:t>
-            </a:r>
-            <a:r>
-              <a:rPr lang="en-US" sz="3200" dirty="0" smtClean="0"/>
-              <a:t>)</a:t>
-            </a:r>
-            <a:endParaRPr lang="en-US" sz="3200" dirty="0"/>
+          </a:p>
+          <a:p>
+            <a:r>
+              <a:rPr lang="es-ES_tradnl" sz="3200" dirty="0" smtClean="0"/>
+              <a:t>Matrices de trazabilidad</a:t>
+            </a:r>
+          </a:p>
+          <a:p>
+            <a:r>
+              <a:rPr lang="es-ES_tradnl" sz="3200" dirty="0" smtClean="0"/>
+              <a:t>Modelo de clases</a:t>
+            </a:r>
+          </a:p>
+          <a:p>
+            <a:r>
+              <a:rPr lang="es-ES_tradnl" sz="3200" dirty="0" smtClean="0"/>
+              <a:t>Modelo de datos</a:t>
+            </a:r>
+          </a:p>
+          <a:p>
+            <a:r>
+              <a:rPr lang="es-ES_tradnl" sz="3200" dirty="0" smtClean="0"/>
+              <a:t>Capa de negocios app web</a:t>
+            </a:r>
+          </a:p>
+          <a:p>
+            <a:r>
+              <a:rPr lang="es-ES_tradnl" sz="3200" dirty="0" smtClean="0"/>
+              <a:t>Capa de negocios terminal (en proceso)</a:t>
+            </a:r>
+            <a:endParaRPr lang="es-ES_tradnl" sz="3200" dirty="0"/>
           </a:p>
         </p:txBody>
       </p:sp>
@@ -6074,10 +5517,10 @@
           <a:lstStyle/>
           <a:p>
             <a:r>
-              <a:rPr lang="en-US" err="1" smtClean="0"/>
+              <a:rPr lang="es-ES_tradnl" dirty="0" smtClean="0"/>
               <a:t>Arquitectura</a:t>
             </a:r>
-            <a:endParaRPr lang="en-US"/>
+            <a:endParaRPr lang="es-ES_tradnl" dirty="0"/>
           </a:p>
         </p:txBody>
       </p:sp>
@@ -6128,10 +5571,10 @@
           <a:lstStyle/>
           <a:p>
             <a:fld id="{66B77C49-310C-4D67-A641-7D2CCF3E3B8A}" type="slidenum">
-              <a:rPr lang="es-CL" smtClean="0"/>
+              <a:rPr lang="es-ES_tradnl" smtClean="0"/>
               <a:t>2</a:t>
             </a:fld>
-            <a:endParaRPr lang="es-CL"/>
+            <a:endParaRPr lang="es-ES_tradnl" dirty="0"/>
           </a:p>
         </p:txBody>
       </p:sp>
@@ -6144,7 +5587,7 @@
         <p:spPr>
           <a:xfrm>
             <a:off x="2631440" y="6156960"/>
-            <a:ext cx="5000087" cy="369332"/>
+            <a:ext cx="5128327" cy="369332"/>
           </a:xfrm>
           <a:prstGeom prst="rect">
             <a:avLst/>
@@ -6158,38 +5601,10 @@
           <a:lstStyle/>
           <a:p>
             <a:r>
-              <a:rPr lang="en-US" dirty="0" smtClean="0"/>
-              <a:t>Fig 1: </a:t>
-            </a:r>
-            <a:r>
-              <a:rPr lang="en-US" dirty="0" err="1" smtClean="0"/>
-              <a:t>Diagrama</a:t>
-            </a:r>
-            <a:r>
-              <a:rPr lang="en-US" dirty="0" smtClean="0"/>
-              <a:t> de </a:t>
-            </a:r>
-            <a:r>
-              <a:rPr lang="en-US" dirty="0" err="1" smtClean="0"/>
-              <a:t>despliegue</a:t>
-            </a:r>
-            <a:r>
-              <a:rPr lang="en-US" dirty="0"/>
-              <a:t> </a:t>
-            </a:r>
-            <a:r>
-              <a:rPr lang="en-US" dirty="0" smtClean="0"/>
-              <a:t>de la </a:t>
-            </a:r>
-            <a:r>
-              <a:rPr lang="en-US" dirty="0" err="1" smtClean="0"/>
-              <a:t>solución</a:t>
-            </a:r>
-            <a:r>
-              <a:rPr lang="en-US" dirty="0" smtClean="0"/>
-              <a:t>.</a:t>
-            </a:r>
-            <a:endParaRPr lang="en-US" dirty="0"/>
+              <a:rPr lang="es-ES_tradnl" dirty="0" smtClean="0"/>
+              <a:t>Fig.. 1: Diagrama de despliegue de la solución.</a:t>
+            </a:r>
+            <a:endParaRPr lang="es-ES_tradnl" dirty="0"/>
           </a:p>
         </p:txBody>
       </p:sp>
@@ -6239,10 +5654,10 @@
           <a:lstStyle/>
           <a:p>
             <a:r>
-              <a:rPr lang="en-US" dirty="0" err="1" smtClean="0"/>
+              <a:rPr lang="es-ES_tradnl" dirty="0" smtClean="0"/>
               <a:t>Arquitectura</a:t>
             </a:r>
-            <a:endParaRPr lang="en-US" dirty="0"/>
+            <a:endParaRPr lang="es-ES_tradnl" dirty="0"/>
           </a:p>
         </p:txBody>
       </p:sp>
@@ -6289,96 +5704,32 @@
           <a:lstStyle/>
           <a:p>
             <a:r>
-              <a:rPr lang="en-US" sz="3200" dirty="0" smtClean="0"/>
-              <a:t>Bases de </a:t>
-            </a:r>
-            <a:r>
-              <a:rPr lang="en-US" sz="3200" dirty="0" err="1" smtClean="0"/>
-              <a:t>datos</a:t>
-            </a:r>
-            <a:r>
-              <a:rPr lang="en-US" sz="3200" dirty="0" smtClean="0"/>
-              <a:t>:</a:t>
+              <a:rPr lang="es-ES_tradnl" sz="3600" dirty="0" smtClean="0"/>
+              <a:t>Bases de datos:</a:t>
             </a:r>
           </a:p>
           <a:p>
             <a:pPr lvl="1"/>
             <a:r>
-              <a:rPr lang="en-US" sz="3200" dirty="0" err="1" smtClean="0"/>
+              <a:rPr lang="es-ES_tradnl" sz="3600" dirty="0" smtClean="0"/>
               <a:t>bd_cmh</a:t>
             </a:r>
             <a:r>
-              <a:rPr lang="en-US" sz="3200" dirty="0" smtClean="0"/>
-              <a:t>: Oracle, </a:t>
-            </a:r>
-            <a:r>
-              <a:rPr lang="en-US" sz="3200" dirty="0" err="1" smtClean="0"/>
-              <a:t>única</a:t>
-            </a:r>
-            <a:r>
-              <a:rPr lang="en-US" sz="3200" dirty="0" smtClean="0"/>
-              <a:t> base de </a:t>
-            </a:r>
-            <a:r>
-              <a:rPr lang="en-US" sz="3200" dirty="0" err="1" smtClean="0"/>
-              <a:t>datos</a:t>
-            </a:r>
-            <a:r>
-              <a:rPr lang="en-US" sz="3200" dirty="0" smtClean="0"/>
-              <a:t> del </a:t>
-            </a:r>
-            <a:r>
-              <a:rPr lang="en-US" sz="3200" dirty="0" err="1" smtClean="0"/>
-              <a:t>negocio</a:t>
-            </a:r>
-            <a:r>
-              <a:rPr lang="en-US" sz="3200" dirty="0" smtClean="0"/>
-              <a:t>.</a:t>
-            </a:r>
-            <a:endParaRPr lang="en-US" sz="3200" dirty="0" smtClean="0"/>
+              <a:rPr lang="es-ES_tradnl" sz="3600" dirty="0" smtClean="0"/>
+              <a:t>: Oracle, única base de datos del negocio.</a:t>
+            </a:r>
           </a:p>
           <a:p>
             <a:pPr lvl="1"/>
             <a:r>
-              <a:rPr lang="en-US" sz="3200" dirty="0" err="1" smtClean="0"/>
+              <a:rPr lang="es-ES_tradnl" sz="3600" dirty="0" smtClean="0"/>
               <a:t>bd_seguro</a:t>
             </a:r>
             <a:r>
-              <a:rPr lang="en-US" sz="3200" dirty="0" smtClean="0"/>
-              <a:t>: Oracle, </a:t>
-            </a:r>
-            <a:r>
-              <a:rPr lang="en-US" sz="3200" dirty="0" err="1" smtClean="0"/>
-              <a:t>simula</a:t>
-            </a:r>
-            <a:r>
-              <a:rPr lang="en-US" sz="3200" dirty="0" smtClean="0"/>
-              <a:t> base de </a:t>
-            </a:r>
-            <a:r>
-              <a:rPr lang="en-US" sz="3200" dirty="0" err="1" smtClean="0"/>
-              <a:t>datos</a:t>
-            </a:r>
-            <a:r>
-              <a:rPr lang="en-US" sz="3200" dirty="0" smtClean="0"/>
-              <a:t> de </a:t>
-            </a:r>
-            <a:r>
-              <a:rPr lang="en-US" sz="3200" dirty="0" err="1" smtClean="0"/>
-              <a:t>servicio</a:t>
-            </a:r>
-            <a:r>
-              <a:rPr lang="en-US" sz="3200" dirty="0" smtClean="0"/>
-              <a:t> de </a:t>
-            </a:r>
-            <a:r>
-              <a:rPr lang="en-US" sz="3200" dirty="0" err="1" smtClean="0"/>
-              <a:t>aseguradoras</a:t>
-            </a:r>
-            <a:r>
-              <a:rPr lang="en-US" sz="3200" dirty="0" smtClean="0"/>
-              <a:t>.</a:t>
-            </a:r>
+              <a:rPr lang="es-ES_tradnl" sz="3600" dirty="0" smtClean="0"/>
+              <a:t>: Oracle, simula base de datos de servicio de aseguradoras.</a:t>
+            </a:r>
+            <a:endParaRPr lang="es-ES_tradnl" sz="3600" dirty="0" smtClean="0"/>
           </a:p>
         </p:txBody>
       </p:sp>
@@ -6428,10 +5779,10 @@
           <a:lstStyle/>
           <a:p>
             <a:r>
-              <a:rPr lang="en-US" dirty="0" err="1" smtClean="0"/>
+              <a:rPr lang="es-ES_tradnl" dirty="0" smtClean="0"/>
               <a:t>Arquitectura</a:t>
             </a:r>
-            <a:endParaRPr lang="en-US" dirty="0"/>
+            <a:endParaRPr lang="es-ES_tradnl" dirty="0"/>
           </a:p>
         </p:txBody>
       </p:sp>
@@ -6453,10 +5804,10 @@
           <a:lstStyle/>
           <a:p>
             <a:fld id="{66B77C49-310C-4D67-A641-7D2CCF3E3B8A}" type="slidenum">
-              <a:rPr lang="es-CL" smtClean="0"/>
+              <a:rPr lang="es-ES_tradnl" smtClean="0"/>
               <a:t>4</a:t>
             </a:fld>
-            <a:endParaRPr lang="es-CL"/>
+            <a:endParaRPr lang="es-ES_tradnl" dirty="0"/>
           </a:p>
         </p:txBody>
       </p:sp>
@@ -6478,129 +5829,42 @@
           <a:lstStyle/>
           <a:p>
             <a:pPr lvl="1"/>
-            <a:endParaRPr lang="en-US" sz="3200" dirty="0"/>
+            <a:endParaRPr lang="es-ES_tradnl" sz="3200" dirty="0" smtClean="0"/>
           </a:p>
           <a:p>
             <a:pPr lvl="1"/>
             <a:r>
-              <a:rPr lang="en-US" sz="3200" dirty="0" smtClean="0"/>
-              <a:t>Terminal: </a:t>
-            </a:r>
-            <a:r>
-              <a:rPr lang="en-US" sz="3200" dirty="0" err="1" smtClean="0"/>
-              <a:t>provee</a:t>
-            </a:r>
-            <a:r>
-              <a:rPr lang="en-US" sz="3200" dirty="0" smtClean="0"/>
-              <a:t> </a:t>
-            </a:r>
-            <a:r>
-              <a:rPr lang="en-US" sz="3200" dirty="0" err="1" smtClean="0"/>
-              <a:t>funcionalidades</a:t>
-            </a:r>
-            <a:r>
-              <a:rPr lang="en-US" sz="3200" dirty="0" smtClean="0"/>
-              <a:t> </a:t>
-            </a:r>
-            <a:r>
-              <a:rPr lang="en-US" sz="3200" dirty="0" err="1" smtClean="0"/>
-              <a:t>administrativas</a:t>
-            </a:r>
-            <a:r>
-              <a:rPr lang="en-US" sz="3200" dirty="0" smtClean="0"/>
-              <a:t> a </a:t>
-            </a:r>
-            <a:r>
-              <a:rPr lang="en-US" sz="3200" dirty="0" err="1" smtClean="0"/>
-              <a:t>funcionarios</a:t>
-            </a:r>
-            <a:r>
-              <a:rPr lang="en-US" sz="3200" dirty="0" smtClean="0"/>
-              <a:t> y personal </a:t>
-            </a:r>
-            <a:r>
-              <a:rPr lang="en-US" sz="3200" dirty="0" err="1" smtClean="0"/>
-              <a:t>médico</a:t>
-            </a:r>
-            <a:r>
-              <a:rPr lang="en-US" sz="3200" dirty="0" smtClean="0"/>
-              <a:t>, </a:t>
-            </a:r>
-            <a:r>
-              <a:rPr lang="en-US" sz="3200" dirty="0" err="1" smtClean="0"/>
-              <a:t>además</a:t>
-            </a:r>
-            <a:r>
-              <a:rPr lang="en-US" sz="3200" dirty="0" smtClean="0"/>
-              <a:t> de </a:t>
-            </a:r>
-            <a:r>
-              <a:rPr lang="en-US" sz="3200" dirty="0" err="1" smtClean="0"/>
-              <a:t>enviar</a:t>
-            </a:r>
-            <a:r>
-              <a:rPr lang="en-US" sz="3200" dirty="0" smtClean="0"/>
-              <a:t> </a:t>
-            </a:r>
-            <a:r>
-              <a:rPr lang="en-US" sz="3200" dirty="0" err="1" smtClean="0"/>
-              <a:t>notificaciones</a:t>
-            </a:r>
-            <a:r>
-              <a:rPr lang="en-US" sz="3200" dirty="0" smtClean="0"/>
-              <a:t> al mail.</a:t>
+              <a:rPr lang="es-ES_tradnl" sz="3200" dirty="0" smtClean="0"/>
+              <a:t>Terminal: provee funcionalidades administrativas a funcionarios y personal médico, además de enviar notificaciones al mail.</a:t>
             </a:r>
           </a:p>
           <a:p>
             <a:pPr lvl="1"/>
             <a:r>
-              <a:rPr lang="en-US" sz="3200" dirty="0" err="1" smtClean="0"/>
+              <a:rPr lang="es-ES_tradnl" sz="3200" dirty="0" smtClean="0"/>
               <a:t>SeguroWS</a:t>
             </a:r>
             <a:r>
-              <a:rPr lang="en-US" sz="3200" dirty="0" smtClean="0"/>
-              <a:t>: web service que </a:t>
-            </a:r>
-            <a:r>
-              <a:rPr lang="en-US" sz="3200" dirty="0" err="1" smtClean="0"/>
-              <a:t>simula</a:t>
-            </a:r>
-            <a:r>
-              <a:rPr lang="en-US" sz="3200" dirty="0" smtClean="0"/>
-              <a:t> </a:t>
-            </a:r>
-            <a:r>
-              <a:rPr lang="en-US" sz="3200" dirty="0" err="1" smtClean="0"/>
-              <a:t>proveer</a:t>
-            </a:r>
-            <a:r>
-              <a:rPr lang="en-US" sz="3200" dirty="0" smtClean="0"/>
-              <a:t> </a:t>
-            </a:r>
-            <a:r>
-              <a:rPr lang="en-US" sz="3200" dirty="0" err="1" smtClean="0"/>
-              <a:t>funcionalidades</a:t>
-            </a:r>
-            <a:r>
-              <a:rPr lang="en-US" sz="3200" dirty="0" smtClean="0"/>
-              <a:t> de un endpoint de la </a:t>
-            </a:r>
-            <a:r>
-              <a:rPr lang="en-US" sz="3200" dirty="0" err="1" smtClean="0"/>
-              <a:t>empresa</a:t>
-            </a:r>
-            <a:r>
-              <a:rPr lang="en-US" sz="3200" dirty="0" smtClean="0"/>
-              <a:t> de </a:t>
-            </a:r>
-            <a:r>
-              <a:rPr lang="en-US" sz="3200" dirty="0" err="1" smtClean="0"/>
-              <a:t>seguros</a:t>
-            </a:r>
-            <a:r>
-              <a:rPr lang="en-US" sz="3200" dirty="0" smtClean="0"/>
-              <a:t>.</a:t>
-            </a:r>
+              <a:rPr lang="es-ES_tradnl" sz="3200" dirty="0" smtClean="0"/>
+              <a:t>: web </a:t>
+            </a:r>
+            <a:r>
+              <a:rPr lang="es-ES_tradnl" sz="3200" dirty="0" smtClean="0"/>
+              <a:t>service</a:t>
+            </a:r>
+            <a:r>
+              <a:rPr lang="es-ES_tradnl" sz="3200" dirty="0" smtClean="0"/>
+              <a:t> que simula proveer funcionalidades de un </a:t>
+            </a:r>
+            <a:r>
+              <a:rPr lang="es-ES_tradnl" sz="3200" dirty="0" smtClean="0"/>
+              <a:t>endpoint</a:t>
+            </a:r>
+            <a:r>
+              <a:rPr lang="es-ES_tradnl" sz="3200" dirty="0" smtClean="0"/>
+              <a:t> de la empresa de seguros.</a:t>
+            </a:r>
+            <a:endParaRPr lang="es-ES_tradnl" sz="3200" dirty="0" smtClean="0"/>
           </a:p>
         </p:txBody>
       </p:sp>
@@ -6650,10 +5914,10 @@
           <a:lstStyle/>
           <a:p>
             <a:r>
-              <a:rPr lang="en-US" dirty="0" err="1" smtClean="0"/>
+              <a:rPr lang="es-ES_tradnl" dirty="0" smtClean="0"/>
               <a:t>Arquitectura</a:t>
             </a:r>
-            <a:endParaRPr lang="en-US" dirty="0"/>
+            <a:endParaRPr lang="es-ES_tradnl" dirty="0"/>
           </a:p>
         </p:txBody>
       </p:sp>
@@ -6695,102 +5959,35 @@
         <p:spPr/>
         <p:txBody>
           <a:bodyPr>
-            <a:normAutofit/>
+            <a:noAutofit/>
           </a:bodyPr>
           <a:lstStyle/>
           <a:p>
             <a:pPr lvl="1"/>
-            <a:endParaRPr lang="en-US" sz="3200" dirty="0" smtClean="0"/>
+            <a:r>
+              <a:rPr lang="es-ES_tradnl" sz="4000" dirty="0" smtClean="0"/>
+              <a:t>Web app: sitio web que provee las funcionalidades para los pacientes.</a:t>
+            </a:r>
           </a:p>
           <a:p>
             <a:pPr lvl="1"/>
-            <a:endParaRPr lang="en-US" sz="3200" dirty="0"/>
-          </a:p>
-          <a:p>
-            <a:pPr lvl="1"/>
-            <a:r>
-              <a:rPr lang="en-US" sz="3200" dirty="0" smtClean="0"/>
-              <a:t>Web app: </a:t>
-            </a:r>
-            <a:r>
-              <a:rPr lang="en-US" sz="3200" dirty="0" err="1" smtClean="0"/>
-              <a:t>sitio</a:t>
-            </a:r>
-            <a:r>
-              <a:rPr lang="en-US" sz="3200" dirty="0" smtClean="0"/>
-              <a:t> web que </a:t>
-            </a:r>
-            <a:r>
-              <a:rPr lang="en-US" sz="3200" dirty="0" err="1" smtClean="0"/>
-              <a:t>provee</a:t>
-            </a:r>
-            <a:r>
-              <a:rPr lang="en-US" sz="3200" dirty="0" smtClean="0"/>
-              <a:t> las </a:t>
-            </a:r>
-            <a:r>
-              <a:rPr lang="en-US" sz="3200" dirty="0" err="1" smtClean="0"/>
-              <a:t>funcionalidades</a:t>
-            </a:r>
-            <a:r>
-              <a:rPr lang="en-US" sz="3200" dirty="0" smtClean="0"/>
-              <a:t> para </a:t>
-            </a:r>
-            <a:r>
-              <a:rPr lang="en-US" sz="3200" dirty="0" err="1" smtClean="0"/>
-              <a:t>los</a:t>
-            </a:r>
-            <a:r>
-              <a:rPr lang="en-US" sz="3200" dirty="0" smtClean="0"/>
+            <a:r>
+              <a:rPr lang="es-ES_tradnl" sz="4000" dirty="0" smtClean="0"/>
+              <a:t>Payment</a:t>
+            </a:r>
+            <a:r>
+              <a:rPr lang="es-ES_tradnl" sz="4000" dirty="0" smtClean="0"/>
               <a:t> </a:t>
             </a:r>
             <a:r>
-              <a:rPr lang="en-US" sz="3200" dirty="0" err="1" smtClean="0"/>
-              <a:t>pacientes</a:t>
-            </a:r>
-            <a:r>
-              <a:rPr lang="en-US" sz="3200" dirty="0" smtClean="0"/>
-              <a:t>.</a:t>
-            </a:r>
-          </a:p>
-          <a:p>
-            <a:pPr lvl="1"/>
-            <a:r>
-              <a:rPr lang="en-US" sz="3200" dirty="0" smtClean="0"/>
-              <a:t>Payment service: </a:t>
-            </a:r>
-            <a:r>
-              <a:rPr lang="en-US" sz="3200" dirty="0" err="1" smtClean="0"/>
-              <a:t>servicio</a:t>
-            </a:r>
-            <a:r>
-              <a:rPr lang="en-US" sz="3200" dirty="0" smtClean="0"/>
-              <a:t> </a:t>
-            </a:r>
-            <a:r>
-              <a:rPr lang="en-US" sz="3200" dirty="0" err="1" smtClean="0"/>
-              <a:t>automatizado</a:t>
-            </a:r>
-            <a:r>
-              <a:rPr lang="en-US" sz="3200" dirty="0" smtClean="0"/>
-              <a:t> de </a:t>
-            </a:r>
-            <a:r>
-              <a:rPr lang="en-US" sz="3200" dirty="0" err="1" smtClean="0"/>
-              <a:t>pagos</a:t>
-            </a:r>
-            <a:r>
-              <a:rPr lang="en-US" sz="3200" dirty="0" smtClean="0"/>
-              <a:t> de </a:t>
-            </a:r>
-            <a:r>
-              <a:rPr lang="en-US" sz="3200" dirty="0" err="1" smtClean="0"/>
-              <a:t>honorarios</a:t>
-            </a:r>
-            <a:r>
-              <a:rPr lang="en-US" sz="3200" dirty="0" smtClean="0"/>
-              <a:t>.</a:t>
-            </a:r>
+              <a:rPr lang="es-ES_tradnl" sz="4000" dirty="0" smtClean="0"/>
+              <a:t>service</a:t>
+            </a:r>
+            <a:r>
+              <a:rPr lang="es-ES_tradnl" sz="4000" dirty="0" smtClean="0"/>
+              <a:t>: servicio automatizado de pagos de honorarios.</a:t>
+            </a:r>
+            <a:endParaRPr lang="es-ES_tradnl" sz="4000" dirty="0" smtClean="0"/>
           </a:p>
         </p:txBody>
       </p:sp>
@@ -6836,7 +6033,7 @@
         </p:nvSpPr>
         <p:spPr>
           <a:xfrm>
-            <a:off x="2623312" y="2393984"/>
+            <a:off x="1924812" y="2292384"/>
             <a:ext cx="7211568" cy="1397124"/>
           </a:xfrm>
         </p:spPr>
@@ -6845,14 +6042,10 @@
           <a:lstStyle/>
           <a:p>
             <a:r>
-              <a:rPr lang="en-US" dirty="0" smtClean="0"/>
-              <a:t>Matrices de </a:t>
-            </a:r>
-            <a:r>
-              <a:rPr lang="en-US" dirty="0" err="1" smtClean="0"/>
-              <a:t>trazabilidad</a:t>
-            </a:r>
-            <a:endParaRPr lang="en-US" dirty="0"/>
+              <a:rPr lang="es-ES_tradnl" dirty="0" smtClean="0"/>
+              <a:t>Matrices de trazabilidad</a:t>
+            </a:r>
+            <a:endParaRPr lang="es-ES_tradnl" dirty="0"/>
           </a:p>
         </p:txBody>
       </p:sp>
@@ -6927,34 +6120,10 @@
           <a:lstStyle/>
           <a:p>
             <a:r>
-              <a:rPr lang="en-US" dirty="0" err="1" smtClean="0"/>
-              <a:t>Matriz</a:t>
-            </a:r>
-            <a:r>
-              <a:rPr lang="en-US" dirty="0" smtClean="0"/>
-              <a:t>: </a:t>
-            </a:r>
-            <a:r>
-              <a:rPr lang="en-US" dirty="0" err="1" smtClean="0"/>
-              <a:t>Requerimientos</a:t>
-            </a:r>
-            <a:r>
-              <a:rPr lang="en-US" dirty="0" smtClean="0"/>
-              <a:t> vs </a:t>
-            </a:r>
-            <a:r>
-              <a:rPr lang="en-US" dirty="0" err="1" smtClean="0"/>
-              <a:t>Casos</a:t>
-            </a:r>
-            <a:r>
-              <a:rPr lang="en-US" dirty="0" smtClean="0"/>
-              <a:t> de </a:t>
-            </a:r>
-            <a:r>
-              <a:rPr lang="en-US" dirty="0" err="1" smtClean="0"/>
-              <a:t>uso</a:t>
-            </a:r>
-            <a:endParaRPr lang="en-US" dirty="0"/>
+              <a:rPr lang="es-ES_tradnl" dirty="0" smtClean="0"/>
+              <a:t>Matriz: Requerimientos vs Casos de uso</a:t>
+            </a:r>
+            <a:endParaRPr lang="es-ES_tradnl" dirty="0"/>
           </a:p>
         </p:txBody>
       </p:sp>
@@ -7005,10 +6174,10 @@
           <a:lstStyle/>
           <a:p>
             <a:fld id="{66B77C49-310C-4D67-A641-7D2CCF3E3B8A}" type="slidenum">
-              <a:rPr lang="es-CL" smtClean="0"/>
+              <a:rPr lang="es-ES_tradnl" smtClean="0"/>
               <a:t>7</a:t>
             </a:fld>
-            <a:endParaRPr lang="es-CL"/>
+            <a:endParaRPr lang="es-ES_tradnl" dirty="0"/>
           </a:p>
         </p:txBody>
       </p:sp>
@@ -7021,7 +6190,7 @@
         <p:spPr>
           <a:xfrm>
             <a:off x="6004560" y="1910080"/>
-            <a:ext cx="4450080" cy="1938992"/>
+            <a:ext cx="4450080" cy="3539430"/>
           </a:xfrm>
           <a:prstGeom prst="rect">
             <a:avLst/>
@@ -7035,115 +6204,29 @@
           <a:lstStyle/>
           <a:p>
             <a:r>
-              <a:rPr lang="en-US" sz="2000" dirty="0" smtClean="0"/>
-              <a:t>100% de </a:t>
-            </a:r>
-            <a:r>
-              <a:rPr lang="en-US" sz="2000" dirty="0" err="1" smtClean="0"/>
-              <a:t>los</a:t>
-            </a:r>
-            <a:r>
-              <a:rPr lang="en-US" sz="2000" dirty="0" smtClean="0"/>
-              <a:t> </a:t>
-            </a:r>
-            <a:r>
-              <a:rPr lang="en-US" sz="2000" dirty="0" err="1" smtClean="0"/>
-              <a:t>requerimientos</a:t>
-            </a:r>
-            <a:r>
-              <a:rPr lang="en-US" sz="2000" dirty="0" smtClean="0"/>
-              <a:t> </a:t>
-            </a:r>
-            <a:r>
-              <a:rPr lang="en-US" sz="2000" dirty="0" err="1" smtClean="0"/>
-              <a:t>funcionales</a:t>
-            </a:r>
-            <a:r>
-              <a:rPr lang="en-US" sz="2000" dirty="0" smtClean="0"/>
-              <a:t/>
+              <a:rPr lang="es-ES_tradnl" sz="2800" dirty="0" smtClean="0"/>
+              <a:t>100% de los requerimientos funcionales</a:t>
             </a:r>
             <a:br>
-              <a:rPr lang="en-US" sz="2000" dirty="0" smtClean="0"/>
+              <a:rPr lang="es-ES_tradnl" sz="2800" dirty="0" smtClean="0"/>
             </a:br>
             <a:r>
-              <a:rPr lang="en-US" sz="2000" dirty="0" smtClean="0"/>
-              <a:t>y no </a:t>
-            </a:r>
-            <a:r>
-              <a:rPr lang="en-US" sz="2000" dirty="0" err="1" smtClean="0"/>
-              <a:t>funcionales</a:t>
-            </a:r>
-            <a:r>
-              <a:rPr lang="en-US" sz="2000" dirty="0" smtClean="0"/>
-              <a:t> </a:t>
-            </a:r>
-            <a:r>
-              <a:rPr lang="en-US" sz="2000" dirty="0" err="1" smtClean="0"/>
-              <a:t>cubiertos</a:t>
-            </a:r>
-            <a:r>
-              <a:rPr lang="en-US" sz="2000" dirty="0" smtClean="0"/>
-              <a:t> </a:t>
-            </a:r>
-            <a:r>
-              <a:rPr lang="en-US" sz="2000" dirty="0" err="1" smtClean="0"/>
-              <a:t>por</a:t>
-            </a:r>
-            <a:r>
-              <a:rPr lang="en-US" sz="2000" dirty="0" smtClean="0"/>
-              <a:t> </a:t>
-            </a:r>
-            <a:r>
-              <a:rPr lang="en-US" sz="2000" dirty="0" err="1" smtClean="0"/>
-              <a:t>casos</a:t>
-            </a:r>
-            <a:r>
-              <a:rPr lang="en-US" sz="2000" dirty="0" smtClean="0"/>
-              <a:t> de </a:t>
-            </a:r>
-            <a:r>
-              <a:rPr lang="en-US" sz="2000" dirty="0" err="1" smtClean="0"/>
-              <a:t>uso</a:t>
-            </a:r>
-            <a:endParaRPr lang="en-US" sz="2000" dirty="0" smtClean="0"/>
-          </a:p>
-          <a:p>
-            <a:r>
-              <a:rPr lang="en-US" sz="2000" dirty="0" smtClean="0"/>
-              <a:t>31 </a:t>
-            </a:r>
-            <a:r>
-              <a:rPr lang="en-US" sz="2000" dirty="0" err="1" smtClean="0"/>
-              <a:t>requerimientos</a:t>
-            </a:r>
-            <a:r>
-              <a:rPr lang="en-US" sz="2000" dirty="0" smtClean="0"/>
-              <a:t> </a:t>
-            </a:r>
-            <a:r>
-              <a:rPr lang="en-US" sz="2000" dirty="0" err="1" smtClean="0"/>
-              <a:t>funcionales</a:t>
-            </a:r>
-            <a:endParaRPr lang="en-US" sz="2000" dirty="0" smtClean="0"/>
-          </a:p>
-          <a:p>
-            <a:r>
-              <a:rPr lang="en-US" sz="2000" dirty="0" smtClean="0"/>
-              <a:t>26 </a:t>
-            </a:r>
-            <a:r>
-              <a:rPr lang="en-US" sz="2000" dirty="0" err="1" smtClean="0"/>
-              <a:t>casos</a:t>
-            </a:r>
-            <a:r>
-              <a:rPr lang="en-US" sz="2000" dirty="0" smtClean="0"/>
-              <a:t> de </a:t>
-            </a:r>
-            <a:r>
-              <a:rPr lang="en-US" sz="2000" dirty="0" err="1" smtClean="0"/>
-              <a:t>uso</a:t>
-            </a:r>
-            <a:endParaRPr lang="en-US" sz="2000" dirty="0"/>
+              <a:rPr lang="es-ES_tradnl" sz="2800" dirty="0" smtClean="0"/>
+              <a:t>y no funcionales cubiertos por casos de uso</a:t>
+            </a:r>
+          </a:p>
+          <a:p>
+            <a:r>
+              <a:rPr lang="es-ES_tradnl" sz="2800" dirty="0" smtClean="0"/>
+              <a:t>31 requerimientos funcionales</a:t>
+            </a:r>
+          </a:p>
+          <a:p>
+            <a:r>
+              <a:rPr lang="es-ES_tradnl" sz="2800" dirty="0" smtClean="0"/>
+              <a:t>26 casos de uso</a:t>
+            </a:r>
+            <a:endParaRPr lang="es-ES_tradnl" sz="2800" dirty="0"/>
           </a:p>
         </p:txBody>
       </p:sp>
@@ -7156,7 +6239,7 @@
         <p:spPr>
           <a:xfrm>
             <a:off x="1261872" y="6284396"/>
-            <a:ext cx="5237331" cy="369332"/>
+            <a:ext cx="5365571" cy="369332"/>
           </a:xfrm>
           <a:prstGeom prst="rect">
             <a:avLst/>
@@ -7170,38 +6253,10 @@
           <a:lstStyle/>
           <a:p>
             <a:r>
-              <a:rPr lang="en-US" dirty="0" smtClean="0"/>
-              <a:t>Fig 2: </a:t>
-            </a:r>
-            <a:r>
-              <a:rPr lang="en-US" dirty="0" err="1" smtClean="0"/>
-              <a:t>Matriz</a:t>
-            </a:r>
-            <a:r>
-              <a:rPr lang="en-US" dirty="0" smtClean="0"/>
-              <a:t> de </a:t>
-            </a:r>
-            <a:r>
-              <a:rPr lang="en-US" dirty="0" err="1" smtClean="0"/>
-              <a:t>requerimientos</a:t>
-            </a:r>
-            <a:r>
-              <a:rPr lang="en-US" dirty="0" smtClean="0"/>
-              <a:t> vs </a:t>
-            </a:r>
-            <a:r>
-              <a:rPr lang="en-US" dirty="0" err="1" smtClean="0"/>
-              <a:t>casos</a:t>
-            </a:r>
-            <a:r>
-              <a:rPr lang="en-US" dirty="0" smtClean="0"/>
-              <a:t> de </a:t>
-            </a:r>
-            <a:r>
-              <a:rPr lang="en-US" dirty="0" err="1" smtClean="0"/>
-              <a:t>uso</a:t>
-            </a:r>
-            <a:endParaRPr lang="en-US" dirty="0"/>
+              <a:rPr lang="es-ES_tradnl" dirty="0" smtClean="0"/>
+              <a:t>Fig.. 2: Matriz de requerimientos vs casos de uso</a:t>
+            </a:r>
+            <a:endParaRPr lang="es-ES_tradnl" dirty="0"/>
           </a:p>
         </p:txBody>
       </p:sp>
@@ -7251,26 +6306,10 @@
           <a:lstStyle/>
           <a:p>
             <a:r>
-              <a:rPr lang="en-US" dirty="0" err="1" smtClean="0"/>
-              <a:t>Matriz</a:t>
-            </a:r>
-            <a:r>
-              <a:rPr lang="en-US" dirty="0" smtClean="0"/>
-              <a:t>: </a:t>
-            </a:r>
-            <a:r>
-              <a:rPr lang="en-US" dirty="0" err="1" smtClean="0"/>
-              <a:t>Requerimientos</a:t>
-            </a:r>
-            <a:r>
-              <a:rPr lang="en-US" dirty="0" smtClean="0"/>
-              <a:t> vs </a:t>
-            </a:r>
-            <a:r>
-              <a:rPr lang="en-US" dirty="0" err="1" smtClean="0"/>
-              <a:t>Clases</a:t>
-            </a:r>
-            <a:endParaRPr lang="en-US" dirty="0"/>
+              <a:rPr lang="es-ES_tradnl" dirty="0" smtClean="0"/>
+              <a:t>Matriz: Requerimientos vs Clases</a:t>
+            </a:r>
+            <a:endParaRPr lang="es-ES_tradnl" dirty="0"/>
           </a:p>
         </p:txBody>
       </p:sp>
@@ -7292,10 +6331,10 @@
           <a:lstStyle/>
           <a:p>
             <a:fld id="{66B77C49-310C-4D67-A641-7D2CCF3E3B8A}" type="slidenum">
-              <a:rPr lang="es-CL" smtClean="0"/>
+              <a:rPr lang="es-ES_tradnl" smtClean="0"/>
               <a:t>8</a:t>
             </a:fld>
-            <a:endParaRPr lang="es-CL"/>
+            <a:endParaRPr lang="es-ES_tradnl" dirty="0"/>
           </a:p>
         </p:txBody>
       </p:sp>
@@ -7337,7 +6376,7 @@
         <p:spPr>
           <a:xfrm>
             <a:off x="7765774" y="2279374"/>
-            <a:ext cx="3188738" cy="1477328"/>
+            <a:ext cx="3188738" cy="3046988"/>
           </a:xfrm>
           <a:prstGeom prst="rect">
             <a:avLst/>
@@ -7351,110 +6390,10 @@
           <a:lstStyle/>
           <a:p>
             <a:r>
-              <a:rPr lang="en-US" dirty="0" smtClean="0"/>
-              <a:t>100% de </a:t>
-            </a:r>
-            <a:r>
-              <a:rPr lang="en-US" dirty="0" err="1" smtClean="0"/>
-              <a:t>los</a:t>
-            </a:r>
-            <a:r>
-              <a:rPr lang="en-US" dirty="0" smtClean="0"/>
-              <a:t> </a:t>
-            </a:r>
-            <a:r>
-              <a:rPr lang="en-US" dirty="0" err="1" smtClean="0"/>
-              <a:t>requerimientos</a:t>
-            </a:r>
-            <a:r>
-              <a:rPr lang="en-US" dirty="0" smtClean="0"/>
-              <a:t> </a:t>
-            </a:r>
-            <a:r>
-              <a:rPr lang="en-US" dirty="0" err="1" smtClean="0"/>
-              <a:t>funcionales</a:t>
-            </a:r>
-            <a:r>
-              <a:rPr lang="en-US" dirty="0" smtClean="0"/>
-              <a:t> </a:t>
-            </a:r>
-            <a:r>
-              <a:rPr lang="en-US" dirty="0" err="1" smtClean="0"/>
-              <a:t>tienen</a:t>
-            </a:r>
-            <a:r>
-              <a:rPr lang="en-US" dirty="0" smtClean="0"/>
-              <a:t> al </a:t>
-            </a:r>
-            <a:r>
-              <a:rPr lang="en-US" dirty="0" err="1" smtClean="0"/>
-              <a:t>menos</a:t>
-            </a:r>
-            <a:r>
-              <a:rPr lang="en-US" dirty="0" smtClean="0"/>
-              <a:t> </a:t>
-            </a:r>
-            <a:r>
-              <a:rPr lang="en-US" dirty="0" err="1" smtClean="0"/>
-              <a:t>una</a:t>
-            </a:r>
-            <a:r>
-              <a:rPr lang="en-US" dirty="0" smtClean="0"/>
-              <a:t> </a:t>
-            </a:r>
-            <a:r>
-              <a:rPr lang="en-US" dirty="0" err="1" smtClean="0"/>
-              <a:t>clase</a:t>
-            </a:r>
-            <a:r>
-              <a:rPr lang="en-US" dirty="0" smtClean="0"/>
-              <a:t> </a:t>
-            </a:r>
-            <a:r>
-              <a:rPr lang="en-US" dirty="0" err="1" smtClean="0"/>
-              <a:t>asociada</a:t>
-            </a:r>
-            <a:r>
-              <a:rPr lang="en-US" dirty="0" smtClean="0"/>
-              <a:t>, </a:t>
-            </a:r>
-            <a:r>
-              <a:rPr lang="en-US" dirty="0" err="1" smtClean="0"/>
-              <a:t>responsable</a:t>
-            </a:r>
-            <a:r>
-              <a:rPr lang="en-US" dirty="0" smtClean="0"/>
-              <a:t> </a:t>
-            </a:r>
-            <a:r>
-              <a:rPr lang="en-US" dirty="0" err="1" smtClean="0"/>
-              <a:t>satisfacer</a:t>
-            </a:r>
-            <a:r>
-              <a:rPr lang="en-US" dirty="0" smtClean="0"/>
-              <a:t> </a:t>
-            </a:r>
-            <a:r>
-              <a:rPr lang="en-US" dirty="0" err="1" smtClean="0"/>
-              <a:t>sus</a:t>
-            </a:r>
-            <a:r>
-              <a:rPr lang="en-US" dirty="0" smtClean="0"/>
-              <a:t> </a:t>
-            </a:r>
-            <a:r>
-              <a:rPr lang="en-US" dirty="0" err="1" smtClean="0"/>
-              <a:t>necesidades</a:t>
-            </a:r>
-            <a:r>
-              <a:rPr lang="en-US" dirty="0" smtClean="0"/>
-              <a:t> </a:t>
-            </a:r>
-            <a:r>
-              <a:rPr lang="en-US" dirty="0" err="1" smtClean="0"/>
-              <a:t>lógicas</a:t>
-            </a:r>
-            <a:endParaRPr lang="en-US" dirty="0" smtClean="0"/>
+              <a:rPr lang="es-ES_tradnl" sz="2400" dirty="0" smtClean="0"/>
+              <a:t>100% de los requerimientos funcionales tienen al menos una clase asociada, responsable satisfacer sus necesidades lógicas</a:t>
+            </a:r>
+            <a:endParaRPr lang="es-ES_tradnl" sz="2400" dirty="0" smtClean="0"/>
           </a:p>
         </p:txBody>
       </p:sp>
@@ -7467,7 +6406,7 @@
         <p:spPr>
           <a:xfrm>
             <a:off x="1259840" y="5770880"/>
-            <a:ext cx="5513048" cy="369332"/>
+            <a:ext cx="5577168" cy="369332"/>
           </a:xfrm>
           <a:prstGeom prst="rect">
             <a:avLst/>
@@ -7481,42 +6420,10 @@
           <a:lstStyle/>
           <a:p>
             <a:r>
-              <a:rPr lang="en-US" dirty="0" smtClean="0"/>
-              <a:t>Fig 3: </a:t>
-            </a:r>
-            <a:r>
-              <a:rPr lang="en-US" dirty="0" err="1" smtClean="0"/>
-              <a:t>matriz</a:t>
-            </a:r>
-            <a:r>
-              <a:rPr lang="en-US" dirty="0" smtClean="0"/>
-              <a:t> de </a:t>
-            </a:r>
-            <a:r>
-              <a:rPr lang="en-US" dirty="0" err="1" smtClean="0"/>
-              <a:t>requerimientos</a:t>
-            </a:r>
-            <a:r>
-              <a:rPr lang="en-US" dirty="0" smtClean="0"/>
-              <a:t> vs </a:t>
-            </a:r>
-            <a:r>
-              <a:rPr lang="en-US" dirty="0" err="1" smtClean="0"/>
-              <a:t>clases</a:t>
-            </a:r>
-            <a:r>
-              <a:rPr lang="en-US" dirty="0" smtClean="0"/>
-              <a:t> (</a:t>
-            </a:r>
-            <a:r>
-              <a:rPr lang="en-US" dirty="0" err="1" smtClean="0"/>
-              <a:t>parcial</a:t>
-            </a:r>
-            <a:r>
-              <a:rPr lang="en-US" dirty="0" smtClean="0"/>
-              <a:t>)</a:t>
-            </a:r>
-            <a:endParaRPr lang="en-US" dirty="0"/>
+              <a:rPr lang="es-ES_tradnl" dirty="0" smtClean="0"/>
+              <a:t>Fig. 3: matriz de requerimientos vs clases (parcial)</a:t>
+            </a:r>
+            <a:endParaRPr lang="es-ES_tradnl" dirty="0"/>
           </a:p>
         </p:txBody>
       </p:sp>

</xml_diff>

<commit_message>
Agregado logo Duoc en todas las diapositivas
</commit_message>
<xml_diff>
--- a/presentación lunes 24 octubre 2016.pptx
+++ b/presentación lunes 24 octubre 2016.pptx
@@ -213,7 +213,7 @@
           <a:p>
             <a:fld id="{5F5A3C90-08A7-4C4F-9765-25EF2ADA2C26}" type="datetimeFigureOut">
               <a:rPr lang="es-CL" smtClean="0"/>
-              <a:t>20-10-16</a:t>
+              <a:t>21-10-2016</a:t>
             </a:fld>
             <a:endParaRPr lang="es-CL"/>
           </a:p>
@@ -372,7 +372,7 @@
           <a:p>
             <a:fld id="{DF2599EA-3C95-46C0-99A8-B5EBCBCDB69B}" type="slidenum">
               <a:rPr lang="es-CL" smtClean="0"/>
-              <a:t>‹#›</a:t>
+              <a:t>‹Nº›</a:t>
             </a:fld>
             <a:endParaRPr lang="es-CL"/>
           </a:p>
@@ -675,7 +675,7 @@
           <a:p>
             <a:fld id="{89E5C9D5-1059-417C-933B-079D684B6386}" type="datetime1">
               <a:rPr lang="es-CL" smtClean="0"/>
-              <a:t>20-10-16</a:t>
+              <a:t>21-10-2016</a:t>
             </a:fld>
             <a:endParaRPr lang="es-CL"/>
           </a:p>
@@ -717,7 +717,7 @@
           <a:p>
             <a:fld id="{66B77C49-310C-4D67-A641-7D2CCF3E3B8A}" type="slidenum">
               <a:rPr lang="es-CL" smtClean="0"/>
-              <a:t>‹#›</a:t>
+              <a:t>‹Nº›</a:t>
             </a:fld>
             <a:endParaRPr lang="es-CL"/>
           </a:p>
@@ -845,7 +845,7 @@
           <a:p>
             <a:fld id="{A8720E4C-398C-460E-BAB2-2CA54AE1728D}" type="datetime1">
               <a:rPr lang="es-CL" smtClean="0"/>
-              <a:t>20-10-16</a:t>
+              <a:t>21-10-2016</a:t>
             </a:fld>
             <a:endParaRPr lang="es-CL"/>
           </a:p>
@@ -887,7 +887,7 @@
           <a:p>
             <a:fld id="{66B77C49-310C-4D67-A641-7D2CCF3E3B8A}" type="slidenum">
               <a:rPr lang="es-CL" smtClean="0"/>
-              <a:t>‹#›</a:t>
+              <a:t>‹Nº›</a:t>
             </a:fld>
             <a:endParaRPr lang="es-CL"/>
           </a:p>
@@ -1066,7 +1066,7 @@
           <a:p>
             <a:fld id="{43E203C6-1909-4781-971E-116AFD440A10}" type="datetime1">
               <a:rPr lang="es-CL" smtClean="0"/>
-              <a:t>20-10-16</a:t>
+              <a:t>21-10-2016</a:t>
             </a:fld>
             <a:endParaRPr lang="es-CL"/>
           </a:p>
@@ -1108,7 +1108,7 @@
           <a:p>
             <a:fld id="{66B77C49-310C-4D67-A641-7D2CCF3E3B8A}" type="slidenum">
               <a:rPr lang="es-CL" smtClean="0"/>
-              <a:t>‹#›</a:t>
+              <a:t>‹Nº›</a:t>
             </a:fld>
             <a:endParaRPr lang="es-CL"/>
           </a:p>
@@ -1277,7 +1277,7 @@
           <a:p>
             <a:fld id="{154DED30-8343-49F5-A66D-C88BB0DF3F98}" type="datetime1">
               <a:rPr lang="es-CL" smtClean="0"/>
-              <a:t>20-10-16</a:t>
+              <a:t>21-10-2016</a:t>
             </a:fld>
             <a:endParaRPr lang="es-CL"/>
           </a:p>
@@ -1319,7 +1319,7 @@
           <a:p>
             <a:fld id="{66B77C49-310C-4D67-A641-7D2CCF3E3B8A}" type="slidenum">
               <a:rPr lang="es-CL" smtClean="0"/>
-              <a:t>‹#›</a:t>
+              <a:t>‹Nº›</a:t>
             </a:fld>
             <a:endParaRPr lang="es-CL"/>
           </a:p>
@@ -1572,7 +1572,7 @@
           <a:p>
             <a:fld id="{008ECD7B-FFF3-4FF8-AAE9-DF516B8429F0}" type="datetime1">
               <a:rPr lang="es-CL" smtClean="0"/>
-              <a:t>20-10-16</a:t>
+              <a:t>21-10-2016</a:t>
             </a:fld>
             <a:endParaRPr lang="es-CL"/>
           </a:p>
@@ -1614,7 +1614,7 @@
           <a:p>
             <a:fld id="{66B77C49-310C-4D67-A641-7D2CCF3E3B8A}" type="slidenum">
               <a:rPr lang="es-CL" smtClean="0"/>
-              <a:t>‹#›</a:t>
+              <a:t>‹Nº›</a:t>
             </a:fld>
             <a:endParaRPr lang="es-CL"/>
           </a:p>
@@ -1901,7 +1901,7 @@
           <a:p>
             <a:fld id="{BE1B6FD1-7923-4D70-9EDC-F33CED2E88B0}" type="datetime1">
               <a:rPr lang="es-CL" smtClean="0"/>
-              <a:t>20-10-16</a:t>
+              <a:t>21-10-2016</a:t>
             </a:fld>
             <a:endParaRPr lang="es-CL"/>
           </a:p>
@@ -1943,7 +1943,7 @@
           <a:p>
             <a:fld id="{66B77C49-310C-4D67-A641-7D2CCF3E3B8A}" type="slidenum">
               <a:rPr lang="es-CL" smtClean="0"/>
-              <a:t>‹#›</a:t>
+              <a:t>‹Nº›</a:t>
             </a:fld>
             <a:endParaRPr lang="es-CL"/>
           </a:p>
@@ -2393,7 +2393,7 @@
           <a:p>
             <a:fld id="{A0456DFA-3945-4E01-A82F-05D34E7C69EF}" type="datetime1">
               <a:rPr lang="es-CL" smtClean="0"/>
-              <a:t>20-10-16</a:t>
+              <a:t>21-10-2016</a:t>
             </a:fld>
             <a:endParaRPr lang="es-CL"/>
           </a:p>
@@ -2435,7 +2435,7 @@
           <a:p>
             <a:fld id="{66B77C49-310C-4D67-A641-7D2CCF3E3B8A}" type="slidenum">
               <a:rPr lang="es-CL" smtClean="0"/>
-              <a:t>‹#›</a:t>
+              <a:t>‹Nº›</a:t>
             </a:fld>
             <a:endParaRPr lang="es-CL"/>
           </a:p>
@@ -2552,7 +2552,7 @@
           <a:p>
             <a:fld id="{557C4F69-2838-42FA-8DBD-EC78C746AC4D}" type="datetime1">
               <a:rPr lang="es-CL" smtClean="0"/>
-              <a:t>20-10-16</a:t>
+              <a:t>21-10-2016</a:t>
             </a:fld>
             <a:endParaRPr lang="es-CL"/>
           </a:p>
@@ -2594,7 +2594,7 @@
           <a:p>
             <a:fld id="{66B77C49-310C-4D67-A641-7D2CCF3E3B8A}" type="slidenum">
               <a:rPr lang="es-CL" smtClean="0"/>
-              <a:t>‹#›</a:t>
+              <a:t>‹Nº›</a:t>
             </a:fld>
             <a:endParaRPr lang="es-CL"/>
           </a:p>
@@ -2688,7 +2688,7 @@
           <a:p>
             <a:fld id="{07EEB1EE-80D2-40B9-84CD-27545A9BFEA4}" type="datetime1">
               <a:rPr lang="es-CL" smtClean="0"/>
-              <a:t>20-10-16</a:t>
+              <a:t>21-10-2016</a:t>
             </a:fld>
             <a:endParaRPr lang="es-CL"/>
           </a:p>
@@ -2730,7 +2730,7 @@
           <a:p>
             <a:fld id="{66B77C49-310C-4D67-A641-7D2CCF3E3B8A}" type="slidenum">
               <a:rPr lang="es-CL" smtClean="0"/>
-              <a:t>‹#›</a:t>
+              <a:t>‹Nº›</a:t>
             </a:fld>
             <a:endParaRPr lang="es-CL"/>
           </a:p>
@@ -3016,7 +3016,7 @@
           <a:p>
             <a:fld id="{D8391AB1-5E7F-4428-BF74-71643B6F22AD}" type="datetime1">
               <a:rPr lang="es-CL" smtClean="0"/>
-              <a:t>20-10-16</a:t>
+              <a:t>21-10-2016</a:t>
             </a:fld>
             <a:endParaRPr lang="es-CL"/>
           </a:p>
@@ -3058,7 +3058,7 @@
           <a:p>
             <a:fld id="{66B77C49-310C-4D67-A641-7D2CCF3E3B8A}" type="slidenum">
               <a:rPr lang="es-CL" smtClean="0"/>
-              <a:t>‹#›</a:t>
+              <a:t>‹Nº›</a:t>
             </a:fld>
             <a:endParaRPr lang="es-CL"/>
           </a:p>
@@ -3331,7 +3331,7 @@
           <a:p>
             <a:fld id="{8E766E1C-99D9-459A-8191-EBC25BE06DF5}" type="datetime1">
               <a:rPr lang="es-CL" smtClean="0"/>
-              <a:t>20-10-16</a:t>
+              <a:t>21-10-2016</a:t>
             </a:fld>
             <a:endParaRPr lang="es-CL"/>
           </a:p>
@@ -3373,7 +3373,7 @@
           <a:p>
             <a:fld id="{66B77C49-310C-4D67-A641-7D2CCF3E3B8A}" type="slidenum">
               <a:rPr lang="es-CL" smtClean="0"/>
-              <a:t>‹#›</a:t>
+              <a:t>‹Nº›</a:t>
             </a:fld>
             <a:endParaRPr lang="es-CL"/>
           </a:p>
@@ -3583,7 +3583,7 @@
           <a:p>
             <a:fld id="{9FB8A2EC-9F2E-49B3-BC1D-41B8951AFF83}" type="datetime1">
               <a:rPr lang="es-CL" smtClean="0"/>
-              <a:t>20-10-16</a:t>
+              <a:t>21-10-2016</a:t>
             </a:fld>
             <a:endParaRPr lang="es-CL"/>
           </a:p>
@@ -3666,7 +3666,7 @@
           <a:p>
             <a:fld id="{66B77C49-310C-4D67-A641-7D2CCF3E3B8A}" type="slidenum">
               <a:rPr lang="es-CL" smtClean="0"/>
-              <a:t>‹#›</a:t>
+              <a:t>‹Nº›</a:t>
             </a:fld>
             <a:endParaRPr lang="es-CL"/>
           </a:p>
@@ -4094,7 +4094,7 @@
         </p:spPr>
         <p:txBody>
           <a:bodyPr>
-            <a:normAutofit fontScale="90000"/>
+            <a:normAutofit/>
           </a:bodyPr>
           <a:lstStyle/>
           <a:p>
@@ -4125,7 +4125,7 @@
           <a:p>
             <a:pPr algn="r"/>
             <a:r>
-              <a:rPr lang="es-CL">
+              <a:rPr lang="es-CL" dirty="0">
                 <a:solidFill>
                   <a:schemeClr val="tx2">
                     <a:lumMod val="75000"/>
@@ -4138,29 +4138,53 @@
           <a:p>
             <a:pPr algn="r"/>
             <a:r>
+              <a:rPr lang="es-CL" dirty="0">
+                <a:solidFill>
+                  <a:schemeClr val="tx1"/>
+                </a:solidFill>
+              </a:rPr>
+              <a:t>Docente: Vicente Aranda</a:t>
+            </a:r>
+          </a:p>
+          <a:p>
+            <a:pPr algn="r"/>
+            <a:r>
+              <a:rPr lang="es-CL" dirty="0">
+                <a:solidFill>
+                  <a:schemeClr val="tx1"/>
+                </a:solidFill>
+              </a:rPr>
+              <a:t>Alumnos</a:t>
+            </a:r>
+            <a:r>
               <a:rPr lang="es-CL">
                 <a:solidFill>
                   <a:schemeClr val="tx1"/>
                 </a:solidFill>
               </a:rPr>
-              <a:t>Docente: Vicente Aranda</a:t>
-            </a:r>
-          </a:p>
-          <a:p>
-            <a:pPr algn="r"/>
-            <a:r>
-              <a:rPr lang="es-CL">
+              <a:t>: </a:t>
+            </a:r>
+            <a:r>
+              <a:rPr lang="es-CL" smtClean="0">
                 <a:solidFill>
                   <a:schemeClr val="tx1"/>
                 </a:solidFill>
               </a:rPr>
-              <a:t>Alumnos: Elias Baeza, Pablo de la Sotta, </a:t>
+              <a:t>Elías </a:t>
+            </a:r>
+            <a:r>
+              <a:rPr lang="es-CL" dirty="0">
+                <a:solidFill>
+                  <a:schemeClr val="tx1"/>
+                </a:solidFill>
+              </a:rPr>
+              <a:t>Baeza, Pablo de la Sotta, </a:t>
             </a:r>
           </a:p>
           <a:p>
             <a:pPr algn="r"/>
             <a:r>
-              <a:rPr lang="es-CL">
+              <a:rPr lang="es-CL" dirty="0">
                 <a:solidFill>
                   <a:schemeClr val="tx1"/>
                 </a:solidFill>
@@ -4325,6 +4349,45 @@
           </a:p>
         </p:txBody>
       </p:sp>
+      <p:pic>
+        <p:nvPicPr>
+          <p:cNvPr id="5" name="Picture 2" descr="Resultado de imagen para duoc"/>
+          <p:cNvPicPr>
+            <a:picLocks noChangeAspect="1" noChangeArrowheads="1"/>
+          </p:cNvPicPr>
+          <p:nvPr/>
+        </p:nvPicPr>
+        <p:blipFill rotWithShape="1">
+          <a:blip r:embed="rId2">
+            <a:extLst>
+              <a:ext uri="{28A0092B-C50C-407E-A947-70E740481C1C}">
+                <a14:useLocalDpi xmlns:a14="http://schemas.microsoft.com/office/drawing/2010/main" val="0"/>
+              </a:ext>
+            </a:extLst>
+          </a:blip>
+          <a:srcRect t="13892" r="19022"/>
+          <a:stretch/>
+        </p:blipFill>
+        <p:spPr bwMode="auto">
+          <a:xfrm>
+            <a:off x="9023169" y="378822"/>
+            <a:ext cx="2001883" cy="524910"/>
+          </a:xfrm>
+          <a:prstGeom prst="rect">
+            <a:avLst/>
+          </a:prstGeom>
+          <a:noFill/>
+          <a:extLst>
+            <a:ext uri="{909E8E84-426E-40DD-AFC4-6F175D3DCCD1}">
+              <a14:hiddenFill xmlns:a14="http://schemas.microsoft.com/office/drawing/2010/main">
+                <a:solidFill>
+                  <a:srgbClr val="FFFFFF"/>
+                </a:solidFill>
+              </a14:hiddenFill>
+            </a:ext>
+          </a:extLst>
+        </p:spPr>
+      </p:pic>
     </p:spTree>
     <p:extLst>
       <p:ext uri="{BB962C8B-B14F-4D97-AF65-F5344CB8AC3E}">
@@ -4335,6 +4398,13 @@
   <p:clrMapOvr>
     <a:masterClrMapping/>
   </p:clrMapOvr>
+  <p:timing>
+    <p:tnLst>
+      <p:par>
+        <p:cTn id="1" dur="indefinite" restart="never" nodeType="tmRoot"/>
+      </p:par>
+    </p:tnLst>
+  </p:timing>
 </p:sld>
 </file>
 
@@ -4404,33 +4474,51 @@
             <a:pPr lvl="1"/>
             <a:r>
               <a:rPr lang="es-ES_tradnl" sz="4000" dirty="0" smtClean="0"/>
-              <a:t>cmh.lib.dal</a:t>
+              <a:t>cmh.lib.dal: </a:t>
             </a:r>
             <a:r>
               <a:rPr lang="es-ES_tradnl" sz="4000" dirty="0" smtClean="0"/>
-              <a:t>: persistencia</a:t>
-            </a:r>
+              <a:t>Persistencia.</a:t>
+            </a:r>
+            <a:endParaRPr lang="es-ES_tradnl" sz="4000" dirty="0" smtClean="0"/>
           </a:p>
           <a:p>
             <a:pPr lvl="1"/>
             <a:r>
               <a:rPr lang="es-ES_tradnl" sz="4000" dirty="0" smtClean="0"/>
-              <a:t>cmh.webapp.bl</a:t>
+              <a:t>cmh.webapp.bl: </a:t>
             </a:r>
             <a:r>
               <a:rPr lang="es-ES_tradnl" sz="4000" dirty="0" smtClean="0"/>
-              <a:t>: lógica de negocios</a:t>
-            </a:r>
+              <a:t>Lógica </a:t>
+            </a:r>
+            <a:r>
+              <a:rPr lang="es-ES_tradnl" sz="4000" dirty="0" smtClean="0"/>
+              <a:t>de </a:t>
+            </a:r>
+            <a:r>
+              <a:rPr lang="es-ES_tradnl" sz="4000" dirty="0" smtClean="0"/>
+              <a:t>negocios.</a:t>
+            </a:r>
+            <a:endParaRPr lang="es-ES_tradnl" sz="4000" dirty="0" smtClean="0"/>
           </a:p>
           <a:p>
             <a:pPr lvl="1"/>
             <a:r>
               <a:rPr lang="es-ES_tradnl" sz="4000" dirty="0" smtClean="0"/>
-              <a:t>cmh.servpago</a:t>
+              <a:t>cmh.servpago: </a:t>
             </a:r>
             <a:r>
               <a:rPr lang="es-ES_tradnl" sz="4000" dirty="0" smtClean="0"/>
-              <a:t>: servicio de pago automático</a:t>
+              <a:t>Servicio </a:t>
+            </a:r>
+            <a:r>
+              <a:rPr lang="es-ES_tradnl" sz="4000" dirty="0" smtClean="0"/>
+              <a:t>de pago </a:t>
+            </a:r>
+            <a:r>
+              <a:rPr lang="es-ES_tradnl" sz="4000" dirty="0" smtClean="0"/>
+              <a:t>automático.</a:t>
             </a:r>
             <a:endParaRPr lang="es-ES_tradnl" sz="4000" dirty="0"/>
           </a:p>
@@ -4461,6 +4549,45 @@
           </a:p>
         </p:txBody>
       </p:sp>
+      <p:pic>
+        <p:nvPicPr>
+          <p:cNvPr id="5" name="Picture 2" descr="Resultado de imagen para duoc"/>
+          <p:cNvPicPr>
+            <a:picLocks noChangeAspect="1" noChangeArrowheads="1"/>
+          </p:cNvPicPr>
+          <p:nvPr/>
+        </p:nvPicPr>
+        <p:blipFill rotWithShape="1">
+          <a:blip r:embed="rId2">
+            <a:extLst>
+              <a:ext uri="{28A0092B-C50C-407E-A947-70E740481C1C}">
+                <a14:useLocalDpi xmlns:a14="http://schemas.microsoft.com/office/drawing/2010/main" val="0"/>
+              </a:ext>
+            </a:extLst>
+          </a:blip>
+          <a:srcRect t="13892" r="19022"/>
+          <a:stretch/>
+        </p:blipFill>
+        <p:spPr bwMode="auto">
+          <a:xfrm>
+            <a:off x="9023169" y="378822"/>
+            <a:ext cx="2001883" cy="524910"/>
+          </a:xfrm>
+          <a:prstGeom prst="rect">
+            <a:avLst/>
+          </a:prstGeom>
+          <a:noFill/>
+          <a:extLst>
+            <a:ext uri="{909E8E84-426E-40DD-AFC4-6F175D3DCCD1}">
+              <a14:hiddenFill xmlns:a14="http://schemas.microsoft.com/office/drawing/2010/main">
+                <a:solidFill>
+                  <a:srgbClr val="FFFFFF"/>
+                </a:solidFill>
+              </a14:hiddenFill>
+            </a:ext>
+          </a:extLst>
+        </p:spPr>
+      </p:pic>
     </p:spTree>
     <p:extLst>
       <p:ext uri="{BB962C8B-B14F-4D97-AF65-F5344CB8AC3E}">
@@ -4471,6 +4598,13 @@
   <p:clrMapOvr>
     <a:masterClrMapping/>
   </p:clrMapOvr>
+  <p:timing>
+    <p:tnLst>
+      <p:par>
+        <p:cTn id="1" dur="indefinite" restart="never" nodeType="tmRoot"/>
+      </p:par>
+    </p:tnLst>
+  </p:timing>
 </p:sld>
 </file>
 
@@ -4540,51 +4674,60 @@
             <a:pPr lvl="1"/>
             <a:r>
               <a:rPr lang="es-ES_tradnl" sz="3600" dirty="0" smtClean="0"/>
-              <a:t>CMH.Terminal.DAL</a:t>
+              <a:t>CMH.Terminal.DAL: </a:t>
             </a:r>
             <a:r>
               <a:rPr lang="es-ES_tradnl" sz="3600" dirty="0" smtClean="0"/>
-              <a:t>: persistencia </a:t>
+              <a:t>Persistencia </a:t>
+            </a:r>
+            <a:r>
+              <a:rPr lang="es-ES_tradnl" sz="3600" dirty="0" err="1" smtClean="0"/>
+              <a:t>Entity</a:t>
             </a:r>
             <a:r>
               <a:rPr lang="es-ES_tradnl" sz="3600" dirty="0" smtClean="0"/>
-              <a:t>Entity</a:t>
+              <a:t> </a:t>
             </a:r>
             <a:r>
               <a:rPr lang="es-ES_tradnl" sz="3600" dirty="0" smtClean="0"/>
-              <a:t> Framework</a:t>
-            </a:r>
+              <a:t>Framework.</a:t>
+            </a:r>
+            <a:endParaRPr lang="es-ES_tradnl" sz="3600" dirty="0" smtClean="0"/>
           </a:p>
           <a:p>
             <a:pPr lvl="1"/>
             <a:r>
               <a:rPr lang="es-ES_tradnl" sz="3600" dirty="0" smtClean="0"/>
-              <a:t>CMH.Terminal.BL</a:t>
+              <a:t>CMH.Terminal.BL: </a:t>
             </a:r>
             <a:r>
               <a:rPr lang="es-ES_tradnl" sz="3600" dirty="0" smtClean="0"/>
-              <a:t>: lógica de negocios del terminal</a:t>
-            </a:r>
+              <a:t>Lógica </a:t>
+            </a:r>
+            <a:r>
+              <a:rPr lang="es-ES_tradnl" sz="3600" dirty="0" smtClean="0"/>
+              <a:t>de negocios del </a:t>
+            </a:r>
+            <a:r>
+              <a:rPr lang="es-ES_tradnl" sz="3600" dirty="0" smtClean="0"/>
+              <a:t>terminal.</a:t>
+            </a:r>
+            <a:endParaRPr lang="es-ES_tradnl" sz="3600" dirty="0" smtClean="0"/>
           </a:p>
           <a:p>
             <a:pPr lvl="1"/>
             <a:r>
               <a:rPr lang="es-ES_tradnl" sz="3600" dirty="0" smtClean="0"/>
-              <a:t>CMH.Seguro</a:t>
+              <a:t>CMH.Seguro: </a:t>
             </a:r>
             <a:r>
               <a:rPr lang="es-ES_tradnl" sz="3600" dirty="0" smtClean="0"/>
-              <a:t>: persistencia, lógica de negocios e implementación de web </a:t>
+              <a:t>Persistencia</a:t>
             </a:r>
             <a:r>
               <a:rPr lang="es-ES_tradnl" sz="3600" dirty="0" smtClean="0"/>
-              <a:t>service</a:t>
-            </a:r>
-            <a:r>
-              <a:rPr lang="es-ES_tradnl" sz="3600" dirty="0" smtClean="0"/>
-              <a:t>.</a:t>
-            </a:r>
-            <a:endParaRPr lang="es-ES_tradnl" sz="3600" dirty="0" smtClean="0"/>
+              <a:t>, lógica de negocios e implementación de web service.</a:t>
+            </a:r>
           </a:p>
         </p:txBody>
       </p:sp>
@@ -4613,6 +4756,45 @@
           </a:p>
         </p:txBody>
       </p:sp>
+      <p:pic>
+        <p:nvPicPr>
+          <p:cNvPr id="5" name="Picture 2" descr="Resultado de imagen para duoc"/>
+          <p:cNvPicPr>
+            <a:picLocks noChangeAspect="1" noChangeArrowheads="1"/>
+          </p:cNvPicPr>
+          <p:nvPr/>
+        </p:nvPicPr>
+        <p:blipFill rotWithShape="1">
+          <a:blip r:embed="rId2">
+            <a:extLst>
+              <a:ext uri="{28A0092B-C50C-407E-A947-70E740481C1C}">
+                <a14:useLocalDpi xmlns:a14="http://schemas.microsoft.com/office/drawing/2010/main" val="0"/>
+              </a:ext>
+            </a:extLst>
+          </a:blip>
+          <a:srcRect t="13892" r="19022"/>
+          <a:stretch/>
+        </p:blipFill>
+        <p:spPr bwMode="auto">
+          <a:xfrm>
+            <a:off x="9023169" y="378822"/>
+            <a:ext cx="2001883" cy="524910"/>
+          </a:xfrm>
+          <a:prstGeom prst="rect">
+            <a:avLst/>
+          </a:prstGeom>
+          <a:noFill/>
+          <a:extLst>
+            <a:ext uri="{909E8E84-426E-40DD-AFC4-6F175D3DCCD1}">
+              <a14:hiddenFill xmlns:a14="http://schemas.microsoft.com/office/drawing/2010/main">
+                <a:solidFill>
+                  <a:srgbClr val="FFFFFF"/>
+                </a:solidFill>
+              </a14:hiddenFill>
+            </a:ext>
+          </a:extLst>
+        </p:spPr>
+      </p:pic>
     </p:spTree>
     <p:extLst>
       <p:ext uri="{BB962C8B-B14F-4D97-AF65-F5344CB8AC3E}">
@@ -4623,6 +4805,13 @@
   <p:clrMapOvr>
     <a:masterClrMapping/>
   </p:clrMapOvr>
+  <p:timing>
+    <p:tnLst>
+      <p:par>
+        <p:cTn id="1" dur="indefinite" restart="never" nodeType="tmRoot"/>
+      </p:par>
+    </p:tnLst>
+  </p:timing>
 </p:sld>
 </file>
 
@@ -4716,8 +4905,13 @@
             </a:pPr>
             <a:r>
               <a:rPr lang="es-ES_tradnl" sz="4400" dirty="0" smtClean="0"/>
-              <a:t>CMH – 27 tablas</a:t>
-            </a:r>
+              <a:t>CMH – 27 </a:t>
+            </a:r>
+            <a:r>
+              <a:rPr lang="es-ES_tradnl" sz="4400" dirty="0" smtClean="0"/>
+              <a:t>tablas.</a:t>
+            </a:r>
+            <a:endParaRPr lang="es-ES_tradnl" sz="4400" dirty="0" smtClean="0"/>
           </a:p>
           <a:p>
             <a:pPr lvl="1">
@@ -4734,8 +4928,13 @@
             </a:pPr>
             <a:r>
               <a:rPr lang="es-ES_tradnl" sz="4400" dirty="0" smtClean="0"/>
-              <a:t>Seguros – 6 tablas</a:t>
-            </a:r>
+              <a:t>Seguros – 6 </a:t>
+            </a:r>
+            <a:r>
+              <a:rPr lang="es-ES_tradnl" sz="4400" dirty="0" smtClean="0"/>
+              <a:t>tablas.</a:t>
+            </a:r>
+            <a:endParaRPr lang="es-ES_tradnl" sz="4400" dirty="0" smtClean="0"/>
           </a:p>
           <a:p>
             <a:pPr>
@@ -4767,7 +4966,11 @@
             </a:pPr>
             <a:r>
               <a:rPr lang="es-ES_tradnl" sz="4400" dirty="0" smtClean="0"/>
-              <a:t>Cubren 100% de los casos de uso</a:t>
+              <a:t>Cubren 100% de los casos de </a:t>
+            </a:r>
+            <a:r>
+              <a:rPr lang="es-ES_tradnl" sz="4400" dirty="0" smtClean="0"/>
+              <a:t>uso.</a:t>
             </a:r>
             <a:endParaRPr lang="es-ES_tradnl" sz="4400" dirty="0"/>
           </a:p>
@@ -4798,6 +5001,45 @@
           </a:p>
         </p:txBody>
       </p:sp>
+      <p:pic>
+        <p:nvPicPr>
+          <p:cNvPr id="5" name="Picture 2" descr="Resultado de imagen para duoc"/>
+          <p:cNvPicPr>
+            <a:picLocks noChangeAspect="1" noChangeArrowheads="1"/>
+          </p:cNvPicPr>
+          <p:nvPr/>
+        </p:nvPicPr>
+        <p:blipFill rotWithShape="1">
+          <a:blip r:embed="rId2">
+            <a:extLst>
+              <a:ext uri="{28A0092B-C50C-407E-A947-70E740481C1C}">
+                <a14:useLocalDpi xmlns:a14="http://schemas.microsoft.com/office/drawing/2010/main" val="0"/>
+              </a:ext>
+            </a:extLst>
+          </a:blip>
+          <a:srcRect t="13892" r="19022"/>
+          <a:stretch/>
+        </p:blipFill>
+        <p:spPr bwMode="auto">
+          <a:xfrm>
+            <a:off x="9023169" y="378822"/>
+            <a:ext cx="2001883" cy="524910"/>
+          </a:xfrm>
+          <a:prstGeom prst="rect">
+            <a:avLst/>
+          </a:prstGeom>
+          <a:noFill/>
+          <a:extLst>
+            <a:ext uri="{909E8E84-426E-40DD-AFC4-6F175D3DCCD1}">
+              <a14:hiddenFill xmlns:a14="http://schemas.microsoft.com/office/drawing/2010/main">
+                <a:solidFill>
+                  <a:srgbClr val="FFFFFF"/>
+                </a:solidFill>
+              </a14:hiddenFill>
+            </a:ext>
+          </a:extLst>
+        </p:spPr>
+      </p:pic>
     </p:spTree>
     <p:extLst>
       <p:ext uri="{BB962C8B-B14F-4D97-AF65-F5344CB8AC3E}">
@@ -4808,6 +5050,13 @@
   <p:clrMapOvr>
     <a:masterClrMapping/>
   </p:clrMapOvr>
+  <p:timing>
+    <p:tnLst>
+      <p:par>
+        <p:cTn id="1" dur="indefinite" restart="never" nodeType="tmRoot"/>
+      </p:par>
+    </p:tnLst>
+  </p:timing>
 </p:sld>
 </file>
 
@@ -4865,7 +5114,7 @@
           </p:nvPr>
         </p:nvPicPr>
         <p:blipFill>
-          <a:blip r:embed="rId2">
+          <a:blip r:embed="rId2" cstate="print">
             <a:extLst>
               <a:ext uri="{28A0092B-C50C-407E-A947-70E740481C1C}">
                 <a14:useLocalDpi xmlns:a14="http://schemas.microsoft.com/office/drawing/2010/main" val="0"/>
@@ -4917,7 +5166,7 @@
         <p:spPr>
           <a:xfrm>
             <a:off x="3063988" y="6099730"/>
-            <a:ext cx="5338321" cy="369332"/>
+            <a:ext cx="5402441" cy="369332"/>
           </a:xfrm>
           <a:prstGeom prst="rect">
             <a:avLst/>
@@ -4932,12 +5181,55 @@
           <a:p>
             <a:r>
               <a:rPr lang="es-ES_tradnl" dirty="0" smtClean="0"/>
-              <a:t>Fig. 4: modelo de datos de la base de datos CMH</a:t>
+              <a:t>Fig. 4: modelo de datos de la base de datos </a:t>
+            </a:r>
+            <a:r>
+              <a:rPr lang="es-ES_tradnl" dirty="0" smtClean="0"/>
+              <a:t>CMH.</a:t>
             </a:r>
             <a:endParaRPr lang="es-ES_tradnl" dirty="0" smtClean="0"/>
           </a:p>
         </p:txBody>
       </p:sp>
+      <p:pic>
+        <p:nvPicPr>
+          <p:cNvPr id="6" name="Picture 2" descr="Resultado de imagen para duoc"/>
+          <p:cNvPicPr>
+            <a:picLocks noChangeAspect="1" noChangeArrowheads="1"/>
+          </p:cNvPicPr>
+          <p:nvPr/>
+        </p:nvPicPr>
+        <p:blipFill rotWithShape="1">
+          <a:blip r:embed="rId3">
+            <a:extLst>
+              <a:ext uri="{28A0092B-C50C-407E-A947-70E740481C1C}">
+                <a14:useLocalDpi xmlns:a14="http://schemas.microsoft.com/office/drawing/2010/main" val="0"/>
+              </a:ext>
+            </a:extLst>
+          </a:blip>
+          <a:srcRect t="13892" r="19022"/>
+          <a:stretch/>
+        </p:blipFill>
+        <p:spPr bwMode="auto">
+          <a:xfrm>
+            <a:off x="9023169" y="378822"/>
+            <a:ext cx="2001883" cy="524910"/>
+          </a:xfrm>
+          <a:prstGeom prst="rect">
+            <a:avLst/>
+          </a:prstGeom>
+          <a:noFill/>
+          <a:extLst>
+            <a:ext uri="{909E8E84-426E-40DD-AFC4-6F175D3DCCD1}">
+              <a14:hiddenFill xmlns:a14="http://schemas.microsoft.com/office/drawing/2010/main">
+                <a:solidFill>
+                  <a:srgbClr val="FFFFFF"/>
+                </a:solidFill>
+              </a14:hiddenFill>
+            </a:ext>
+          </a:extLst>
+        </p:spPr>
+      </p:pic>
     </p:spTree>
     <p:extLst>
       <p:ext uri="{BB962C8B-B14F-4D97-AF65-F5344CB8AC3E}">
@@ -4948,6 +5240,13 @@
   <p:clrMapOvr>
     <a:masterClrMapping/>
   </p:clrMapOvr>
+  <p:timing>
+    <p:tnLst>
+      <p:par>
+        <p:cTn id="1" dur="indefinite" restart="never" nodeType="tmRoot"/>
+      </p:par>
+    </p:tnLst>
+  </p:timing>
 </p:sld>
 </file>
 
@@ -5070,20 +5369,51 @@
           <a:p>
             <a:r>
               <a:rPr lang="es-ES_tradnl" dirty="0" smtClean="0"/>
-              <a:t>Fig. 5: Modelo de datos del web </a:t>
-            </a:r>
-            <a:r>
-              <a:rPr lang="es-ES_tradnl" dirty="0" smtClean="0"/>
-              <a:t>service</a:t>
-            </a:r>
-            <a:r>
-              <a:rPr lang="es-ES_tradnl" dirty="0" smtClean="0"/>
-              <a:t> aseguradora.</a:t>
+              <a:t>Fig. 5: Modelo de datos del web service aseguradora.</a:t>
             </a:r>
             <a:endParaRPr lang="es-ES_tradnl" dirty="0"/>
           </a:p>
         </p:txBody>
       </p:sp>
+      <p:pic>
+        <p:nvPicPr>
+          <p:cNvPr id="6" name="Picture 2" descr="Resultado de imagen para duoc"/>
+          <p:cNvPicPr>
+            <a:picLocks noChangeAspect="1" noChangeArrowheads="1"/>
+          </p:cNvPicPr>
+          <p:nvPr/>
+        </p:nvPicPr>
+        <p:blipFill rotWithShape="1">
+          <a:blip r:embed="rId3">
+            <a:extLst>
+              <a:ext uri="{28A0092B-C50C-407E-A947-70E740481C1C}">
+                <a14:useLocalDpi xmlns:a14="http://schemas.microsoft.com/office/drawing/2010/main" val="0"/>
+              </a:ext>
+            </a:extLst>
+          </a:blip>
+          <a:srcRect t="13892" r="19022"/>
+          <a:stretch/>
+        </p:blipFill>
+        <p:spPr bwMode="auto">
+          <a:xfrm>
+            <a:off x="9023169" y="378822"/>
+            <a:ext cx="2001883" cy="524910"/>
+          </a:xfrm>
+          <a:prstGeom prst="rect">
+            <a:avLst/>
+          </a:prstGeom>
+          <a:noFill/>
+          <a:extLst>
+            <a:ext uri="{909E8E84-426E-40DD-AFC4-6F175D3DCCD1}">
+              <a14:hiddenFill xmlns:a14="http://schemas.microsoft.com/office/drawing/2010/main">
+                <a:solidFill>
+                  <a:srgbClr val="FFFFFF"/>
+                </a:solidFill>
+              </a14:hiddenFill>
+            </a:ext>
+          </a:extLst>
+        </p:spPr>
+      </p:pic>
     </p:spTree>
     <p:extLst>
       <p:ext uri="{BB962C8B-B14F-4D97-AF65-F5344CB8AC3E}">
@@ -5094,6 +5424,13 @@
   <p:clrMapOvr>
     <a:masterClrMapping/>
   </p:clrMapOvr>
+  <p:timing>
+    <p:tnLst>
+      <p:par>
+        <p:cTn id="1" dur="indefinite" restart="never" nodeType="tmRoot"/>
+      </p:par>
+    </p:tnLst>
+  </p:timing>
 </p:sld>
 </file>
 
@@ -5156,26 +5493,46 @@
           <a:p>
             <a:r>
               <a:rPr lang="es-ES_tradnl" sz="3600" dirty="0" smtClean="0"/>
-              <a:t>Actualmente en proceso</a:t>
-            </a:r>
-          </a:p>
-          <a:p>
+              <a:t>Actualmente en </a:t>
+            </a:r>
             <a:r>
               <a:rPr lang="es-ES_tradnl" sz="3600" dirty="0" smtClean="0"/>
-              <a:t>50% de las funcionalidades implementadas</a:t>
-            </a:r>
+              <a:t>proceso.</a:t>
+            </a:r>
+            <a:endParaRPr lang="es-ES_tradnl" sz="3600" dirty="0" smtClean="0"/>
           </a:p>
           <a:p>
             <a:r>
               <a:rPr lang="es-ES_tradnl" sz="3600" dirty="0" smtClean="0"/>
-              <a:t>22 tests unitarios, con cobertura de 68% del código</a:t>
-            </a:r>
-          </a:p>
-          <a:p>
+              <a:t>50% de las funcionalidades </a:t>
+            </a:r>
             <a:r>
               <a:rPr lang="es-ES_tradnl" sz="3600" dirty="0" smtClean="0"/>
-              <a:t>El test unitario promedio tiene 2,5 casos de prueba</a:t>
-            </a:r>
+              <a:t>implementadas.</a:t>
+            </a:r>
+            <a:endParaRPr lang="es-ES_tradnl" sz="3600" dirty="0" smtClean="0"/>
+          </a:p>
+          <a:p>
+            <a:r>
+              <a:rPr lang="es-ES_tradnl" sz="3600" dirty="0" smtClean="0"/>
+              <a:t>22 tests unitarios, con cobertura de 68% del </a:t>
+            </a:r>
+            <a:r>
+              <a:rPr lang="es-ES_tradnl" sz="3600" dirty="0" smtClean="0"/>
+              <a:t>código.</a:t>
+            </a:r>
+            <a:endParaRPr lang="es-ES_tradnl" sz="3600" dirty="0" smtClean="0"/>
+          </a:p>
+          <a:p>
+            <a:r>
+              <a:rPr lang="es-ES_tradnl" sz="3600" dirty="0" smtClean="0"/>
+              <a:t>El test unitario promedio tiene 2,5 casos de </a:t>
+            </a:r>
+            <a:r>
+              <a:rPr lang="es-ES_tradnl" sz="3600" dirty="0" smtClean="0"/>
+              <a:t>prueba.</a:t>
+            </a:r>
+            <a:endParaRPr lang="es-ES_tradnl" sz="3600" dirty="0" smtClean="0"/>
           </a:p>
           <a:p>
             <a:endParaRPr lang="es-ES_tradnl" sz="3600" dirty="0"/>
@@ -5207,6 +5564,45 @@
           </a:p>
         </p:txBody>
       </p:sp>
+      <p:pic>
+        <p:nvPicPr>
+          <p:cNvPr id="5" name="Picture 2" descr="Resultado de imagen para duoc"/>
+          <p:cNvPicPr>
+            <a:picLocks noChangeAspect="1" noChangeArrowheads="1"/>
+          </p:cNvPicPr>
+          <p:nvPr/>
+        </p:nvPicPr>
+        <p:blipFill rotWithShape="1">
+          <a:blip r:embed="rId2">
+            <a:extLst>
+              <a:ext uri="{28A0092B-C50C-407E-A947-70E740481C1C}">
+                <a14:useLocalDpi xmlns:a14="http://schemas.microsoft.com/office/drawing/2010/main" val="0"/>
+              </a:ext>
+            </a:extLst>
+          </a:blip>
+          <a:srcRect t="13892" r="19022"/>
+          <a:stretch/>
+        </p:blipFill>
+        <p:spPr bwMode="auto">
+          <a:xfrm>
+            <a:off x="9023169" y="378822"/>
+            <a:ext cx="2001883" cy="524910"/>
+          </a:xfrm>
+          <a:prstGeom prst="rect">
+            <a:avLst/>
+          </a:prstGeom>
+          <a:noFill/>
+          <a:extLst>
+            <a:ext uri="{909E8E84-426E-40DD-AFC4-6F175D3DCCD1}">
+              <a14:hiddenFill xmlns:a14="http://schemas.microsoft.com/office/drawing/2010/main">
+                <a:solidFill>
+                  <a:srgbClr val="FFFFFF"/>
+                </a:solidFill>
+              </a14:hiddenFill>
+            </a:ext>
+          </a:extLst>
+        </p:spPr>
+      </p:pic>
     </p:spTree>
     <p:extLst>
       <p:ext uri="{BB962C8B-B14F-4D97-AF65-F5344CB8AC3E}">
@@ -5217,6 +5613,13 @@
   <p:clrMapOvr>
     <a:masterClrMapping/>
   </p:clrMapOvr>
+  <p:timing>
+    <p:tnLst>
+      <p:par>
+        <p:cTn id="1" dur="indefinite" restart="never" nodeType="tmRoot"/>
+      </p:par>
+    </p:tnLst>
+  </p:timing>
 </p:sld>
 </file>
 
@@ -5254,23 +5657,7 @@
           <a:p>
             <a:r>
               <a:rPr lang="en-US" dirty="0" smtClean="0"/>
-              <a:t>Capa</a:t>
-            </a:r>
-            <a:r>
-              <a:rPr lang="en-US" dirty="0" smtClean="0"/>
-              <a:t> de </a:t>
-            </a:r>
-            <a:r>
-              <a:rPr lang="en-US" dirty="0" smtClean="0"/>
-              <a:t>negocio</a:t>
-            </a:r>
-            <a:r>
-              <a:rPr lang="en-US" dirty="0" smtClean="0"/>
-              <a:t>: </a:t>
-            </a:r>
-            <a:r>
-              <a:rPr lang="en-US" dirty="0" smtClean="0"/>
-              <a:t>web</a:t>
+              <a:t>Capa de negocio: web</a:t>
             </a:r>
             <a:endParaRPr lang="en-US" dirty="0"/>
           </a:p>
@@ -5295,14 +5682,32 @@
           <a:p>
             <a:r>
               <a:rPr lang="es-ES_tradnl" sz="4000" dirty="0" smtClean="0"/>
-              <a:t>3 clases</a:t>
-            </a:r>
-          </a:p>
-          <a:p>
+              <a:t>3 </a:t>
+            </a:r>
             <a:r>
               <a:rPr lang="es-ES_tradnl" sz="4000" dirty="0" smtClean="0"/>
-              <a:t>100% de los tests pasando</a:t>
-            </a:r>
+              <a:t>clases.</a:t>
+            </a:r>
+            <a:endParaRPr lang="es-ES_tradnl" sz="4000" dirty="0" smtClean="0"/>
+          </a:p>
+          <a:p>
+            <a:r>
+              <a:rPr lang="es-ES_tradnl" sz="4000" dirty="0" smtClean="0"/>
+              <a:t>100% de los </a:t>
+            </a:r>
+            <a:r>
+              <a:rPr lang="es-ES_tradnl" sz="4000" dirty="0" err="1" smtClean="0"/>
+              <a:t>tests</a:t>
+            </a:r>
+            <a:r>
+              <a:rPr lang="es-ES_tradnl" sz="4000" dirty="0" smtClean="0"/>
+              <a:t> </a:t>
+            </a:r>
+            <a:r>
+              <a:rPr lang="es-ES_tradnl" sz="4000" dirty="0" smtClean="0"/>
+              <a:t>pasando.</a:t>
+            </a:r>
+            <a:endParaRPr lang="es-ES_tradnl" sz="4000" dirty="0" smtClean="0"/>
           </a:p>
           <a:p>
             <a:r>
@@ -5338,6 +5743,45 @@
           </a:p>
         </p:txBody>
       </p:sp>
+      <p:pic>
+        <p:nvPicPr>
+          <p:cNvPr id="5" name="Picture 2" descr="Resultado de imagen para duoc"/>
+          <p:cNvPicPr>
+            <a:picLocks noChangeAspect="1" noChangeArrowheads="1"/>
+          </p:cNvPicPr>
+          <p:nvPr/>
+        </p:nvPicPr>
+        <p:blipFill rotWithShape="1">
+          <a:blip r:embed="rId2">
+            <a:extLst>
+              <a:ext uri="{28A0092B-C50C-407E-A947-70E740481C1C}">
+                <a14:useLocalDpi xmlns:a14="http://schemas.microsoft.com/office/drawing/2010/main" val="0"/>
+              </a:ext>
+            </a:extLst>
+          </a:blip>
+          <a:srcRect t="13892" r="19022"/>
+          <a:stretch/>
+        </p:blipFill>
+        <p:spPr bwMode="auto">
+          <a:xfrm>
+            <a:off x="9023169" y="378822"/>
+            <a:ext cx="2001883" cy="524910"/>
+          </a:xfrm>
+          <a:prstGeom prst="rect">
+            <a:avLst/>
+          </a:prstGeom>
+          <a:noFill/>
+          <a:extLst>
+            <a:ext uri="{909E8E84-426E-40DD-AFC4-6F175D3DCCD1}">
+              <a14:hiddenFill xmlns:a14="http://schemas.microsoft.com/office/drawing/2010/main">
+                <a:solidFill>
+                  <a:srgbClr val="FFFFFF"/>
+                </a:solidFill>
+              </a14:hiddenFill>
+            </a:ext>
+          </a:extLst>
+        </p:spPr>
+      </p:pic>
     </p:spTree>
     <p:extLst>
       <p:ext uri="{BB962C8B-B14F-4D97-AF65-F5344CB8AC3E}">
@@ -5348,6 +5792,13 @@
   <p:clrMapOvr>
     <a:masterClrMapping/>
   </p:clrMapOvr>
+  <p:timing>
+    <p:tnLst>
+      <p:par>
+        <p:cTn id="1" dur="indefinite" restart="never" nodeType="tmRoot"/>
+      </p:par>
+    </p:tnLst>
+  </p:timing>
 </p:sld>
 </file>
 
@@ -5471,6 +5922,45 @@
           </a:p>
         </p:txBody>
       </p:sp>
+      <p:pic>
+        <p:nvPicPr>
+          <p:cNvPr id="5" name="Picture 2" descr="Resultado de imagen para duoc"/>
+          <p:cNvPicPr>
+            <a:picLocks noChangeAspect="1" noChangeArrowheads="1"/>
+          </p:cNvPicPr>
+          <p:nvPr/>
+        </p:nvPicPr>
+        <p:blipFill rotWithShape="1">
+          <a:blip r:embed="rId2">
+            <a:extLst>
+              <a:ext uri="{28A0092B-C50C-407E-A947-70E740481C1C}">
+                <a14:useLocalDpi xmlns:a14="http://schemas.microsoft.com/office/drawing/2010/main" val="0"/>
+              </a:ext>
+            </a:extLst>
+          </a:blip>
+          <a:srcRect t="13892" r="19022"/>
+          <a:stretch/>
+        </p:blipFill>
+        <p:spPr bwMode="auto">
+          <a:xfrm>
+            <a:off x="9023169" y="378822"/>
+            <a:ext cx="2001883" cy="524910"/>
+          </a:xfrm>
+          <a:prstGeom prst="rect">
+            <a:avLst/>
+          </a:prstGeom>
+          <a:noFill/>
+          <a:extLst>
+            <a:ext uri="{909E8E84-426E-40DD-AFC4-6F175D3DCCD1}">
+              <a14:hiddenFill xmlns:a14="http://schemas.microsoft.com/office/drawing/2010/main">
+                <a:solidFill>
+                  <a:srgbClr val="FFFFFF"/>
+                </a:solidFill>
+              </a14:hiddenFill>
+            </a:ext>
+          </a:extLst>
+        </p:spPr>
+      </p:pic>
     </p:spTree>
     <p:extLst>
       <p:ext uri="{BB962C8B-B14F-4D97-AF65-F5344CB8AC3E}">
@@ -5481,6 +5971,13 @@
   <p:clrMapOvr>
     <a:masterClrMapping/>
   </p:clrMapOvr>
+  <p:timing>
+    <p:tnLst>
+      <p:par>
+        <p:cTn id="1" dur="indefinite" restart="never" nodeType="tmRoot"/>
+      </p:par>
+    </p:tnLst>
+  </p:timing>
 </p:sld>
 </file>
 
@@ -5608,6 +6105,45 @@
           </a:p>
         </p:txBody>
       </p:sp>
+      <p:pic>
+        <p:nvPicPr>
+          <p:cNvPr id="6" name="Picture 2" descr="Resultado de imagen para duoc"/>
+          <p:cNvPicPr>
+            <a:picLocks noChangeAspect="1" noChangeArrowheads="1"/>
+          </p:cNvPicPr>
+          <p:nvPr/>
+        </p:nvPicPr>
+        <p:blipFill rotWithShape="1">
+          <a:blip r:embed="rId3">
+            <a:extLst>
+              <a:ext uri="{28A0092B-C50C-407E-A947-70E740481C1C}">
+                <a14:useLocalDpi xmlns:a14="http://schemas.microsoft.com/office/drawing/2010/main" val="0"/>
+              </a:ext>
+            </a:extLst>
+          </a:blip>
+          <a:srcRect t="13892" r="19022"/>
+          <a:stretch/>
+        </p:blipFill>
+        <p:spPr bwMode="auto">
+          <a:xfrm>
+            <a:off x="9023169" y="378822"/>
+            <a:ext cx="2001883" cy="524910"/>
+          </a:xfrm>
+          <a:prstGeom prst="rect">
+            <a:avLst/>
+          </a:prstGeom>
+          <a:noFill/>
+          <a:extLst>
+            <a:ext uri="{909E8E84-426E-40DD-AFC4-6F175D3DCCD1}">
+              <a14:hiddenFill xmlns:a14="http://schemas.microsoft.com/office/drawing/2010/main">
+                <a:solidFill>
+                  <a:srgbClr val="FFFFFF"/>
+                </a:solidFill>
+              </a14:hiddenFill>
+            </a:ext>
+          </a:extLst>
+        </p:spPr>
+      </p:pic>
     </p:spTree>
     <p:extLst>
       <p:ext uri="{BB962C8B-B14F-4D97-AF65-F5344CB8AC3E}">
@@ -5618,6 +6154,13 @@
   <p:clrMapOvr>
     <a:masterClrMapping/>
   </p:clrMapOvr>
+  <p:timing>
+    <p:tnLst>
+      <p:par>
+        <p:cTn id="1" dur="indefinite" restart="never" nodeType="tmRoot"/>
+      </p:par>
+    </p:tnLst>
+  </p:timing>
 </p:sld>
 </file>
 
@@ -5712,27 +6255,57 @@
             <a:pPr lvl="1"/>
             <a:r>
               <a:rPr lang="es-ES_tradnl" sz="3600" dirty="0" smtClean="0"/>
-              <a:t>bd_cmh</a:t>
-            </a:r>
+              <a:t>bd_cmh: Oracle, única base de datos del negocio.</a:t>
+            </a:r>
+          </a:p>
+          <a:p>
+            <a:pPr lvl="1"/>
             <a:r>
               <a:rPr lang="es-ES_tradnl" sz="3600" dirty="0" smtClean="0"/>
-              <a:t>: Oracle, única base de datos del negocio.</a:t>
-            </a:r>
-          </a:p>
-          <a:p>
-            <a:pPr lvl="1"/>
-            <a:r>
-              <a:rPr lang="es-ES_tradnl" sz="3600" dirty="0" smtClean="0"/>
-              <a:t>bd_seguro</a:t>
-            </a:r>
-            <a:r>
-              <a:rPr lang="es-ES_tradnl" sz="3600" dirty="0" smtClean="0"/>
-              <a:t>: Oracle, simula base de datos de servicio de aseguradoras.</a:t>
-            </a:r>
-            <a:endParaRPr lang="es-ES_tradnl" sz="3600" dirty="0" smtClean="0"/>
-          </a:p>
-        </p:txBody>
-      </p:sp>
+              <a:t>bd_seguro: Oracle, simula base de datos de servicio de aseguradoras.</a:t>
+            </a:r>
+          </a:p>
+        </p:txBody>
+      </p:sp>
+      <p:pic>
+        <p:nvPicPr>
+          <p:cNvPr id="5" name="Picture 2" descr="Resultado de imagen para duoc"/>
+          <p:cNvPicPr>
+            <a:picLocks noChangeAspect="1" noChangeArrowheads="1"/>
+          </p:cNvPicPr>
+          <p:nvPr/>
+        </p:nvPicPr>
+        <p:blipFill rotWithShape="1">
+          <a:blip r:embed="rId2">
+            <a:extLst>
+              <a:ext uri="{28A0092B-C50C-407E-A947-70E740481C1C}">
+                <a14:useLocalDpi xmlns:a14="http://schemas.microsoft.com/office/drawing/2010/main" val="0"/>
+              </a:ext>
+            </a:extLst>
+          </a:blip>
+          <a:srcRect t="13892" r="19022"/>
+          <a:stretch/>
+        </p:blipFill>
+        <p:spPr bwMode="auto">
+          <a:xfrm>
+            <a:off x="9023169" y="378822"/>
+            <a:ext cx="2001883" cy="524910"/>
+          </a:xfrm>
+          <a:prstGeom prst="rect">
+            <a:avLst/>
+          </a:prstGeom>
+          <a:noFill/>
+          <a:extLst>
+            <a:ext uri="{909E8E84-426E-40DD-AFC4-6F175D3DCCD1}">
+              <a14:hiddenFill xmlns:a14="http://schemas.microsoft.com/office/drawing/2010/main">
+                <a:solidFill>
+                  <a:srgbClr val="FFFFFF"/>
+                </a:solidFill>
+              </a14:hiddenFill>
+            </a:ext>
+          </a:extLst>
+        </p:spPr>
+      </p:pic>
     </p:spTree>
     <p:extLst>
       <p:ext uri="{BB962C8B-B14F-4D97-AF65-F5344CB8AC3E}">
@@ -5743,6 +6316,13 @@
   <p:clrMapOvr>
     <a:masterClrMapping/>
   </p:clrMapOvr>
+  <p:timing>
+    <p:tnLst>
+      <p:par>
+        <p:cTn id="1" dur="indefinite" restart="never" nodeType="tmRoot"/>
+      </p:par>
+    </p:tnLst>
+  </p:timing>
 </p:sld>
 </file>
 
@@ -5842,32 +6422,50 @@
             <a:pPr lvl="1"/>
             <a:r>
               <a:rPr lang="es-ES_tradnl" sz="3200" dirty="0" smtClean="0"/>
-              <a:t>SeguroWS</a:t>
-            </a:r>
-            <a:r>
-              <a:rPr lang="es-ES_tradnl" sz="3200" dirty="0" smtClean="0"/>
-              <a:t>: web </a:t>
-            </a:r>
-            <a:r>
-              <a:rPr lang="es-ES_tradnl" sz="3200" dirty="0" smtClean="0"/>
-              <a:t>service</a:t>
-            </a:r>
-            <a:r>
-              <a:rPr lang="es-ES_tradnl" sz="3200" dirty="0" smtClean="0"/>
-              <a:t> que simula proveer funcionalidades de un </a:t>
-            </a:r>
-            <a:r>
-              <a:rPr lang="es-ES_tradnl" sz="3200" dirty="0" smtClean="0"/>
-              <a:t>endpoint</a:t>
-            </a:r>
-            <a:r>
-              <a:rPr lang="es-ES_tradnl" sz="3200" dirty="0" smtClean="0"/>
-              <a:t> de la empresa de seguros.</a:t>
-            </a:r>
-            <a:endParaRPr lang="es-ES_tradnl" sz="3200" dirty="0" smtClean="0"/>
-          </a:p>
-        </p:txBody>
-      </p:sp>
+              <a:t>SeguroWS: web service que simula proveer funcionalidades de un endpoint de la empresa de seguros.</a:t>
+            </a:r>
+          </a:p>
+        </p:txBody>
+      </p:sp>
+      <p:pic>
+        <p:nvPicPr>
+          <p:cNvPr id="5" name="Picture 2" descr="Resultado de imagen para duoc"/>
+          <p:cNvPicPr>
+            <a:picLocks noChangeAspect="1" noChangeArrowheads="1"/>
+          </p:cNvPicPr>
+          <p:nvPr/>
+        </p:nvPicPr>
+        <p:blipFill rotWithShape="1">
+          <a:blip r:embed="rId2">
+            <a:extLst>
+              <a:ext uri="{28A0092B-C50C-407E-A947-70E740481C1C}">
+                <a14:useLocalDpi xmlns:a14="http://schemas.microsoft.com/office/drawing/2010/main" val="0"/>
+              </a:ext>
+            </a:extLst>
+          </a:blip>
+          <a:srcRect t="13892" r="19022"/>
+          <a:stretch/>
+        </p:blipFill>
+        <p:spPr bwMode="auto">
+          <a:xfrm>
+            <a:off x="9023169" y="378822"/>
+            <a:ext cx="2001883" cy="524910"/>
+          </a:xfrm>
+          <a:prstGeom prst="rect">
+            <a:avLst/>
+          </a:prstGeom>
+          <a:noFill/>
+          <a:extLst>
+            <a:ext uri="{909E8E84-426E-40DD-AFC4-6F175D3DCCD1}">
+              <a14:hiddenFill xmlns:a14="http://schemas.microsoft.com/office/drawing/2010/main">
+                <a:solidFill>
+                  <a:srgbClr val="FFFFFF"/>
+                </a:solidFill>
+              </a14:hiddenFill>
+            </a:ext>
+          </a:extLst>
+        </p:spPr>
+      </p:pic>
     </p:spTree>
     <p:extLst>
       <p:ext uri="{BB962C8B-B14F-4D97-AF65-F5344CB8AC3E}">
@@ -5878,6 +6476,13 @@
   <p:clrMapOvr>
     <a:masterClrMapping/>
   </p:clrMapOvr>
+  <p:timing>
+    <p:tnLst>
+      <p:par>
+        <p:cTn id="1" dur="indefinite" restart="never" nodeType="tmRoot"/>
+      </p:par>
+    </p:tnLst>
+  </p:timing>
 </p:sld>
 </file>
 
@@ -5973,24 +6578,50 @@
             <a:pPr lvl="1"/>
             <a:r>
               <a:rPr lang="es-ES_tradnl" sz="4000" dirty="0" smtClean="0"/>
-              <a:t>Payment</a:t>
-            </a:r>
-            <a:r>
-              <a:rPr lang="es-ES_tradnl" sz="4000" dirty="0" smtClean="0"/>
-              <a:t> </a:t>
-            </a:r>
-            <a:r>
-              <a:rPr lang="es-ES_tradnl" sz="4000" dirty="0" smtClean="0"/>
-              <a:t>service</a:t>
-            </a:r>
-            <a:r>
-              <a:rPr lang="es-ES_tradnl" sz="4000" dirty="0" smtClean="0"/>
-              <a:t>: servicio automatizado de pagos de honorarios.</a:t>
-            </a:r>
-            <a:endParaRPr lang="es-ES_tradnl" sz="4000" dirty="0" smtClean="0"/>
-          </a:p>
-        </p:txBody>
-      </p:sp>
+              <a:t>Payment service: servicio automatizado de pagos de honorarios.</a:t>
+            </a:r>
+          </a:p>
+        </p:txBody>
+      </p:sp>
+      <p:pic>
+        <p:nvPicPr>
+          <p:cNvPr id="5" name="Picture 2" descr="Resultado de imagen para duoc"/>
+          <p:cNvPicPr>
+            <a:picLocks noChangeAspect="1" noChangeArrowheads="1"/>
+          </p:cNvPicPr>
+          <p:nvPr/>
+        </p:nvPicPr>
+        <p:blipFill rotWithShape="1">
+          <a:blip r:embed="rId2">
+            <a:extLst>
+              <a:ext uri="{28A0092B-C50C-407E-A947-70E740481C1C}">
+                <a14:useLocalDpi xmlns:a14="http://schemas.microsoft.com/office/drawing/2010/main" val="0"/>
+              </a:ext>
+            </a:extLst>
+          </a:blip>
+          <a:srcRect t="13892" r="19022"/>
+          <a:stretch/>
+        </p:blipFill>
+        <p:spPr bwMode="auto">
+          <a:xfrm>
+            <a:off x="9023169" y="378822"/>
+            <a:ext cx="2001883" cy="524910"/>
+          </a:xfrm>
+          <a:prstGeom prst="rect">
+            <a:avLst/>
+          </a:prstGeom>
+          <a:noFill/>
+          <a:extLst>
+            <a:ext uri="{909E8E84-426E-40DD-AFC4-6F175D3DCCD1}">
+              <a14:hiddenFill xmlns:a14="http://schemas.microsoft.com/office/drawing/2010/main">
+                <a:solidFill>
+                  <a:srgbClr val="FFFFFF"/>
+                </a:solidFill>
+              </a14:hiddenFill>
+            </a:ext>
+          </a:extLst>
+        </p:spPr>
+      </p:pic>
     </p:spTree>
     <p:extLst>
       <p:ext uri="{BB962C8B-B14F-4D97-AF65-F5344CB8AC3E}">
@@ -6001,6 +6632,13 @@
   <p:clrMapOvr>
     <a:masterClrMapping/>
   </p:clrMapOvr>
+  <p:timing>
+    <p:tnLst>
+      <p:par>
+        <p:cTn id="1" dur="indefinite" restart="never" nodeType="tmRoot"/>
+      </p:par>
+    </p:tnLst>
+  </p:timing>
 </p:sld>
 </file>
 
@@ -6074,6 +6712,45 @@
           </a:p>
         </p:txBody>
       </p:sp>
+      <p:pic>
+        <p:nvPicPr>
+          <p:cNvPr id="5" name="Picture 2" descr="Resultado de imagen para duoc"/>
+          <p:cNvPicPr>
+            <a:picLocks noChangeAspect="1" noChangeArrowheads="1"/>
+          </p:cNvPicPr>
+          <p:nvPr/>
+        </p:nvPicPr>
+        <p:blipFill rotWithShape="1">
+          <a:blip r:embed="rId2">
+            <a:extLst>
+              <a:ext uri="{28A0092B-C50C-407E-A947-70E740481C1C}">
+                <a14:useLocalDpi xmlns:a14="http://schemas.microsoft.com/office/drawing/2010/main" val="0"/>
+              </a:ext>
+            </a:extLst>
+          </a:blip>
+          <a:srcRect t="13892" r="19022"/>
+          <a:stretch/>
+        </p:blipFill>
+        <p:spPr bwMode="auto">
+          <a:xfrm>
+            <a:off x="9023169" y="378822"/>
+            <a:ext cx="2001883" cy="524910"/>
+          </a:xfrm>
+          <a:prstGeom prst="rect">
+            <a:avLst/>
+          </a:prstGeom>
+          <a:noFill/>
+          <a:extLst>
+            <a:ext uri="{909E8E84-426E-40DD-AFC4-6F175D3DCCD1}">
+              <a14:hiddenFill xmlns:a14="http://schemas.microsoft.com/office/drawing/2010/main">
+                <a:solidFill>
+                  <a:srgbClr val="FFFFFF"/>
+                </a:solidFill>
+              </a14:hiddenFill>
+            </a:ext>
+          </a:extLst>
+        </p:spPr>
+      </p:pic>
     </p:spTree>
     <p:extLst>
       <p:ext uri="{BB962C8B-B14F-4D97-AF65-F5344CB8AC3E}">
@@ -6084,6 +6761,13 @@
   <p:clrMapOvr>
     <a:masterClrMapping/>
   </p:clrMapOvr>
+  <p:timing>
+    <p:tnLst>
+      <p:par>
+        <p:cTn id="1" dur="indefinite" restart="never" nodeType="tmRoot"/>
+      </p:par>
+    </p:tnLst>
+  </p:timing>
 </p:sld>
 </file>
 
@@ -6138,7 +6822,7 @@
           </p:nvPr>
         </p:nvPicPr>
         <p:blipFill>
-          <a:blip r:embed="rId2">
+          <a:blip r:embed="rId2" cstate="print">
             <a:extLst>
               <a:ext uri="{28A0092B-C50C-407E-A947-70E740481C1C}">
                 <a14:useLocalDpi xmlns:a14="http://schemas.microsoft.com/office/drawing/2010/main" val="0"/>
@@ -6212,19 +6896,33 @@
             </a:br>
             <a:r>
               <a:rPr lang="es-ES_tradnl" sz="2800" dirty="0" smtClean="0"/>
-              <a:t>y no funcionales cubiertos por casos de uso</a:t>
-            </a:r>
-          </a:p>
-          <a:p>
+              <a:t>y no funcionales cubiertos por casos de </a:t>
+            </a:r>
             <a:r>
               <a:rPr lang="es-ES_tradnl" sz="2800" dirty="0" smtClean="0"/>
-              <a:t>31 requerimientos funcionales</a:t>
-            </a:r>
+              <a:t>uso.</a:t>
+            </a:r>
+            <a:endParaRPr lang="es-ES_tradnl" sz="2800" dirty="0" smtClean="0"/>
           </a:p>
           <a:p>
             <a:r>
               <a:rPr lang="es-ES_tradnl" sz="2800" dirty="0" smtClean="0"/>
-              <a:t>26 casos de uso</a:t>
+              <a:t>31 requerimientos </a:t>
+            </a:r>
+            <a:r>
+              <a:rPr lang="es-ES_tradnl" sz="2800" dirty="0" smtClean="0"/>
+              <a:t>funcionales.</a:t>
+            </a:r>
+            <a:endParaRPr lang="es-ES_tradnl" sz="2800" dirty="0" smtClean="0"/>
+          </a:p>
+          <a:p>
+            <a:r>
+              <a:rPr lang="es-ES_tradnl" sz="2800" dirty="0" smtClean="0"/>
+              <a:t>26 casos de </a:t>
+            </a:r>
+            <a:r>
+              <a:rPr lang="es-ES_tradnl" sz="2800" dirty="0" smtClean="0"/>
+              <a:t>uso.</a:t>
             </a:r>
             <a:endParaRPr lang="es-ES_tradnl" sz="2800" dirty="0"/>
           </a:p>
@@ -6239,7 +6937,7 @@
         <p:spPr>
           <a:xfrm>
             <a:off x="1261872" y="6284396"/>
-            <a:ext cx="5365571" cy="369332"/>
+            <a:ext cx="5429692" cy="369332"/>
           </a:xfrm>
           <a:prstGeom prst="rect">
             <a:avLst/>
@@ -6254,12 +6952,55 @@
           <a:p>
             <a:r>
               <a:rPr lang="es-ES_tradnl" dirty="0" smtClean="0"/>
-              <a:t>Fig.. 2: Matriz de requerimientos vs casos de uso</a:t>
+              <a:t>Fig.. 2: Matriz de requerimientos vs casos de </a:t>
+            </a:r>
+            <a:r>
+              <a:rPr lang="es-ES_tradnl" dirty="0" smtClean="0"/>
+              <a:t>uso.</a:t>
             </a:r>
             <a:endParaRPr lang="es-ES_tradnl" dirty="0"/>
           </a:p>
         </p:txBody>
       </p:sp>
+      <p:pic>
+        <p:nvPicPr>
+          <p:cNvPr id="7" name="Picture 2" descr="Resultado de imagen para duoc"/>
+          <p:cNvPicPr>
+            <a:picLocks noChangeAspect="1" noChangeArrowheads="1"/>
+          </p:cNvPicPr>
+          <p:nvPr/>
+        </p:nvPicPr>
+        <p:blipFill rotWithShape="1">
+          <a:blip r:embed="rId3">
+            <a:extLst>
+              <a:ext uri="{28A0092B-C50C-407E-A947-70E740481C1C}">
+                <a14:useLocalDpi xmlns:a14="http://schemas.microsoft.com/office/drawing/2010/main" val="0"/>
+              </a:ext>
+            </a:extLst>
+          </a:blip>
+          <a:srcRect t="13892" r="19022"/>
+          <a:stretch/>
+        </p:blipFill>
+        <p:spPr bwMode="auto">
+          <a:xfrm>
+            <a:off x="9023169" y="378822"/>
+            <a:ext cx="2001883" cy="524910"/>
+          </a:xfrm>
+          <a:prstGeom prst="rect">
+            <a:avLst/>
+          </a:prstGeom>
+          <a:noFill/>
+          <a:extLst>
+            <a:ext uri="{909E8E84-426E-40DD-AFC4-6F175D3DCCD1}">
+              <a14:hiddenFill xmlns:a14="http://schemas.microsoft.com/office/drawing/2010/main">
+                <a:solidFill>
+                  <a:srgbClr val="FFFFFF"/>
+                </a:solidFill>
+              </a14:hiddenFill>
+            </a:ext>
+          </a:extLst>
+        </p:spPr>
+      </p:pic>
     </p:spTree>
     <p:extLst>
       <p:ext uri="{BB962C8B-B14F-4D97-AF65-F5344CB8AC3E}">
@@ -6270,6 +7011,13 @@
   <p:clrMapOvr>
     <a:masterClrMapping/>
   </p:clrMapOvr>
+  <p:timing>
+    <p:tnLst>
+      <p:par>
+        <p:cTn id="1" dur="indefinite" restart="never" nodeType="tmRoot"/>
+      </p:par>
+    </p:tnLst>
+  </p:timing>
 </p:sld>
 </file>
 
@@ -6349,7 +7097,7 @@
           </p:nvPr>
         </p:nvPicPr>
         <p:blipFill>
-          <a:blip r:embed="rId2">
+          <a:blip r:embed="rId2" cstate="print">
             <a:extLst>
               <a:ext uri="{28A0092B-C50C-407E-A947-70E740481C1C}">
                 <a14:useLocalDpi xmlns:a14="http://schemas.microsoft.com/office/drawing/2010/main" val="0"/>
@@ -6391,7 +7139,11 @@
           <a:p>
             <a:r>
               <a:rPr lang="es-ES_tradnl" sz="2400" dirty="0" smtClean="0"/>
-              <a:t>100% de los requerimientos funcionales tienen al menos una clase asociada, responsable satisfacer sus necesidades lógicas</a:t>
+              <a:t>100% de los requerimientos funcionales tienen al menos una clase asociada, responsable satisfacer sus necesidades </a:t>
+            </a:r>
+            <a:r>
+              <a:rPr lang="es-ES_tradnl" sz="2400" dirty="0" smtClean="0"/>
+              <a:t>lógicas.</a:t>
             </a:r>
             <a:endParaRPr lang="es-ES_tradnl" sz="2400" dirty="0" smtClean="0"/>
           </a:p>
@@ -6406,7 +7158,7 @@
         <p:spPr>
           <a:xfrm>
             <a:off x="1259840" y="5770880"/>
-            <a:ext cx="5577168" cy="369332"/>
+            <a:ext cx="5641288" cy="369332"/>
           </a:xfrm>
           <a:prstGeom prst="rect">
             <a:avLst/>
@@ -6421,12 +7173,55 @@
           <a:p>
             <a:r>
               <a:rPr lang="es-ES_tradnl" dirty="0" smtClean="0"/>
-              <a:t>Fig. 3: matriz de requerimientos vs clases (parcial)</a:t>
+              <a:t>Fig. 3: matriz de requerimientos vs clases (parcial</a:t>
+            </a:r>
+            <a:r>
+              <a:rPr lang="es-ES_tradnl" dirty="0" smtClean="0"/>
+              <a:t>).</a:t>
             </a:r>
             <a:endParaRPr lang="es-ES_tradnl" dirty="0"/>
           </a:p>
         </p:txBody>
       </p:sp>
+      <p:pic>
+        <p:nvPicPr>
+          <p:cNvPr id="8" name="Picture 2" descr="Resultado de imagen para duoc"/>
+          <p:cNvPicPr>
+            <a:picLocks noChangeAspect="1" noChangeArrowheads="1"/>
+          </p:cNvPicPr>
+          <p:nvPr/>
+        </p:nvPicPr>
+        <p:blipFill rotWithShape="1">
+          <a:blip r:embed="rId3">
+            <a:extLst>
+              <a:ext uri="{28A0092B-C50C-407E-A947-70E740481C1C}">
+                <a14:useLocalDpi xmlns:a14="http://schemas.microsoft.com/office/drawing/2010/main" val="0"/>
+              </a:ext>
+            </a:extLst>
+          </a:blip>
+          <a:srcRect t="13892" r="19022"/>
+          <a:stretch/>
+        </p:blipFill>
+        <p:spPr bwMode="auto">
+          <a:xfrm>
+            <a:off x="9023169" y="378822"/>
+            <a:ext cx="2001883" cy="524910"/>
+          </a:xfrm>
+          <a:prstGeom prst="rect">
+            <a:avLst/>
+          </a:prstGeom>
+          <a:noFill/>
+          <a:extLst>
+            <a:ext uri="{909E8E84-426E-40DD-AFC4-6F175D3DCCD1}">
+              <a14:hiddenFill xmlns:a14="http://schemas.microsoft.com/office/drawing/2010/main">
+                <a:solidFill>
+                  <a:srgbClr val="FFFFFF"/>
+                </a:solidFill>
+              </a14:hiddenFill>
+            </a:ext>
+          </a:extLst>
+        </p:spPr>
+      </p:pic>
     </p:spTree>
     <p:extLst>
       <p:ext uri="{BB962C8B-B14F-4D97-AF65-F5344CB8AC3E}">
@@ -6437,6 +7232,13 @@
   <p:clrMapOvr>
     <a:masterClrMapping/>
   </p:clrMapOvr>
+  <p:timing>
+    <p:tnLst>
+      <p:par>
+        <p:cTn id="1" dur="indefinite" restart="never" nodeType="tmRoot"/>
+      </p:par>
+    </p:tnLst>
+  </p:timing>
 </p:sld>
 </file>
 

</xml_diff>

<commit_message>
Solucionado error de tipeo
</commit_message>
<xml_diff>
--- a/presentación lunes 24 octubre 2016.pptx
+++ b/presentación lunes 24 octubre 2016.pptx
@@ -952,13 +952,13 @@
   <p:clrMapOvr>
     <a:overrideClrMapping bg1="dk1" tx1="lt1" bg2="dk2" tx2="lt2" accent1="accent1" accent2="accent2" accent3="accent3" accent4="accent4" accent5="accent5" accent6="accent6" hlink="hlink" folHlink="folHlink"/>
   </p:clrMapOvr>
-  <mc:AlternateContent xmlns:mc="http://schemas.openxmlformats.org/markup-compatibility/2006">
-    <mc:Choice xmlns:p14="http://schemas.microsoft.com/office/powerpoint/2010/main" Requires="p14">
+  <mc:AlternateContent xmlns:mc="http://schemas.openxmlformats.org/markup-compatibility/2006" xmlns:p14="http://schemas.microsoft.com/office/powerpoint/2010/main">
+    <mc:Choice Requires="p14">
       <p:transition p14:dur="150">
         <p:fade/>
       </p:transition>
     </mc:Choice>
-    <mc:Fallback>
+    <mc:Fallback xmlns="">
       <p:transition>
         <p:fade/>
       </p:transition>
@@ -1175,13 +1175,13 @@
   <p:clrMapOvr>
     <a:masterClrMapping/>
   </p:clrMapOvr>
-  <mc:AlternateContent xmlns:mc="http://schemas.openxmlformats.org/markup-compatibility/2006">
-    <mc:Choice xmlns:p14="http://schemas.microsoft.com/office/powerpoint/2010/main" Requires="p14">
+  <mc:AlternateContent xmlns:mc="http://schemas.openxmlformats.org/markup-compatibility/2006" xmlns:p14="http://schemas.microsoft.com/office/powerpoint/2010/main">
+    <mc:Choice Requires="p14">
       <p:transition p14:dur="150">
         <p:fade/>
       </p:transition>
     </mc:Choice>
-    <mc:Fallback>
+    <mc:Fallback xmlns="">
       <p:transition>
         <p:fade/>
       </p:transition>
@@ -1408,13 +1408,13 @@
   <p:clrMapOvr>
     <a:masterClrMapping/>
   </p:clrMapOvr>
-  <mc:AlternateContent xmlns:mc="http://schemas.openxmlformats.org/markup-compatibility/2006">
-    <mc:Choice xmlns:p14="http://schemas.microsoft.com/office/powerpoint/2010/main" Requires="p14">
+  <mc:AlternateContent xmlns:mc="http://schemas.openxmlformats.org/markup-compatibility/2006" xmlns:p14="http://schemas.microsoft.com/office/powerpoint/2010/main">
+    <mc:Choice Requires="p14">
       <p:transition p14:dur="150">
         <p:fade/>
       </p:transition>
     </mc:Choice>
-    <mc:Fallback>
+    <mc:Fallback xmlns="">
       <p:transition>
         <p:fade/>
       </p:transition>
@@ -1631,13 +1631,13 @@
   <p:clrMapOvr>
     <a:masterClrMapping/>
   </p:clrMapOvr>
-  <mc:AlternateContent xmlns:mc="http://schemas.openxmlformats.org/markup-compatibility/2006">
-    <mc:Choice xmlns:p14="http://schemas.microsoft.com/office/powerpoint/2010/main" Requires="p14">
+  <mc:AlternateContent xmlns:mc="http://schemas.openxmlformats.org/markup-compatibility/2006" xmlns:p14="http://schemas.microsoft.com/office/powerpoint/2010/main">
+    <mc:Choice Requires="p14">
       <p:transition p14:dur="150">
         <p:fade/>
       </p:transition>
     </mc:Choice>
-    <mc:Fallback>
+    <mc:Fallback xmlns="">
       <p:transition>
         <p:fade/>
       </p:transition>
@@ -1938,13 +1938,13 @@
   <p:clrMapOvr>
     <a:masterClrMapping/>
   </p:clrMapOvr>
-  <mc:AlternateContent xmlns:mc="http://schemas.openxmlformats.org/markup-compatibility/2006">
-    <mc:Choice xmlns:p14="http://schemas.microsoft.com/office/powerpoint/2010/main" Requires="p14">
+  <mc:AlternateContent xmlns:mc="http://schemas.openxmlformats.org/markup-compatibility/2006" xmlns:p14="http://schemas.microsoft.com/office/powerpoint/2010/main">
+    <mc:Choice Requires="p14">
       <p:transition p14:dur="150">
         <p:fade/>
       </p:transition>
     </mc:Choice>
-    <mc:Fallback>
+    <mc:Fallback xmlns="">
       <p:transition>
         <p:fade/>
       </p:transition>
@@ -2279,13 +2279,13 @@
   <p:clrMapOvr>
     <a:masterClrMapping/>
   </p:clrMapOvr>
-  <mc:AlternateContent xmlns:mc="http://schemas.openxmlformats.org/markup-compatibility/2006">
-    <mc:Choice xmlns:p14="http://schemas.microsoft.com/office/powerpoint/2010/main" Requires="p14">
+  <mc:AlternateContent xmlns:mc="http://schemas.openxmlformats.org/markup-compatibility/2006" xmlns:p14="http://schemas.microsoft.com/office/powerpoint/2010/main">
+    <mc:Choice Requires="p14">
       <p:transition p14:dur="150">
         <p:fade/>
       </p:transition>
     </mc:Choice>
-    <mc:Fallback>
+    <mc:Fallback xmlns="">
       <p:transition>
         <p:fade/>
       </p:transition>
@@ -2783,13 +2783,13 @@
   <p:clrMapOvr>
     <a:masterClrMapping/>
   </p:clrMapOvr>
-  <mc:AlternateContent xmlns:mc="http://schemas.openxmlformats.org/markup-compatibility/2006">
-    <mc:Choice xmlns:p14="http://schemas.microsoft.com/office/powerpoint/2010/main" Requires="p14">
+  <mc:AlternateContent xmlns:mc="http://schemas.openxmlformats.org/markup-compatibility/2006" xmlns:p14="http://schemas.microsoft.com/office/powerpoint/2010/main">
+    <mc:Choice Requires="p14">
       <p:transition p14:dur="150">
         <p:fade/>
       </p:transition>
     </mc:Choice>
-    <mc:Fallback>
+    <mc:Fallback xmlns="">
       <p:transition>
         <p:fade/>
       </p:transition>
@@ -2954,13 +2954,13 @@
   <p:clrMapOvr>
     <a:masterClrMapping/>
   </p:clrMapOvr>
-  <mc:AlternateContent xmlns:mc="http://schemas.openxmlformats.org/markup-compatibility/2006">
-    <mc:Choice xmlns:p14="http://schemas.microsoft.com/office/powerpoint/2010/main" Requires="p14">
+  <mc:AlternateContent xmlns:mc="http://schemas.openxmlformats.org/markup-compatibility/2006" xmlns:p14="http://schemas.microsoft.com/office/powerpoint/2010/main">
+    <mc:Choice Requires="p14">
       <p:transition p14:dur="150">
         <p:fade/>
       </p:transition>
     </mc:Choice>
-    <mc:Fallback>
+    <mc:Fallback xmlns="">
       <p:transition>
         <p:fade/>
       </p:transition>
@@ -3102,13 +3102,13 @@
   <p:clrMapOvr>
     <a:masterClrMapping/>
   </p:clrMapOvr>
-  <mc:AlternateContent xmlns:mc="http://schemas.openxmlformats.org/markup-compatibility/2006">
-    <mc:Choice xmlns:p14="http://schemas.microsoft.com/office/powerpoint/2010/main" Requires="p14">
+  <mc:AlternateContent xmlns:mc="http://schemas.openxmlformats.org/markup-compatibility/2006" xmlns:p14="http://schemas.microsoft.com/office/powerpoint/2010/main">
+    <mc:Choice Requires="p14">
       <p:transition p14:dur="150">
         <p:fade/>
       </p:transition>
     </mc:Choice>
-    <mc:Fallback>
+    <mc:Fallback xmlns="">
       <p:transition>
         <p:fade/>
       </p:transition>
@@ -3401,13 +3401,13 @@
   <p:clrMapOvr>
     <a:masterClrMapping/>
   </p:clrMapOvr>
-  <mc:AlternateContent xmlns:mc="http://schemas.openxmlformats.org/markup-compatibility/2006">
-    <mc:Choice xmlns:p14="http://schemas.microsoft.com/office/powerpoint/2010/main" Requires="p14">
+  <mc:AlternateContent xmlns:mc="http://schemas.openxmlformats.org/markup-compatibility/2006" xmlns:p14="http://schemas.microsoft.com/office/powerpoint/2010/main">
+    <mc:Choice Requires="p14">
       <p:transition p14:dur="150">
         <p:fade/>
       </p:transition>
     </mc:Choice>
-    <mc:Fallback>
+    <mc:Fallback xmlns="">
       <p:transition>
         <p:fade/>
       </p:transition>
@@ -3728,13 +3728,13 @@
   <p:clrMapOvr>
     <a:masterClrMapping/>
   </p:clrMapOvr>
-  <mc:AlternateContent xmlns:mc="http://schemas.openxmlformats.org/markup-compatibility/2006">
-    <mc:Choice xmlns:p14="http://schemas.microsoft.com/office/powerpoint/2010/main" Requires="p14">
+  <mc:AlternateContent xmlns:mc="http://schemas.openxmlformats.org/markup-compatibility/2006" xmlns:p14="http://schemas.microsoft.com/office/powerpoint/2010/main">
+    <mc:Choice Requires="p14">
       <p:transition p14:dur="150">
         <p:fade/>
       </p:transition>
     </mc:Choice>
-    <mc:Fallback>
+    <mc:Fallback xmlns="">
       <p:transition>
         <p:fade/>
       </p:transition>
@@ -4044,13 +4044,13 @@
     <p:sldLayoutId id="2147483820" r:id="rId10"/>
     <p:sldLayoutId id="2147483821" r:id="rId11"/>
   </p:sldLayoutIdLst>
-  <mc:AlternateContent xmlns:mc="http://schemas.openxmlformats.org/markup-compatibility/2006">
-    <mc:Choice xmlns:p14="http://schemas.microsoft.com/office/powerpoint/2010/main" Requires="p14">
+  <mc:AlternateContent xmlns:mc="http://schemas.openxmlformats.org/markup-compatibility/2006" xmlns:p14="http://schemas.microsoft.com/office/powerpoint/2010/main">
+    <mc:Choice Requires="p14">
       <p:transition p14:dur="150">
         <p:fade/>
       </p:transition>
     </mc:Choice>
-    <mc:Fallback>
+    <mc:Fallback xmlns="">
       <p:transition>
         <p:fade/>
       </p:transition>
@@ -4606,13 +4606,13 @@
   <p:clrMapOvr>
     <a:masterClrMapping/>
   </p:clrMapOvr>
-  <mc:AlternateContent xmlns:mc="http://schemas.openxmlformats.org/markup-compatibility/2006">
-    <mc:Choice xmlns:p14="http://schemas.microsoft.com/office/powerpoint/2010/main" Requires="p14">
+  <mc:AlternateContent xmlns:mc="http://schemas.openxmlformats.org/markup-compatibility/2006" xmlns:p14="http://schemas.microsoft.com/office/powerpoint/2010/main">
+    <mc:Choice Requires="p14">
       <p:transition p14:dur="150">
         <p:fade/>
       </p:transition>
     </mc:Choice>
-    <mc:Fallback>
+    <mc:Fallback xmlns="">
       <p:transition>
         <p:fade/>
       </p:transition>
@@ -4717,7 +4717,7 @@
         </p:blipFill>
         <p:spPr>
           <a:xfrm>
-            <a:off x="1261872" y="1882732"/>
+            <a:off x="1261872" y="1929226"/>
             <a:ext cx="6294150" cy="3660378"/>
           </a:xfrm>
         </p:spPr>
@@ -4830,13 +4830,13 @@
   <p:clrMapOvr>
     <a:masterClrMapping/>
   </p:clrMapOvr>
-  <mc:AlternateContent xmlns:mc="http://schemas.openxmlformats.org/markup-compatibility/2006">
-    <mc:Choice xmlns:p14="http://schemas.microsoft.com/office/powerpoint/2010/main" Requires="p14">
+  <mc:AlternateContent xmlns:mc="http://schemas.openxmlformats.org/markup-compatibility/2006" xmlns:p14="http://schemas.microsoft.com/office/powerpoint/2010/main">
+    <mc:Choice Requires="p14">
       <p:transition p14:dur="150">
         <p:fade/>
       </p:transition>
     </mc:Choice>
-    <mc:Fallback>
+    <mc:Fallback xmlns="">
       <p:transition>
         <p:fade/>
       </p:transition>
@@ -4997,13 +4997,13 @@
   <p:clrMapOvr>
     <a:masterClrMapping/>
   </p:clrMapOvr>
-  <mc:AlternateContent xmlns:mc="http://schemas.openxmlformats.org/markup-compatibility/2006">
-    <mc:Choice xmlns:p14="http://schemas.microsoft.com/office/powerpoint/2010/main" Requires="p14">
+  <mc:AlternateContent xmlns:mc="http://schemas.openxmlformats.org/markup-compatibility/2006" xmlns:p14="http://schemas.microsoft.com/office/powerpoint/2010/main">
+    <mc:Choice Requires="p14">
       <p:transition p14:dur="150">
         <p:fade/>
       </p:transition>
     </mc:Choice>
-    <mc:Fallback>
+    <mc:Fallback xmlns="">
       <p:transition>
         <p:fade/>
       </p:transition>
@@ -5179,13 +5179,13 @@
   <p:clrMapOvr>
     <a:masterClrMapping/>
   </p:clrMapOvr>
-  <mc:AlternateContent xmlns:mc="http://schemas.openxmlformats.org/markup-compatibility/2006">
-    <mc:Choice xmlns:p14="http://schemas.microsoft.com/office/powerpoint/2010/main" Requires="p14">
+  <mc:AlternateContent xmlns:mc="http://schemas.openxmlformats.org/markup-compatibility/2006" xmlns:p14="http://schemas.microsoft.com/office/powerpoint/2010/main">
+    <mc:Choice Requires="p14">
       <p:transition p14:dur="150">
         <p:fade/>
       </p:transition>
     </mc:Choice>
-    <mc:Fallback>
+    <mc:Fallback xmlns="">
       <p:transition>
         <p:fade/>
       </p:transition>
@@ -5368,13 +5368,13 @@
   <p:clrMapOvr>
     <a:masterClrMapping/>
   </p:clrMapOvr>
-  <mc:AlternateContent xmlns:mc="http://schemas.openxmlformats.org/markup-compatibility/2006">
-    <mc:Choice xmlns:p14="http://schemas.microsoft.com/office/powerpoint/2010/main" Requires="p14">
+  <mc:AlternateContent xmlns:mc="http://schemas.openxmlformats.org/markup-compatibility/2006" xmlns:p14="http://schemas.microsoft.com/office/powerpoint/2010/main">
+    <mc:Choice Requires="p14">
       <p:transition p14:dur="150">
         <p:fade/>
       </p:transition>
     </mc:Choice>
-    <mc:Fallback>
+    <mc:Fallback xmlns="">
       <p:transition>
         <p:fade/>
       </p:transition>
@@ -5611,13 +5611,13 @@
   <p:clrMapOvr>
     <a:masterClrMapping/>
   </p:clrMapOvr>
-  <mc:AlternateContent xmlns:mc="http://schemas.openxmlformats.org/markup-compatibility/2006">
-    <mc:Choice xmlns:p14="http://schemas.microsoft.com/office/powerpoint/2010/main" Requires="p14">
+  <mc:AlternateContent xmlns:mc="http://schemas.openxmlformats.org/markup-compatibility/2006" xmlns:p14="http://schemas.microsoft.com/office/powerpoint/2010/main">
+    <mc:Choice Requires="p14">
       <p:transition p14:dur="150">
         <p:fade/>
       </p:transition>
     </mc:Choice>
-    <mc:Fallback>
+    <mc:Fallback xmlns="">
       <p:transition>
         <p:fade/>
       </p:transition>
@@ -5739,7 +5739,7 @@
         <p:spPr>
           <a:xfrm>
             <a:off x="3063988" y="6099730"/>
-            <a:ext cx="5402441" cy="369332"/>
+            <a:ext cx="3656770" cy="369332"/>
           </a:xfrm>
           <a:prstGeom prst="rect">
             <a:avLst/>
@@ -5754,7 +5754,23 @@
           <a:p>
             <a:r>
               <a:rPr lang="es-ES_tradnl" dirty="0" smtClean="0"/>
-              <a:t>Fig. 4: modelo de datos de la base de datos CMH.</a:t>
+              <a:t>Fig. 4: </a:t>
+            </a:r>
+            <a:r>
+              <a:rPr lang="es-ES_tradnl" dirty="0" smtClean="0"/>
+              <a:t>Modelo </a:t>
+            </a:r>
+            <a:r>
+              <a:rPr lang="es-ES_tradnl" dirty="0" smtClean="0"/>
+              <a:t>de datos </a:t>
+            </a:r>
+            <a:r>
+              <a:rPr lang="es-ES_tradnl" dirty="0" smtClean="0"/>
+              <a:t>de </a:t>
+            </a:r>
+            <a:r>
+              <a:rPr lang="es-ES_tradnl" dirty="0" smtClean="0"/>
+              <a:t>CMH.</a:t>
             </a:r>
           </a:p>
         </p:txBody>
@@ -5808,13 +5824,13 @@
   <p:clrMapOvr>
     <a:masterClrMapping/>
   </p:clrMapOvr>
-  <mc:AlternateContent xmlns:mc="http://schemas.openxmlformats.org/markup-compatibility/2006">
-    <mc:Choice xmlns:p14="http://schemas.microsoft.com/office/powerpoint/2010/main" Requires="p14">
+  <mc:AlternateContent xmlns:mc="http://schemas.openxmlformats.org/markup-compatibility/2006" xmlns:p14="http://schemas.microsoft.com/office/powerpoint/2010/main">
+    <mc:Choice Requires="p14">
       <p:transition p14:dur="150">
         <p:fade/>
       </p:transition>
     </mc:Choice>
-    <mc:Fallback>
+    <mc:Fallback xmlns="">
       <p:transition>
         <p:fade/>
       </p:transition>
@@ -6004,13 +6020,13 @@
   <p:clrMapOvr>
     <a:masterClrMapping/>
   </p:clrMapOvr>
-  <mc:AlternateContent xmlns:mc="http://schemas.openxmlformats.org/markup-compatibility/2006">
-    <mc:Choice xmlns:p14="http://schemas.microsoft.com/office/powerpoint/2010/main" Requires="p14">
+  <mc:AlternateContent xmlns:mc="http://schemas.openxmlformats.org/markup-compatibility/2006" xmlns:p14="http://schemas.microsoft.com/office/powerpoint/2010/main">
+    <mc:Choice Requires="p14">
       <p:transition p14:dur="150">
         <p:fade/>
       </p:transition>
     </mc:Choice>
-    <mc:Fallback>
+    <mc:Fallback xmlns="">
       <p:transition>
         <p:fade/>
       </p:transition>
@@ -6185,13 +6201,13 @@
   <p:clrMapOvr>
     <a:masterClrMapping/>
   </p:clrMapOvr>
-  <mc:AlternateContent xmlns:mc="http://schemas.openxmlformats.org/markup-compatibility/2006">
-    <mc:Choice xmlns:p14="http://schemas.microsoft.com/office/powerpoint/2010/main" Requires="p14">
+  <mc:AlternateContent xmlns:mc="http://schemas.openxmlformats.org/markup-compatibility/2006" xmlns:p14="http://schemas.microsoft.com/office/powerpoint/2010/main">
+    <mc:Choice Requires="p14">
       <p:transition p14:dur="150">
         <p:fade/>
       </p:transition>
     </mc:Choice>
-    <mc:Fallback>
+    <mc:Fallback xmlns="">
       <p:transition>
         <p:fade/>
       </p:transition>
@@ -6366,13 +6382,13 @@
   <p:clrMapOvr>
     <a:masterClrMapping/>
   </p:clrMapOvr>
-  <mc:AlternateContent xmlns:mc="http://schemas.openxmlformats.org/markup-compatibility/2006">
-    <mc:Choice xmlns:p14="http://schemas.microsoft.com/office/powerpoint/2010/main" Requires="p14">
+  <mc:AlternateContent xmlns:mc="http://schemas.openxmlformats.org/markup-compatibility/2006" xmlns:p14="http://schemas.microsoft.com/office/powerpoint/2010/main">
+    <mc:Choice Requires="p14">
       <p:transition p14:dur="150">
         <p:fade/>
       </p:transition>
     </mc:Choice>
-    <mc:Fallback>
+    <mc:Fallback xmlns="">
       <p:transition>
         <p:fade/>
       </p:transition>
@@ -6477,15 +6493,7 @@
           <a:p>
             <a:r>
               <a:rPr lang="es-ES_tradnl" dirty="0" smtClean="0"/>
-              <a:t>Fig. </a:t>
-            </a:r>
-            <a:r>
-              <a:rPr lang="es-ES_tradnl" dirty="0" smtClean="0"/>
-              <a:t>6: Tareas de la iteraci</a:t>
-            </a:r>
-            <a:r>
-              <a:rPr lang="es-ES_tradnl" dirty="0" smtClean="0"/>
-              <a:t>ón 2 basada en Gantt.</a:t>
+              <a:t>Fig. 6: Tareas de la iteración 2 basada en Gantt.</a:t>
             </a:r>
             <a:endParaRPr lang="es-ES_tradnl" dirty="0"/>
           </a:p>
@@ -6564,13 +6572,13 @@
   <p:clrMapOvr>
     <a:masterClrMapping/>
   </p:clrMapOvr>
-  <mc:AlternateContent xmlns:mc="http://schemas.openxmlformats.org/markup-compatibility/2006">
-    <mc:Choice xmlns:p14="http://schemas.microsoft.com/office/powerpoint/2010/main" Requires="p14">
+  <mc:AlternateContent xmlns:mc="http://schemas.openxmlformats.org/markup-compatibility/2006" xmlns:p14="http://schemas.microsoft.com/office/powerpoint/2010/main">
+    <mc:Choice Requires="p14">
       <p:transition p14:dur="150">
         <p:fade/>
       </p:transition>
     </mc:Choice>
-    <mc:Fallback>
+    <mc:Fallback xmlns="">
       <p:transition>
         <p:fade/>
       </p:transition>
@@ -6675,11 +6683,7 @@
           <a:p>
             <a:r>
               <a:rPr lang="es-ES_tradnl" sz="3200" dirty="0" smtClean="0"/>
-              <a:t>Capa de negocios terminal (en proceso</a:t>
-            </a:r>
-            <a:r>
-              <a:rPr lang="es-ES_tradnl" sz="3200" dirty="0" smtClean="0"/>
-              <a:t>)</a:t>
+              <a:t>Capa de negocios terminal (en proceso)</a:t>
             </a:r>
           </a:p>
           <a:p>
@@ -6765,13 +6769,13 @@
   <p:clrMapOvr>
     <a:masterClrMapping/>
   </p:clrMapOvr>
-  <mc:AlternateContent xmlns:mc="http://schemas.openxmlformats.org/markup-compatibility/2006">
-    <mc:Choice xmlns:p14="http://schemas.microsoft.com/office/powerpoint/2010/main" Requires="p14">
+  <mc:AlternateContent xmlns:mc="http://schemas.openxmlformats.org/markup-compatibility/2006" xmlns:p14="http://schemas.microsoft.com/office/powerpoint/2010/main">
+    <mc:Choice Requires="p14">
       <p:transition p14:dur="150">
         <p:fade/>
       </p:transition>
     </mc:Choice>
-    <mc:Fallback>
+    <mc:Fallback xmlns="">
       <p:transition>
         <p:fade/>
       </p:transition>
@@ -6960,13 +6964,13 @@
   <p:clrMapOvr>
     <a:masterClrMapping/>
   </p:clrMapOvr>
-  <mc:AlternateContent xmlns:mc="http://schemas.openxmlformats.org/markup-compatibility/2006">
-    <mc:Choice xmlns:p14="http://schemas.microsoft.com/office/powerpoint/2010/main" Requires="p14">
+  <mc:AlternateContent xmlns:mc="http://schemas.openxmlformats.org/markup-compatibility/2006" xmlns:p14="http://schemas.microsoft.com/office/powerpoint/2010/main">
+    <mc:Choice Requires="p14">
       <p:transition p14:dur="150">
         <p:fade/>
       </p:transition>
     </mc:Choice>
-    <mc:Fallback>
+    <mc:Fallback xmlns="">
       <p:transition>
         <p:fade/>
       </p:transition>
@@ -7134,13 +7138,13 @@
   <p:clrMapOvr>
     <a:masterClrMapping/>
   </p:clrMapOvr>
-  <mc:AlternateContent xmlns:mc="http://schemas.openxmlformats.org/markup-compatibility/2006">
-    <mc:Choice xmlns:p14="http://schemas.microsoft.com/office/powerpoint/2010/main" Requires="p14">
+  <mc:AlternateContent xmlns:mc="http://schemas.openxmlformats.org/markup-compatibility/2006" xmlns:p14="http://schemas.microsoft.com/office/powerpoint/2010/main">
+    <mc:Choice Requires="p14">
       <p:transition p14:dur="150">
         <p:fade/>
       </p:transition>
     </mc:Choice>
-    <mc:Fallback>
+    <mc:Fallback xmlns="">
       <p:transition>
         <p:fade/>
       </p:transition>
@@ -7306,13 +7310,13 @@
   <p:clrMapOvr>
     <a:masterClrMapping/>
   </p:clrMapOvr>
-  <mc:AlternateContent xmlns:mc="http://schemas.openxmlformats.org/markup-compatibility/2006">
-    <mc:Choice xmlns:p14="http://schemas.microsoft.com/office/powerpoint/2010/main" Requires="p14">
+  <mc:AlternateContent xmlns:mc="http://schemas.openxmlformats.org/markup-compatibility/2006" xmlns:p14="http://schemas.microsoft.com/office/powerpoint/2010/main">
+    <mc:Choice Requires="p14">
       <p:transition p14:dur="150">
         <p:fade/>
       </p:transition>
     </mc:Choice>
-    <mc:Fallback>
+    <mc:Fallback xmlns="">
       <p:transition>
         <p:fade/>
       </p:transition>
@@ -7417,34 +7421,14 @@
             <a:pPr lvl="1"/>
             <a:r>
               <a:rPr lang="es-ES_tradnl" sz="4000" dirty="0" smtClean="0"/>
-              <a:t>Web </a:t>
-            </a:r>
+              <a:t>Web app: Sitio web que provee las funcionalidades para los pacientes.</a:t>
+            </a:r>
+          </a:p>
+          <a:p>
+            <a:pPr lvl="1"/>
             <a:r>
               <a:rPr lang="es-ES_tradnl" sz="4000" dirty="0" smtClean="0"/>
-              <a:t>app: </a:t>
-            </a:r>
-            <a:r>
-              <a:rPr lang="es-ES_tradnl" sz="4000" dirty="0" smtClean="0"/>
-              <a:t>Sitio </a:t>
-            </a:r>
-            <a:r>
-              <a:rPr lang="es-ES_tradnl" sz="4000" dirty="0" smtClean="0"/>
-              <a:t>web que provee las funcionalidades para los pacientes.</a:t>
-            </a:r>
-          </a:p>
-          <a:p>
-            <a:pPr lvl="1"/>
-            <a:r>
-              <a:rPr lang="es-ES_tradnl" sz="4000" dirty="0" smtClean="0"/>
-              <a:t>Payment service: </a:t>
-            </a:r>
-            <a:r>
-              <a:rPr lang="es-ES_tradnl" sz="4000" dirty="0" smtClean="0"/>
-              <a:t>Servicio </a:t>
-            </a:r>
-            <a:r>
-              <a:rPr lang="es-ES_tradnl" sz="4000" dirty="0" smtClean="0"/>
-              <a:t>automatizado de pagos de honorarios.</a:t>
+              <a:t>Payment service: Servicio automatizado de pagos de honorarios.</a:t>
             </a:r>
           </a:p>
         </p:txBody>
@@ -7498,13 +7482,13 @@
   <p:clrMapOvr>
     <a:masterClrMapping/>
   </p:clrMapOvr>
-  <mc:AlternateContent xmlns:mc="http://schemas.openxmlformats.org/markup-compatibility/2006">
-    <mc:Choice xmlns:p14="http://schemas.microsoft.com/office/powerpoint/2010/main" Requires="p14">
+  <mc:AlternateContent xmlns:mc="http://schemas.openxmlformats.org/markup-compatibility/2006" xmlns:p14="http://schemas.microsoft.com/office/powerpoint/2010/main">
+    <mc:Choice Requires="p14">
       <p:transition p14:dur="150">
         <p:fade/>
       </p:transition>
     </mc:Choice>
-    <mc:Fallback>
+    <mc:Fallback xmlns="">
       <p:transition>
         <p:fade/>
       </p:transition>
@@ -7607,7 +7591,6 @@
               <a:rPr lang="es-ES_tradnl" sz="4000" dirty="0" smtClean="0"/>
               <a:t>Creación de documento RFC debido al cambio en la arquitectura.</a:t>
             </a:r>
-            <a:endParaRPr lang="es-ES_tradnl" sz="4000" dirty="0" smtClean="0"/>
           </a:p>
         </p:txBody>
       </p:sp>
@@ -7660,13 +7643,13 @@
   <p:clrMapOvr>
     <a:masterClrMapping/>
   </p:clrMapOvr>
-  <mc:AlternateContent xmlns:mc="http://schemas.openxmlformats.org/markup-compatibility/2006">
-    <mc:Choice xmlns:p14="http://schemas.microsoft.com/office/powerpoint/2010/main" Requires="p14">
+  <mc:AlternateContent xmlns:mc="http://schemas.openxmlformats.org/markup-compatibility/2006" xmlns:p14="http://schemas.microsoft.com/office/powerpoint/2010/main">
+    <mc:Choice Requires="p14">
       <p:transition p14:dur="150">
         <p:fade/>
       </p:transition>
     </mc:Choice>
-    <mc:Fallback>
+    <mc:Fallback xmlns="">
       <p:transition>
         <p:fade/>
       </p:transition>
@@ -7801,13 +7784,13 @@
   <p:clrMapOvr>
     <a:masterClrMapping/>
   </p:clrMapOvr>
-  <mc:AlternateContent xmlns:mc="http://schemas.openxmlformats.org/markup-compatibility/2006">
-    <mc:Choice xmlns:p14="http://schemas.microsoft.com/office/powerpoint/2010/main" Requires="p14">
+  <mc:AlternateContent xmlns:mc="http://schemas.openxmlformats.org/markup-compatibility/2006" xmlns:p14="http://schemas.microsoft.com/office/powerpoint/2010/main">
+    <mc:Choice Requires="p14">
       <p:transition p14:dur="150">
         <p:fade/>
       </p:transition>
     </mc:Choice>
-    <mc:Fallback>
+    <mc:Fallback xmlns="">
       <p:transition>
         <p:fade/>
       </p:transition>
@@ -8045,13 +8028,13 @@
   <p:clrMapOvr>
     <a:masterClrMapping/>
   </p:clrMapOvr>
-  <mc:AlternateContent xmlns:mc="http://schemas.openxmlformats.org/markup-compatibility/2006">
-    <mc:Choice xmlns:p14="http://schemas.microsoft.com/office/powerpoint/2010/main" Requires="p14">
+  <mc:AlternateContent xmlns:mc="http://schemas.openxmlformats.org/markup-compatibility/2006" xmlns:p14="http://schemas.microsoft.com/office/powerpoint/2010/main">
+    <mc:Choice Requires="p14">
       <p:transition p14:dur="150">
         <p:fade/>
       </p:transition>
     </mc:Choice>
-    <mc:Fallback>
+    <mc:Fallback xmlns="">
       <p:transition>
         <p:fade/>
       </p:transition>

</xml_diff>